<commit_message>
Added supplemental oxygen to respiratory methodology, including validation.
</commit_message>
<xml_diff>
--- a/docs/Figures/RespiratoryWorking.pptx
+++ b/docs/Figures/RespiratoryWorking.pptx
@@ -6,7 +6,7 @@
     <p:sldMasterId id="2147483672" r:id="rId2"/>
   </p:sldMasterIdLst>
   <p:notesMasterIdLst>
-    <p:notesMasterId r:id="rId15"/>
+    <p:notesMasterId r:id="rId16"/>
   </p:notesMasterIdLst>
   <p:sldIdLst>
     <p:sldId id="266" r:id="rId3"/>
@@ -21,6 +21,7 @@
     <p:sldId id="286" r:id="rId12"/>
     <p:sldId id="287" r:id="rId13"/>
     <p:sldId id="288" r:id="rId14"/>
+    <p:sldId id="289" r:id="rId15"/>
   </p:sldIdLst>
   <p:sldSz cx="9144000" cy="6858000" type="screen4x3"/>
   <p:notesSz cx="6996113" cy="9282113"/>
@@ -121,7 +122,7 @@
   </p:defaultTextStyle>
   <p:extLst>
     <p:ext uri="{EFAFB233-063F-42B5-8137-9DF3F51BA10A}">
-      <p15:sldGuideLst xmlns="" xmlns:p15="http://schemas.microsoft.com/office/powerpoint/2012/main">
+      <p15:sldGuideLst xmlns:p15="http://schemas.microsoft.com/office/powerpoint/2012/main">
         <p15:guide id="1" orient="horz" pos="2160">
           <p15:clr>
             <a:srgbClr val="A4A3A4"/>
@@ -220,7 +221,7 @@
           <a:p>
             <a:fld id="{7B126BB8-5932-4ACC-8CD5-328D9DA138C9}" type="datetimeFigureOut">
               <a:rPr lang="en-US" smtClean="0"/>
-              <a:t>3/2/2017</a:t>
+              <a:t>6/17/2019</a:t>
             </a:fld>
             <a:endParaRPr lang="en-US"/>
           </a:p>
@@ -284,38 +285,37 @@
           <a:p>
             <a:pPr lvl="0"/>
             <a:r>
-              <a:rPr lang="en-US" smtClean="0"/>
+              <a:rPr lang="en-US"/>
               <a:t>Click to edit Master text styles</a:t>
             </a:r>
           </a:p>
           <a:p>
             <a:pPr lvl="1"/>
             <a:r>
-              <a:rPr lang="en-US" smtClean="0"/>
+              <a:rPr lang="en-US"/>
               <a:t>Second level</a:t>
             </a:r>
           </a:p>
           <a:p>
             <a:pPr lvl="2"/>
             <a:r>
-              <a:rPr lang="en-US" smtClean="0"/>
+              <a:rPr lang="en-US"/>
               <a:t>Third level</a:t>
             </a:r>
           </a:p>
           <a:p>
             <a:pPr lvl="3"/>
             <a:r>
-              <a:rPr lang="en-US" smtClean="0"/>
+              <a:rPr lang="en-US"/>
               <a:t>Fourth level</a:t>
             </a:r>
           </a:p>
           <a:p>
             <a:pPr lvl="4"/>
             <a:r>
-              <a:rPr lang="en-US" smtClean="0"/>
+              <a:rPr lang="en-US"/>
               <a:t>Fifth level</a:t>
             </a:r>
-            <a:endParaRPr lang="en-US"/>
           </a:p>
         </p:txBody>
       </p:sp>
@@ -526,10 +526,9 @@
           <a:lstStyle/>
           <a:p>
             <a:r>
-              <a:rPr lang="en-US" smtClean="0"/>
+              <a:rPr lang="en-US"/>
               <a:t>Click to edit Master title style</a:t>
             </a:r>
-            <a:endParaRPr lang="en-US"/>
           </a:p>
         </p:txBody>
       </p:sp>
@@ -645,10 +644,9 @@
           </a:lstStyle>
           <a:p>
             <a:r>
-              <a:rPr lang="en-US" smtClean="0"/>
+              <a:rPr lang="en-US"/>
               <a:t>Click to edit Master subtitle style</a:t>
             </a:r>
-            <a:endParaRPr lang="en-US"/>
           </a:p>
         </p:txBody>
       </p:sp>
@@ -669,7 +667,7 @@
           <a:p>
             <a:fld id="{9E9AFD63-10BD-4598-9E1E-9FFECB76D2D7}" type="datetimeFigureOut">
               <a:rPr lang="en-US" smtClean="0"/>
-              <a:t>3/2/2017</a:t>
+              <a:t>6/17/2019</a:t>
             </a:fld>
             <a:endParaRPr lang="en-US"/>
           </a:p>
@@ -763,10 +761,9 @@
           <a:lstStyle/>
           <a:p>
             <a:r>
-              <a:rPr lang="en-US" smtClean="0"/>
+              <a:rPr lang="en-US"/>
               <a:t>Click to edit Master title style</a:t>
             </a:r>
-            <a:endParaRPr lang="en-US"/>
           </a:p>
         </p:txBody>
       </p:sp>
@@ -787,38 +784,37 @@
           <a:p>
             <a:pPr lvl="0"/>
             <a:r>
-              <a:rPr lang="en-US" smtClean="0"/>
+              <a:rPr lang="en-US"/>
               <a:t>Click to edit Master text styles</a:t>
             </a:r>
           </a:p>
           <a:p>
             <a:pPr lvl="1"/>
             <a:r>
-              <a:rPr lang="en-US" smtClean="0"/>
+              <a:rPr lang="en-US"/>
               <a:t>Second level</a:t>
             </a:r>
           </a:p>
           <a:p>
             <a:pPr lvl="2"/>
             <a:r>
-              <a:rPr lang="en-US" smtClean="0"/>
+              <a:rPr lang="en-US"/>
               <a:t>Third level</a:t>
             </a:r>
           </a:p>
           <a:p>
             <a:pPr lvl="3"/>
             <a:r>
-              <a:rPr lang="en-US" smtClean="0"/>
+              <a:rPr lang="en-US"/>
               <a:t>Fourth level</a:t>
             </a:r>
           </a:p>
           <a:p>
             <a:pPr lvl="4"/>
             <a:r>
-              <a:rPr lang="en-US" smtClean="0"/>
+              <a:rPr lang="en-US"/>
               <a:t>Fifth level</a:t>
             </a:r>
-            <a:endParaRPr lang="en-US"/>
           </a:p>
         </p:txBody>
       </p:sp>
@@ -839,7 +835,7 @@
           <a:p>
             <a:fld id="{9E9AFD63-10BD-4598-9E1E-9FFECB76D2D7}" type="datetimeFigureOut">
               <a:rPr lang="en-US" smtClean="0"/>
-              <a:t>3/2/2017</a:t>
+              <a:t>6/17/2019</a:t>
             </a:fld>
             <a:endParaRPr lang="en-US"/>
           </a:p>
@@ -938,10 +934,9 @@
           <a:lstStyle/>
           <a:p>
             <a:r>
-              <a:rPr lang="en-US" smtClean="0"/>
+              <a:rPr lang="en-US"/>
               <a:t>Click to edit Master title style</a:t>
             </a:r>
-            <a:endParaRPr lang="en-US"/>
           </a:p>
         </p:txBody>
       </p:sp>
@@ -967,38 +962,37 @@
           <a:p>
             <a:pPr lvl="0"/>
             <a:r>
-              <a:rPr lang="en-US" smtClean="0"/>
+              <a:rPr lang="en-US"/>
               <a:t>Click to edit Master text styles</a:t>
             </a:r>
           </a:p>
           <a:p>
             <a:pPr lvl="1"/>
             <a:r>
-              <a:rPr lang="en-US" smtClean="0"/>
+              <a:rPr lang="en-US"/>
               <a:t>Second level</a:t>
             </a:r>
           </a:p>
           <a:p>
             <a:pPr lvl="2"/>
             <a:r>
-              <a:rPr lang="en-US" smtClean="0"/>
+              <a:rPr lang="en-US"/>
               <a:t>Third level</a:t>
             </a:r>
           </a:p>
           <a:p>
             <a:pPr lvl="3"/>
             <a:r>
-              <a:rPr lang="en-US" smtClean="0"/>
+              <a:rPr lang="en-US"/>
               <a:t>Fourth level</a:t>
             </a:r>
           </a:p>
           <a:p>
             <a:pPr lvl="4"/>
             <a:r>
-              <a:rPr lang="en-US" smtClean="0"/>
+              <a:rPr lang="en-US"/>
               <a:t>Fifth level</a:t>
             </a:r>
-            <a:endParaRPr lang="en-US"/>
           </a:p>
         </p:txBody>
       </p:sp>
@@ -1019,7 +1013,7 @@
           <a:p>
             <a:fld id="{9E9AFD63-10BD-4598-9E1E-9FFECB76D2D7}" type="datetimeFigureOut">
               <a:rPr lang="en-US" smtClean="0"/>
-              <a:t>3/2/2017</a:t>
+              <a:t>6/17/2019</a:t>
             </a:fld>
             <a:endParaRPr lang="en-US"/>
           </a:p>
@@ -1214,10 +1208,9 @@
           </a:lstStyle>
           <a:p>
             <a:r>
-              <a:rPr lang="en-US" dirty="0" smtClean="0"/>
+              <a:rPr lang="en-US" dirty="0"/>
               <a:t>date</a:t>
             </a:r>
-            <a:endParaRPr lang="en-US" dirty="0"/>
           </a:p>
         </p:txBody>
       </p:sp>
@@ -1381,10 +1374,9 @@
           </a:lstStyle>
           <a:p>
             <a:r>
-              <a:rPr lang="en-US" dirty="0" smtClean="0"/>
+              <a:rPr lang="en-US" dirty="0"/>
               <a:t>Click to edit title</a:t>
             </a:r>
-            <a:endParaRPr lang="en-US" dirty="0"/>
           </a:p>
         </p:txBody>
       </p:sp>
@@ -1473,38 +1465,37 @@
           <a:p>
             <a:pPr lvl="0"/>
             <a:r>
-              <a:rPr lang="en-US" smtClean="0"/>
+              <a:rPr lang="en-US"/>
               <a:t>Click to edit Master text styles</a:t>
             </a:r>
           </a:p>
           <a:p>
             <a:pPr lvl="1"/>
             <a:r>
-              <a:rPr lang="en-US" smtClean="0"/>
+              <a:rPr lang="en-US"/>
               <a:t>Second level</a:t>
             </a:r>
           </a:p>
           <a:p>
             <a:pPr lvl="2"/>
             <a:r>
-              <a:rPr lang="en-US" smtClean="0"/>
+              <a:rPr lang="en-US"/>
               <a:t>Third level</a:t>
             </a:r>
           </a:p>
           <a:p>
             <a:pPr lvl="3"/>
             <a:r>
-              <a:rPr lang="en-US" smtClean="0"/>
+              <a:rPr lang="en-US"/>
               <a:t>Fourth level</a:t>
             </a:r>
           </a:p>
           <a:p>
             <a:pPr lvl="4"/>
             <a:r>
-              <a:rPr lang="en-US" smtClean="0"/>
+              <a:rPr lang="en-US"/>
               <a:t>Fifth level</a:t>
             </a:r>
-            <a:endParaRPr lang="en-US"/>
           </a:p>
         </p:txBody>
       </p:sp>
@@ -1534,7 +1525,7 @@
           <a:lstStyle/>
           <a:p>
             <a:r>
-              <a:rPr lang="en-US" smtClean="0"/>
+              <a:rPr lang="en-US"/>
               <a:t>Click to edit Master title style</a:t>
             </a:r>
             <a:endParaRPr lang="en-US" dirty="0"/>
@@ -1599,7 +1590,7 @@
           </a:lstStyle>
           <a:p>
             <a:r>
-              <a:rPr lang="en-US" smtClean="0"/>
+              <a:rPr lang="en-US"/>
               <a:t>Click to edit Master title style</a:t>
             </a:r>
             <a:endParaRPr lang="en-US" dirty="0"/>
@@ -1722,7 +1713,7 @@
           <a:p>
             <a:pPr lvl="0"/>
             <a:r>
-              <a:rPr lang="en-US" smtClean="0"/>
+              <a:rPr lang="en-US"/>
               <a:t>Click to edit Master text styles</a:t>
             </a:r>
           </a:p>
@@ -1811,35 +1802,35 @@
           <a:p>
             <a:pPr lvl="0"/>
             <a:r>
-              <a:rPr lang="en-US" smtClean="0"/>
+              <a:rPr lang="en-US"/>
               <a:t>Click to edit Master text styles</a:t>
             </a:r>
           </a:p>
           <a:p>
             <a:pPr lvl="1"/>
             <a:r>
-              <a:rPr lang="en-US" smtClean="0"/>
+              <a:rPr lang="en-US"/>
               <a:t>Second level</a:t>
             </a:r>
           </a:p>
           <a:p>
             <a:pPr lvl="2"/>
             <a:r>
-              <a:rPr lang="en-US" smtClean="0"/>
+              <a:rPr lang="en-US"/>
               <a:t>Third level</a:t>
             </a:r>
           </a:p>
           <a:p>
             <a:pPr lvl="3"/>
             <a:r>
-              <a:rPr lang="en-US" smtClean="0"/>
+              <a:rPr lang="en-US"/>
               <a:t>Fourth level</a:t>
             </a:r>
           </a:p>
           <a:p>
             <a:pPr lvl="4"/>
             <a:r>
-              <a:rPr lang="en-US" smtClean="0"/>
+              <a:rPr lang="en-US"/>
               <a:t>Fifth level</a:t>
             </a:r>
             <a:endParaRPr lang="en-US" dirty="0"/>
@@ -1899,38 +1890,37 @@
           <a:p>
             <a:pPr lvl="0"/>
             <a:r>
-              <a:rPr lang="en-US" smtClean="0"/>
+              <a:rPr lang="en-US"/>
               <a:t>Click to edit Master text styles</a:t>
             </a:r>
           </a:p>
           <a:p>
             <a:pPr lvl="1"/>
             <a:r>
-              <a:rPr lang="en-US" smtClean="0"/>
+              <a:rPr lang="en-US"/>
               <a:t>Second level</a:t>
             </a:r>
           </a:p>
           <a:p>
             <a:pPr lvl="2"/>
             <a:r>
-              <a:rPr lang="en-US" smtClean="0"/>
+              <a:rPr lang="en-US"/>
               <a:t>Third level</a:t>
             </a:r>
           </a:p>
           <a:p>
             <a:pPr lvl="3"/>
             <a:r>
-              <a:rPr lang="en-US" smtClean="0"/>
+              <a:rPr lang="en-US"/>
               <a:t>Fourth level</a:t>
             </a:r>
           </a:p>
           <a:p>
             <a:pPr lvl="4"/>
             <a:r>
-              <a:rPr lang="en-US" smtClean="0"/>
+              <a:rPr lang="en-US"/>
               <a:t>Fifth level</a:t>
             </a:r>
-            <a:endParaRPr lang="en-US"/>
           </a:p>
         </p:txBody>
       </p:sp>
@@ -1960,7 +1950,7 @@
           <a:lstStyle/>
           <a:p>
             <a:r>
-              <a:rPr lang="en-US" smtClean="0"/>
+              <a:rPr lang="en-US"/>
               <a:t>Click to edit Master title style</a:t>
             </a:r>
             <a:endParaRPr lang="en-US" dirty="0"/>
@@ -2061,7 +2051,7 @@
           <a:p>
             <a:pPr lvl="0"/>
             <a:r>
-              <a:rPr lang="en-US" smtClean="0"/>
+              <a:rPr lang="en-US"/>
               <a:t>Click to edit Master text styles</a:t>
             </a:r>
           </a:p>
@@ -2120,35 +2110,35 @@
           <a:p>
             <a:pPr lvl="0"/>
             <a:r>
-              <a:rPr lang="en-US" smtClean="0"/>
+              <a:rPr lang="en-US"/>
               <a:t>Click to edit Master text styles</a:t>
             </a:r>
           </a:p>
           <a:p>
             <a:pPr lvl="1"/>
             <a:r>
-              <a:rPr lang="en-US" smtClean="0"/>
+              <a:rPr lang="en-US"/>
               <a:t>Second level</a:t>
             </a:r>
           </a:p>
           <a:p>
             <a:pPr lvl="2"/>
             <a:r>
-              <a:rPr lang="en-US" smtClean="0"/>
+              <a:rPr lang="en-US"/>
               <a:t>Third level</a:t>
             </a:r>
           </a:p>
           <a:p>
             <a:pPr lvl="3"/>
             <a:r>
-              <a:rPr lang="en-US" smtClean="0"/>
+              <a:rPr lang="en-US"/>
               <a:t>Fourth level</a:t>
             </a:r>
           </a:p>
           <a:p>
             <a:pPr lvl="4"/>
             <a:r>
-              <a:rPr lang="en-US" smtClean="0"/>
+              <a:rPr lang="en-US"/>
               <a:t>Fifth level</a:t>
             </a:r>
             <a:endParaRPr lang="en-US" dirty="0"/>
@@ -2219,7 +2209,7 @@
           <a:p>
             <a:pPr lvl="0"/>
             <a:r>
-              <a:rPr lang="en-US" smtClean="0"/>
+              <a:rPr lang="en-US"/>
               <a:t>Click to edit Master text styles</a:t>
             </a:r>
           </a:p>
@@ -2278,38 +2268,37 @@
           <a:p>
             <a:pPr lvl="0"/>
             <a:r>
-              <a:rPr lang="en-US" smtClean="0"/>
+              <a:rPr lang="en-US"/>
               <a:t>Click to edit Master text styles</a:t>
             </a:r>
           </a:p>
           <a:p>
             <a:pPr lvl="1"/>
             <a:r>
-              <a:rPr lang="en-US" smtClean="0"/>
+              <a:rPr lang="en-US"/>
               <a:t>Second level</a:t>
             </a:r>
           </a:p>
           <a:p>
             <a:pPr lvl="2"/>
             <a:r>
-              <a:rPr lang="en-US" smtClean="0"/>
+              <a:rPr lang="en-US"/>
               <a:t>Third level</a:t>
             </a:r>
           </a:p>
           <a:p>
             <a:pPr lvl="3"/>
             <a:r>
-              <a:rPr lang="en-US" smtClean="0"/>
+              <a:rPr lang="en-US"/>
               <a:t>Fourth level</a:t>
             </a:r>
           </a:p>
           <a:p>
             <a:pPr lvl="4"/>
             <a:r>
-              <a:rPr lang="en-US" smtClean="0"/>
+              <a:rPr lang="en-US"/>
               <a:t>Fifth level</a:t>
             </a:r>
-            <a:endParaRPr lang="en-US"/>
           </a:p>
         </p:txBody>
       </p:sp>
@@ -2339,7 +2328,7 @@
           <a:lstStyle/>
           <a:p>
             <a:r>
-              <a:rPr lang="en-US" smtClean="0"/>
+              <a:rPr lang="en-US"/>
               <a:t>Click to edit Master title style</a:t>
             </a:r>
             <a:endParaRPr lang="en-US" dirty="0"/>
@@ -2402,7 +2391,7 @@
           <a:lstStyle/>
           <a:p>
             <a:r>
-              <a:rPr lang="en-US" smtClean="0"/>
+              <a:rPr lang="en-US"/>
               <a:t>Click to edit Master title style</a:t>
             </a:r>
             <a:endParaRPr lang="en-US" dirty="0"/>
@@ -2497,10 +2486,9 @@
           </a:lstStyle>
           <a:p>
             <a:r>
-              <a:rPr lang="en-US" smtClean="0"/>
+              <a:rPr lang="en-US"/>
               <a:t>Click to edit Master title style</a:t>
             </a:r>
-            <a:endParaRPr lang="en-US"/>
           </a:p>
         </p:txBody>
       </p:sp>
@@ -2557,35 +2545,35 @@
           <a:p>
             <a:pPr lvl="0"/>
             <a:r>
-              <a:rPr lang="en-US" smtClean="0"/>
+              <a:rPr lang="en-US"/>
               <a:t>Click to edit Master text styles</a:t>
             </a:r>
           </a:p>
           <a:p>
             <a:pPr lvl="1"/>
             <a:r>
-              <a:rPr lang="en-US" smtClean="0"/>
+              <a:rPr lang="en-US"/>
               <a:t>Second level</a:t>
             </a:r>
           </a:p>
           <a:p>
             <a:pPr lvl="2"/>
             <a:r>
-              <a:rPr lang="en-US" smtClean="0"/>
+              <a:rPr lang="en-US"/>
               <a:t>Third level</a:t>
             </a:r>
           </a:p>
           <a:p>
             <a:pPr lvl="3"/>
             <a:r>
-              <a:rPr lang="en-US" smtClean="0"/>
+              <a:rPr lang="en-US"/>
               <a:t>Fourth level</a:t>
             </a:r>
           </a:p>
           <a:p>
             <a:pPr lvl="4"/>
             <a:r>
-              <a:rPr lang="en-US" smtClean="0"/>
+              <a:rPr lang="en-US"/>
               <a:t>Fifth level</a:t>
             </a:r>
             <a:endParaRPr lang="en-US" dirty="0"/>
@@ -2654,7 +2642,7 @@
           <a:p>
             <a:pPr lvl="0"/>
             <a:r>
-              <a:rPr lang="en-US" smtClean="0"/>
+              <a:rPr lang="en-US"/>
               <a:t>Click to edit Master text styles</a:t>
             </a:r>
           </a:p>
@@ -2706,10 +2694,9 @@
           <a:lstStyle/>
           <a:p>
             <a:r>
-              <a:rPr lang="en-US" smtClean="0"/>
+              <a:rPr lang="en-US"/>
               <a:t>Click to edit Master title style</a:t>
             </a:r>
-            <a:endParaRPr lang="en-US"/>
           </a:p>
         </p:txBody>
       </p:sp>
@@ -2730,38 +2717,37 @@
           <a:p>
             <a:pPr lvl="0"/>
             <a:r>
-              <a:rPr lang="en-US" smtClean="0"/>
+              <a:rPr lang="en-US"/>
               <a:t>Click to edit Master text styles</a:t>
             </a:r>
           </a:p>
           <a:p>
             <a:pPr lvl="1"/>
             <a:r>
-              <a:rPr lang="en-US" smtClean="0"/>
+              <a:rPr lang="en-US"/>
               <a:t>Second level</a:t>
             </a:r>
           </a:p>
           <a:p>
             <a:pPr lvl="2"/>
             <a:r>
-              <a:rPr lang="en-US" smtClean="0"/>
+              <a:rPr lang="en-US"/>
               <a:t>Third level</a:t>
             </a:r>
           </a:p>
           <a:p>
             <a:pPr lvl="3"/>
             <a:r>
-              <a:rPr lang="en-US" smtClean="0"/>
+              <a:rPr lang="en-US"/>
               <a:t>Fourth level</a:t>
             </a:r>
           </a:p>
           <a:p>
             <a:pPr lvl="4"/>
             <a:r>
-              <a:rPr lang="en-US" smtClean="0"/>
+              <a:rPr lang="en-US"/>
               <a:t>Fifth level</a:t>
             </a:r>
-            <a:endParaRPr lang="en-US"/>
           </a:p>
         </p:txBody>
       </p:sp>
@@ -2782,7 +2768,7 @@
           <a:p>
             <a:fld id="{9E9AFD63-10BD-4598-9E1E-9FFECB76D2D7}" type="datetimeFigureOut">
               <a:rPr lang="en-US" smtClean="0"/>
-              <a:t>3/2/2017</a:t>
+              <a:t>6/17/2019</a:t>
             </a:fld>
             <a:endParaRPr lang="en-US"/>
           </a:p>
@@ -2888,10 +2874,9 @@
           </a:lstStyle>
           <a:p>
             <a:r>
-              <a:rPr lang="en-US" smtClean="0"/>
+              <a:rPr lang="en-US"/>
               <a:t>Click to edit Master title style</a:t>
             </a:r>
-            <a:endParaRPr lang="en-US"/>
           </a:p>
         </p:txBody>
       </p:sp>
@@ -2956,10 +2941,9 @@
           </a:lstStyle>
           <a:p>
             <a:r>
-              <a:rPr lang="en-US" smtClean="0"/>
+              <a:rPr lang="en-US"/>
               <a:t>Drag picture to placeholder or click icon to add</a:t>
             </a:r>
-            <a:endParaRPr lang="en-US"/>
           </a:p>
         </p:txBody>
       </p:sp>
@@ -3025,7 +3009,7 @@
           <a:p>
             <a:pPr lvl="0"/>
             <a:r>
-              <a:rPr lang="en-US" smtClean="0"/>
+              <a:rPr lang="en-US"/>
               <a:t>Click to edit Master text styles</a:t>
             </a:r>
           </a:p>
@@ -3086,10 +3070,9 @@
           </a:lstStyle>
           <a:p>
             <a:r>
-              <a:rPr lang="en-US" smtClean="0"/>
+              <a:rPr lang="en-US"/>
               <a:t>Click to edit Master title style</a:t>
             </a:r>
-            <a:endParaRPr lang="en-US"/>
           </a:p>
         </p:txBody>
       </p:sp>
@@ -3206,7 +3189,7 @@
           <a:p>
             <a:pPr lvl="0"/>
             <a:r>
-              <a:rPr lang="en-US" smtClean="0"/>
+              <a:rPr lang="en-US"/>
               <a:t>Click to edit Master text styles</a:t>
             </a:r>
           </a:p>
@@ -3229,7 +3212,7 @@
           <a:p>
             <a:fld id="{9E9AFD63-10BD-4598-9E1E-9FFECB76D2D7}" type="datetimeFigureOut">
               <a:rPr lang="en-US" smtClean="0"/>
-              <a:t>3/2/2017</a:t>
+              <a:t>6/17/2019</a:t>
             </a:fld>
             <a:endParaRPr lang="en-US"/>
           </a:p>
@@ -3323,10 +3306,9 @@
           <a:lstStyle/>
           <a:p>
             <a:r>
-              <a:rPr lang="en-US" smtClean="0"/>
+              <a:rPr lang="en-US"/>
               <a:t>Click to edit Master title style</a:t>
             </a:r>
-            <a:endParaRPr lang="en-US"/>
           </a:p>
         </p:txBody>
       </p:sp>
@@ -3380,38 +3362,37 @@
           <a:p>
             <a:pPr lvl="0"/>
             <a:r>
-              <a:rPr lang="en-US" smtClean="0"/>
+              <a:rPr lang="en-US"/>
               <a:t>Click to edit Master text styles</a:t>
             </a:r>
           </a:p>
           <a:p>
             <a:pPr lvl="1"/>
             <a:r>
-              <a:rPr lang="en-US" smtClean="0"/>
+              <a:rPr lang="en-US"/>
               <a:t>Second level</a:t>
             </a:r>
           </a:p>
           <a:p>
             <a:pPr lvl="2"/>
             <a:r>
-              <a:rPr lang="en-US" smtClean="0"/>
+              <a:rPr lang="en-US"/>
               <a:t>Third level</a:t>
             </a:r>
           </a:p>
           <a:p>
             <a:pPr lvl="3"/>
             <a:r>
-              <a:rPr lang="en-US" smtClean="0"/>
+              <a:rPr lang="en-US"/>
               <a:t>Fourth level</a:t>
             </a:r>
           </a:p>
           <a:p>
             <a:pPr lvl="4"/>
             <a:r>
-              <a:rPr lang="en-US" smtClean="0"/>
+              <a:rPr lang="en-US"/>
               <a:t>Fifth level</a:t>
             </a:r>
-            <a:endParaRPr lang="en-US"/>
           </a:p>
         </p:txBody>
       </p:sp>
@@ -3465,38 +3446,37 @@
           <a:p>
             <a:pPr lvl="0"/>
             <a:r>
-              <a:rPr lang="en-US" smtClean="0"/>
+              <a:rPr lang="en-US"/>
               <a:t>Click to edit Master text styles</a:t>
             </a:r>
           </a:p>
           <a:p>
             <a:pPr lvl="1"/>
             <a:r>
-              <a:rPr lang="en-US" smtClean="0"/>
+              <a:rPr lang="en-US"/>
               <a:t>Second level</a:t>
             </a:r>
           </a:p>
           <a:p>
             <a:pPr lvl="2"/>
             <a:r>
-              <a:rPr lang="en-US" smtClean="0"/>
+              <a:rPr lang="en-US"/>
               <a:t>Third level</a:t>
             </a:r>
           </a:p>
           <a:p>
             <a:pPr lvl="3"/>
             <a:r>
-              <a:rPr lang="en-US" smtClean="0"/>
+              <a:rPr lang="en-US"/>
               <a:t>Fourth level</a:t>
             </a:r>
           </a:p>
           <a:p>
             <a:pPr lvl="4"/>
             <a:r>
-              <a:rPr lang="en-US" smtClean="0"/>
+              <a:rPr lang="en-US"/>
               <a:t>Fifth level</a:t>
             </a:r>
-            <a:endParaRPr lang="en-US"/>
           </a:p>
         </p:txBody>
       </p:sp>
@@ -3517,7 +3497,7 @@
           <a:p>
             <a:fld id="{9E9AFD63-10BD-4598-9E1E-9FFECB76D2D7}" type="datetimeFigureOut">
               <a:rPr lang="en-US" smtClean="0"/>
-              <a:t>3/2/2017</a:t>
+              <a:t>6/17/2019</a:t>
             </a:fld>
             <a:endParaRPr lang="en-US"/>
           </a:p>
@@ -3615,10 +3595,9 @@
           </a:lstStyle>
           <a:p>
             <a:r>
-              <a:rPr lang="en-US" smtClean="0"/>
+              <a:rPr lang="en-US"/>
               <a:t>Click to edit Master title style</a:t>
             </a:r>
-            <a:endParaRPr lang="en-US"/>
           </a:p>
         </p:txBody>
       </p:sp>
@@ -3681,7 +3660,7 @@
           <a:p>
             <a:pPr lvl="0"/>
             <a:r>
-              <a:rPr lang="en-US" smtClean="0"/>
+              <a:rPr lang="en-US"/>
               <a:t>Click to edit Master text styles</a:t>
             </a:r>
           </a:p>
@@ -3737,38 +3716,37 @@
           <a:p>
             <a:pPr lvl="0"/>
             <a:r>
-              <a:rPr lang="en-US" smtClean="0"/>
+              <a:rPr lang="en-US"/>
               <a:t>Click to edit Master text styles</a:t>
             </a:r>
           </a:p>
           <a:p>
             <a:pPr lvl="1"/>
             <a:r>
-              <a:rPr lang="en-US" smtClean="0"/>
+              <a:rPr lang="en-US"/>
               <a:t>Second level</a:t>
             </a:r>
           </a:p>
           <a:p>
             <a:pPr lvl="2"/>
             <a:r>
-              <a:rPr lang="en-US" smtClean="0"/>
+              <a:rPr lang="en-US"/>
               <a:t>Third level</a:t>
             </a:r>
           </a:p>
           <a:p>
             <a:pPr lvl="3"/>
             <a:r>
-              <a:rPr lang="en-US" smtClean="0"/>
+              <a:rPr lang="en-US"/>
               <a:t>Fourth level</a:t>
             </a:r>
           </a:p>
           <a:p>
             <a:pPr lvl="4"/>
             <a:r>
-              <a:rPr lang="en-US" smtClean="0"/>
+              <a:rPr lang="en-US"/>
               <a:t>Fifth level</a:t>
             </a:r>
-            <a:endParaRPr lang="en-US"/>
           </a:p>
         </p:txBody>
       </p:sp>
@@ -3831,7 +3809,7 @@
           <a:p>
             <a:pPr lvl="0"/>
             <a:r>
-              <a:rPr lang="en-US" smtClean="0"/>
+              <a:rPr lang="en-US"/>
               <a:t>Click to edit Master text styles</a:t>
             </a:r>
           </a:p>
@@ -3887,38 +3865,37 @@
           <a:p>
             <a:pPr lvl="0"/>
             <a:r>
-              <a:rPr lang="en-US" smtClean="0"/>
+              <a:rPr lang="en-US"/>
               <a:t>Click to edit Master text styles</a:t>
             </a:r>
           </a:p>
           <a:p>
             <a:pPr lvl="1"/>
             <a:r>
-              <a:rPr lang="en-US" smtClean="0"/>
+              <a:rPr lang="en-US"/>
               <a:t>Second level</a:t>
             </a:r>
           </a:p>
           <a:p>
             <a:pPr lvl="2"/>
             <a:r>
-              <a:rPr lang="en-US" smtClean="0"/>
+              <a:rPr lang="en-US"/>
               <a:t>Third level</a:t>
             </a:r>
           </a:p>
           <a:p>
             <a:pPr lvl="3"/>
             <a:r>
-              <a:rPr lang="en-US" smtClean="0"/>
+              <a:rPr lang="en-US"/>
               <a:t>Fourth level</a:t>
             </a:r>
           </a:p>
           <a:p>
             <a:pPr lvl="4"/>
             <a:r>
-              <a:rPr lang="en-US" smtClean="0"/>
+              <a:rPr lang="en-US"/>
               <a:t>Fifth level</a:t>
             </a:r>
-            <a:endParaRPr lang="en-US"/>
           </a:p>
         </p:txBody>
       </p:sp>
@@ -3939,7 +3916,7 @@
           <a:p>
             <a:fld id="{9E9AFD63-10BD-4598-9E1E-9FFECB76D2D7}" type="datetimeFigureOut">
               <a:rPr lang="en-US" smtClean="0"/>
-              <a:t>3/2/2017</a:t>
+              <a:t>6/17/2019</a:t>
             </a:fld>
             <a:endParaRPr lang="en-US"/>
           </a:p>
@@ -4033,10 +4010,9 @@
           <a:lstStyle/>
           <a:p>
             <a:r>
-              <a:rPr lang="en-US" smtClean="0"/>
+              <a:rPr lang="en-US"/>
               <a:t>Click to edit Master title style</a:t>
             </a:r>
-            <a:endParaRPr lang="en-US"/>
           </a:p>
         </p:txBody>
       </p:sp>
@@ -4057,7 +4033,7 @@
           <a:p>
             <a:fld id="{9E9AFD63-10BD-4598-9E1E-9FFECB76D2D7}" type="datetimeFigureOut">
               <a:rPr lang="en-US" smtClean="0"/>
-              <a:t>3/2/2017</a:t>
+              <a:t>6/17/2019</a:t>
             </a:fld>
             <a:endParaRPr lang="en-US"/>
           </a:p>
@@ -4152,7 +4128,7 @@
           <a:p>
             <a:fld id="{9E9AFD63-10BD-4598-9E1E-9FFECB76D2D7}" type="datetimeFigureOut">
               <a:rPr lang="en-US" smtClean="0"/>
-              <a:t>3/2/2017</a:t>
+              <a:t>6/17/2019</a:t>
             </a:fld>
             <a:endParaRPr lang="en-US"/>
           </a:p>
@@ -4255,10 +4231,9 @@
           </a:lstStyle>
           <a:p>
             <a:r>
-              <a:rPr lang="en-US" smtClean="0"/>
+              <a:rPr lang="en-US"/>
               <a:t>Click to edit Master title style</a:t>
             </a:r>
-            <a:endParaRPr lang="en-US"/>
           </a:p>
         </p:txBody>
       </p:sp>
@@ -4312,38 +4287,37 @@
           <a:p>
             <a:pPr lvl="0"/>
             <a:r>
-              <a:rPr lang="en-US" smtClean="0"/>
+              <a:rPr lang="en-US"/>
               <a:t>Click to edit Master text styles</a:t>
             </a:r>
           </a:p>
           <a:p>
             <a:pPr lvl="1"/>
             <a:r>
-              <a:rPr lang="en-US" smtClean="0"/>
+              <a:rPr lang="en-US"/>
               <a:t>Second level</a:t>
             </a:r>
           </a:p>
           <a:p>
             <a:pPr lvl="2"/>
             <a:r>
-              <a:rPr lang="en-US" smtClean="0"/>
+              <a:rPr lang="en-US"/>
               <a:t>Third level</a:t>
             </a:r>
           </a:p>
           <a:p>
             <a:pPr lvl="3"/>
             <a:r>
-              <a:rPr lang="en-US" smtClean="0"/>
+              <a:rPr lang="en-US"/>
               <a:t>Fourth level</a:t>
             </a:r>
           </a:p>
           <a:p>
             <a:pPr lvl="4"/>
             <a:r>
-              <a:rPr lang="en-US" smtClean="0"/>
+              <a:rPr lang="en-US"/>
               <a:t>Fifth level</a:t>
             </a:r>
-            <a:endParaRPr lang="en-US"/>
           </a:p>
         </p:txBody>
       </p:sp>
@@ -4406,7 +4380,7 @@
           <a:p>
             <a:pPr lvl="0"/>
             <a:r>
-              <a:rPr lang="en-US" smtClean="0"/>
+              <a:rPr lang="en-US"/>
               <a:t>Click to edit Master text styles</a:t>
             </a:r>
           </a:p>
@@ -4429,7 +4403,7 @@
           <a:p>
             <a:fld id="{9E9AFD63-10BD-4598-9E1E-9FFECB76D2D7}" type="datetimeFigureOut">
               <a:rPr lang="en-US" smtClean="0"/>
-              <a:t>3/2/2017</a:t>
+              <a:t>6/17/2019</a:t>
             </a:fld>
             <a:endParaRPr lang="en-US"/>
           </a:p>
@@ -4532,10 +4506,9 @@
           </a:lstStyle>
           <a:p>
             <a:r>
-              <a:rPr lang="en-US" smtClean="0"/>
+              <a:rPr lang="en-US"/>
               <a:t>Click to edit Master title style</a:t>
             </a:r>
-            <a:endParaRPr lang="en-US"/>
           </a:p>
         </p:txBody>
       </p:sp>
@@ -4659,7 +4632,7 @@
           <a:p>
             <a:pPr lvl="0"/>
             <a:r>
-              <a:rPr lang="en-US" smtClean="0"/>
+              <a:rPr lang="en-US"/>
               <a:t>Click to edit Master text styles</a:t>
             </a:r>
           </a:p>
@@ -4682,7 +4655,7 @@
           <a:p>
             <a:fld id="{9E9AFD63-10BD-4598-9E1E-9FFECB76D2D7}" type="datetimeFigureOut">
               <a:rPr lang="en-US" smtClean="0"/>
-              <a:t>3/2/2017</a:t>
+              <a:t>6/17/2019</a:t>
             </a:fld>
             <a:endParaRPr lang="en-US"/>
           </a:p>
@@ -4791,10 +4764,9 @@
           <a:lstStyle/>
           <a:p>
             <a:r>
-              <a:rPr lang="en-US" smtClean="0"/>
+              <a:rPr lang="en-US"/>
               <a:t>Click to edit Master title style</a:t>
             </a:r>
-            <a:endParaRPr lang="en-US"/>
           </a:p>
         </p:txBody>
       </p:sp>
@@ -4825,38 +4797,37 @@
           <a:p>
             <a:pPr lvl="0"/>
             <a:r>
-              <a:rPr lang="en-US" smtClean="0"/>
+              <a:rPr lang="en-US"/>
               <a:t>Click to edit Master text styles</a:t>
             </a:r>
           </a:p>
           <a:p>
             <a:pPr lvl="1"/>
             <a:r>
-              <a:rPr lang="en-US" smtClean="0"/>
+              <a:rPr lang="en-US"/>
               <a:t>Second level</a:t>
             </a:r>
           </a:p>
           <a:p>
             <a:pPr lvl="2"/>
             <a:r>
-              <a:rPr lang="en-US" smtClean="0"/>
+              <a:rPr lang="en-US"/>
               <a:t>Third level</a:t>
             </a:r>
           </a:p>
           <a:p>
             <a:pPr lvl="3"/>
             <a:r>
-              <a:rPr lang="en-US" smtClean="0"/>
+              <a:rPr lang="en-US"/>
               <a:t>Fourth level</a:t>
             </a:r>
           </a:p>
           <a:p>
             <a:pPr lvl="4"/>
             <a:r>
-              <a:rPr lang="en-US" smtClean="0"/>
+              <a:rPr lang="en-US"/>
               <a:t>Fifth level</a:t>
             </a:r>
-            <a:endParaRPr lang="en-US"/>
           </a:p>
         </p:txBody>
       </p:sp>
@@ -4895,7 +4866,7 @@
           <a:p>
             <a:fld id="{9E9AFD63-10BD-4598-9E1E-9FFECB76D2D7}" type="datetimeFigureOut">
               <a:rPr lang="en-US" smtClean="0"/>
-              <a:t>3/2/2017</a:t>
+              <a:t>6/17/2019</a:t>
             </a:fld>
             <a:endParaRPr lang="en-US"/>
           </a:p>
@@ -5391,10 +5362,10 @@
                 <a:ea typeface="ＭＳ Ｐゴシック" pitchFamily="-106" charset="-128"/>
                 <a:cs typeface="ＭＳ Ｐゴシック" pitchFamily="-106" charset="-128"/>
               </a:rPr>
-              <a:t>Copyright </a:t>
+              <a:t>Copyright 2014. All rights reserved. Applied </a:t>
             </a:r>
             <a:r>
-              <a:rPr lang="en-US" sz="600" dirty="0" smtClean="0">
+              <a:rPr lang="en-US" sz="600" dirty="0" err="1">
                 <a:solidFill>
                   <a:prstClr val="black">
                     <a:lumMod val="65000"/>
@@ -5406,7 +5377,7 @@
                 <a:ea typeface="ＭＳ Ｐゴシック" pitchFamily="-106" charset="-128"/>
                 <a:cs typeface="ＭＳ Ｐゴシック" pitchFamily="-106" charset="-128"/>
               </a:rPr>
-              <a:t>2014. </a:t>
+              <a:t>ReArch</a:t>
             </a:r>
             <a:r>
               <a:rPr lang="en-US" sz="600" dirty="0">
@@ -5421,52 +5392,7 @@
                 <a:ea typeface="ＭＳ Ｐゴシック" pitchFamily="-106" charset="-128"/>
                 <a:cs typeface="ＭＳ Ｐゴシック" pitchFamily="-106" charset="-128"/>
               </a:rPr>
-              <a:t>All rights reserved. Applied </a:t>
-            </a:r>
-            <a:r>
-              <a:rPr lang="en-US" sz="600" dirty="0" err="1" smtClean="0">
-                <a:solidFill>
-                  <a:prstClr val="black">
-                    <a:lumMod val="65000"/>
-                    <a:lumOff val="35000"/>
-                    <a:alpha val="30000"/>
-                  </a:prstClr>
-                </a:solidFill>
-                <a:latin typeface="Arial" pitchFamily="-108" charset="0"/>
-                <a:ea typeface="ＭＳ Ｐゴシック" pitchFamily="-106" charset="-128"/>
-                <a:cs typeface="ＭＳ Ｐゴシック" pitchFamily="-106" charset="-128"/>
-              </a:rPr>
-              <a:t>ReArch</a:t>
-            </a:r>
-            <a:r>
-              <a:rPr lang="en-US" sz="600" dirty="0" smtClean="0">
-                <a:solidFill>
-                  <a:prstClr val="black">
-                    <a:lumMod val="65000"/>
-                    <a:lumOff val="35000"/>
-                    <a:alpha val="30000"/>
-                  </a:prstClr>
-                </a:solidFill>
-                <a:latin typeface="Arial" pitchFamily="-108" charset="0"/>
-                <a:ea typeface="ＭＳ Ｐゴシック" pitchFamily="-106" charset="-128"/>
-                <a:cs typeface="ＭＳ Ｐゴシック" pitchFamily="-106" charset="-128"/>
-              </a:rPr>
-              <a:t> </a:t>
-            </a:r>
-            <a:r>
-              <a:rPr lang="en-US" sz="600" dirty="0">
-                <a:solidFill>
-                  <a:prstClr val="black">
-                    <a:lumMod val="65000"/>
-                    <a:lumOff val="35000"/>
-                    <a:alpha val="30000"/>
-                  </a:prstClr>
-                </a:solidFill>
-                <a:latin typeface="Arial" pitchFamily="-108" charset="0"/>
-                <a:ea typeface="ＭＳ Ｐゴシック" pitchFamily="-106" charset="-128"/>
-                <a:cs typeface="ＭＳ Ｐゴシック" pitchFamily="-106" charset="-128"/>
-              </a:rPr>
-              <a:t>Associates, Inc.</a:t>
+              <a:t> Associates, Inc.</a:t>
             </a:r>
           </a:p>
         </p:txBody>
@@ -5549,35 +5475,35 @@
           <a:p>
             <a:pPr lvl="0"/>
             <a:r>
-              <a:rPr lang="en-US" smtClean="0"/>
+              <a:rPr lang="en-US"/>
               <a:t>Click to edit Master text styles</a:t>
             </a:r>
           </a:p>
           <a:p>
             <a:pPr lvl="1"/>
             <a:r>
-              <a:rPr lang="en-US" smtClean="0"/>
+              <a:rPr lang="en-US"/>
               <a:t>Second level</a:t>
             </a:r>
           </a:p>
           <a:p>
             <a:pPr lvl="2"/>
             <a:r>
-              <a:rPr lang="en-US" smtClean="0"/>
+              <a:rPr lang="en-US"/>
               <a:t>Third level</a:t>
             </a:r>
           </a:p>
           <a:p>
             <a:pPr lvl="3"/>
             <a:r>
-              <a:rPr lang="en-US" smtClean="0"/>
+              <a:rPr lang="en-US"/>
               <a:t>Fourth level</a:t>
             </a:r>
           </a:p>
           <a:p>
             <a:pPr lvl="4"/>
             <a:r>
-              <a:rPr lang="en-US" smtClean="0"/>
+              <a:rPr lang="en-US"/>
               <a:t>Fifth level</a:t>
             </a:r>
             <a:endParaRPr lang="en-US" dirty="0"/>
@@ -5610,7 +5536,7 @@
           <a:lstStyle/>
           <a:p>
             <a:r>
-              <a:rPr lang="en-US" smtClean="0"/>
+              <a:rPr lang="en-US"/>
               <a:t>Click to edit Master title style</a:t>
             </a:r>
             <a:endParaRPr lang="en-US" dirty="0"/>
@@ -6193,7 +6119,7 @@
             <a:p>
               <a:pPr algn="ctr"/>
               <a:r>
-                <a:rPr lang="en-US" sz="1050" b="1" u="sng" dirty="0" smtClean="0">
+                <a:rPr lang="en-US" sz="1050" b="1" u="sng" dirty="0">
                   <a:solidFill>
                     <a:prstClr val="white"/>
                   </a:solidFill>
@@ -6207,10 +6133,10 @@
                 <a:buChar char="•"/>
               </a:pPr>
               <a:r>
-                <a:rPr lang="en-US" sz="1050" dirty="0" err="1" smtClean="0"/>
+                <a:rPr lang="en-US" sz="1050" dirty="0" err="1"/>
                 <a:t>UpdatePleuralCompliance</a:t>
               </a:r>
-              <a:endParaRPr lang="en-US" sz="1050" dirty="0" smtClean="0"/>
+              <a:endParaRPr lang="en-US" sz="1050" dirty="0"/>
             </a:p>
             <a:p>
               <a:pPr marL="171450" indent="-171450">
@@ -6218,7 +6144,7 @@
                 <a:buChar char="•"/>
               </a:pPr>
               <a:r>
-                <a:rPr lang="en-US" sz="1050" dirty="0" err="1" smtClean="0"/>
+                <a:rPr lang="en-US" sz="1050" dirty="0" err="1"/>
                 <a:t>ProcessAerosolSubstances</a:t>
               </a:r>
               <a:endParaRPr lang="en-US" sz="1050" dirty="0"/>
@@ -6229,7 +6155,7 @@
                 <a:buChar char="•"/>
               </a:pPr>
               <a:r>
-                <a:rPr lang="en-US" sz="1050" dirty="0" err="1" smtClean="0"/>
+                <a:rPr lang="en-US" sz="1050" dirty="0" err="1"/>
                 <a:t>AirwayObstruction</a:t>
               </a:r>
               <a:endParaRPr lang="en-US" sz="1050" dirty="0"/>
@@ -6240,7 +6166,7 @@
                 <a:buChar char="•"/>
               </a:pPr>
               <a:r>
-                <a:rPr lang="en-US" sz="1050" dirty="0" err="1" smtClean="0"/>
+                <a:rPr lang="en-US" sz="1050" dirty="0" err="1"/>
                 <a:t>UpdateObstructiveResistance</a:t>
               </a:r>
               <a:endParaRPr lang="en-US" sz="1050" dirty="0"/>
@@ -6251,10 +6177,10 @@
                 <a:buChar char="•"/>
               </a:pPr>
               <a:r>
-                <a:rPr lang="en-US" sz="1050" dirty="0" err="1" smtClean="0"/>
+                <a:rPr lang="en-US" sz="1050" dirty="0" err="1"/>
                 <a:t>BronchoConstriction</a:t>
               </a:r>
-              <a:endParaRPr lang="en-US" sz="1050" dirty="0" smtClean="0"/>
+              <a:endParaRPr lang="en-US" sz="1050" dirty="0"/>
             </a:p>
             <a:p>
               <a:pPr marL="171450" indent="-171450">
@@ -6262,7 +6188,7 @@
                 <a:buChar char="•"/>
               </a:pPr>
               <a:r>
-                <a:rPr lang="en-US" sz="1050" dirty="0" err="1" smtClean="0"/>
+                <a:rPr lang="en-US" sz="1050" dirty="0" err="1"/>
                 <a:t>BronchoDilation</a:t>
               </a:r>
               <a:endParaRPr lang="en-US" sz="1050" dirty="0"/>
@@ -6273,10 +6199,9 @@
                 <a:buChar char="•"/>
               </a:pPr>
               <a:r>
-                <a:rPr lang="en-US" sz="1050" dirty="0" smtClean="0"/>
+                <a:rPr lang="en-US" sz="1050" dirty="0"/>
                 <a:t>Intubation</a:t>
               </a:r>
-              <a:endParaRPr lang="en-US" sz="1050" dirty="0"/>
             </a:p>
             <a:p>
               <a:pPr marL="171450" indent="-171450">
@@ -6284,7 +6209,7 @@
                 <a:buChar char="•"/>
               </a:pPr>
               <a:r>
-                <a:rPr lang="en-US" sz="1050" dirty="0" smtClean="0"/>
+                <a:rPr lang="en-US" sz="1050" dirty="0"/>
                 <a:t>Pneumothorax</a:t>
               </a:r>
             </a:p>
@@ -6294,10 +6219,10 @@
                 <a:buChar char="•"/>
               </a:pPr>
               <a:r>
-                <a:rPr lang="en-US" sz="1050" dirty="0" err="1" smtClean="0"/>
+                <a:rPr lang="en-US" sz="1050" dirty="0" err="1"/>
                 <a:t>DoLeftNeedleDecompression</a:t>
               </a:r>
-              <a:endParaRPr lang="en-US" sz="1050" dirty="0" smtClean="0"/>
+              <a:endParaRPr lang="en-US" sz="1050" dirty="0"/>
             </a:p>
             <a:p>
               <a:pPr marL="628650" lvl="1" indent="-171450">
@@ -6305,7 +6230,7 @@
                 <a:buChar char="•"/>
               </a:pPr>
               <a:r>
-                <a:rPr lang="en-US" sz="1050" dirty="0" err="1" smtClean="0"/>
+                <a:rPr lang="en-US" sz="1050" dirty="0" err="1"/>
                 <a:t>DoRightNeedleDecompression</a:t>
               </a:r>
               <a:endParaRPr lang="en-US" sz="1050" dirty="0"/>
@@ -6316,10 +6241,10 @@
                 <a:buChar char="•"/>
               </a:pPr>
               <a:r>
-                <a:rPr lang="en-US" sz="1050" dirty="0" err="1" smtClean="0"/>
+                <a:rPr lang="en-US" sz="1050" dirty="0" err="1"/>
                 <a:t>ConsciousRespiration</a:t>
               </a:r>
-              <a:endParaRPr lang="en-US" sz="1050" dirty="0" smtClean="0"/>
+              <a:endParaRPr lang="en-US" sz="1050" dirty="0"/>
             </a:p>
             <a:p>
               <a:pPr marL="628650" lvl="1" indent="-171450">
@@ -6327,7 +6252,7 @@
                 <a:buChar char="•"/>
               </a:pPr>
               <a:r>
-                <a:rPr lang="en-US" sz="1050" dirty="0" err="1" smtClean="0"/>
+                <a:rPr lang="en-US" sz="1050" dirty="0" err="1"/>
                 <a:t>ProcessConsciousRespiration</a:t>
               </a:r>
               <a:endParaRPr lang="en-US" sz="1050" dirty="0"/>
@@ -6338,10 +6263,10 @@
                 <a:buChar char="•"/>
               </a:pPr>
               <a:r>
-                <a:rPr lang="en-US" sz="1050" dirty="0" err="1" smtClean="0"/>
+                <a:rPr lang="en-US" sz="1050" dirty="0" err="1"/>
                 <a:t>MechanicalVentilation</a:t>
               </a:r>
-              <a:endParaRPr lang="en-US" sz="1050" dirty="0" smtClean="0"/>
+              <a:endParaRPr lang="en-US" sz="1050" dirty="0"/>
             </a:p>
             <a:p>
               <a:pPr marL="171450" indent="-171450">
@@ -6349,10 +6274,10 @@
                 <a:buChar char="•"/>
               </a:pPr>
               <a:r>
-                <a:rPr lang="en-US" sz="1050" dirty="0" err="1" smtClean="0"/>
+                <a:rPr lang="en-US" sz="1050" dirty="0" err="1"/>
                 <a:t>RespiratoryDriver</a:t>
               </a:r>
-              <a:endParaRPr lang="en-US" sz="1050" dirty="0" smtClean="0"/>
+              <a:endParaRPr lang="en-US" sz="1050" dirty="0"/>
             </a:p>
             <a:p>
               <a:pPr marL="628650" lvl="1" indent="-171450">
@@ -6360,14 +6285,14 @@
                 <a:buChar char="•"/>
               </a:pPr>
               <a:r>
-                <a:rPr lang="en-US" sz="1050" dirty="0" err="1" smtClean="0">
+                <a:rPr lang="en-US" sz="1050" dirty="0" err="1">
                   <a:solidFill>
                     <a:prstClr val="white"/>
                   </a:solidFill>
                 </a:rPr>
                 <a:t>UpdateIERatio</a:t>
               </a:r>
-              <a:endParaRPr lang="en-US" sz="1050" dirty="0" smtClean="0">
+              <a:endParaRPr lang="en-US" sz="1050" dirty="0">
                 <a:solidFill>
                   <a:prstClr val="white"/>
                 </a:solidFill>
@@ -6379,7 +6304,7 @@
                 <a:buChar char="•"/>
               </a:pPr>
               <a:r>
-                <a:rPr lang="en-US" sz="1050" dirty="0" err="1" smtClean="0">
+                <a:rPr lang="en-US" sz="1050" dirty="0" err="1">
                   <a:solidFill>
                     <a:prstClr val="white"/>
                   </a:solidFill>
@@ -6398,7 +6323,7 @@
                 <a:buChar char="•"/>
               </a:pPr>
               <a:r>
-                <a:rPr lang="en-US" sz="1050" dirty="0" smtClean="0">
+                <a:rPr lang="en-US" sz="1050" dirty="0">
                   <a:solidFill>
                     <a:prstClr val="white"/>
                   </a:solidFill>
@@ -6445,7 +6370,7 @@
             <a:p>
               <a:pPr algn="ctr"/>
               <a:r>
-                <a:rPr lang="en-US" sz="1050" b="1" u="sng" dirty="0" smtClean="0">
+                <a:rPr lang="en-US" sz="1050" b="1" u="sng" dirty="0">
                   <a:solidFill>
                     <a:prstClr val="white"/>
                   </a:solidFill>
@@ -6459,10 +6384,10 @@
                 <a:buChar char="•"/>
               </a:pPr>
               <a:r>
-                <a:rPr lang="en-US" sz="1050" dirty="0" err="1" smtClean="0"/>
+                <a:rPr lang="en-US" sz="1050" dirty="0" err="1"/>
                 <a:t>ProcessCircuit</a:t>
               </a:r>
-              <a:endParaRPr lang="en-US" sz="1050" dirty="0" smtClean="0"/>
+              <a:endParaRPr lang="en-US" sz="1050" dirty="0"/>
             </a:p>
             <a:p>
               <a:pPr marL="119063" indent="-119063">
@@ -6470,10 +6395,10 @@
                 <a:buChar char="•"/>
               </a:pPr>
               <a:r>
-                <a:rPr lang="en-US" sz="1050" dirty="0" err="1" smtClean="0"/>
+                <a:rPr lang="en-US" sz="1050" dirty="0" err="1"/>
                 <a:t>TansportGraph</a:t>
               </a:r>
-              <a:endParaRPr lang="en-US" sz="1050" dirty="0" smtClean="0"/>
+              <a:endParaRPr lang="en-US" sz="1050" dirty="0"/>
             </a:p>
             <a:p>
               <a:pPr marL="119063" indent="-119063">
@@ -6481,7 +6406,7 @@
                 <a:buChar char="•"/>
               </a:pPr>
               <a:r>
-                <a:rPr lang="en-US" sz="1050" dirty="0" err="1" smtClean="0"/>
+                <a:rPr lang="en-US" sz="1050" dirty="0" err="1"/>
                 <a:t>CalculateVitalSigns</a:t>
               </a:r>
               <a:endParaRPr lang="en-US" sz="1050" dirty="0">
@@ -6529,14 +6454,14 @@
             <a:p>
               <a:pPr algn="ctr"/>
               <a:r>
-                <a:rPr lang="en-US" sz="1050" b="1" u="sng" dirty="0" err="1" smtClean="0">
+                <a:rPr lang="en-US" sz="1050" b="1" u="sng" dirty="0" err="1">
                   <a:solidFill>
                     <a:prstClr val="white"/>
                   </a:solidFill>
                 </a:rPr>
                 <a:t>PostProcess</a:t>
               </a:r>
-              <a:endParaRPr lang="en-US" sz="1050" b="1" u="sng" dirty="0" smtClean="0">
+              <a:endParaRPr lang="en-US" sz="1050" b="1" u="sng" dirty="0">
                 <a:solidFill>
                   <a:prstClr val="white"/>
                 </a:solidFill>
@@ -6548,10 +6473,10 @@
                 <a:buChar char="•"/>
               </a:pPr>
               <a:r>
-                <a:rPr lang="en-US" sz="1050" dirty="0" err="1" smtClean="0"/>
+                <a:rPr lang="en-US" sz="1050" dirty="0" err="1"/>
                 <a:t>PostProcessCircuit</a:t>
               </a:r>
-              <a:endParaRPr lang="en-US" sz="1050" dirty="0" smtClean="0"/>
+              <a:endParaRPr lang="en-US" sz="1050" dirty="0"/>
             </a:p>
           </p:txBody>
         </p:sp>
@@ -6592,7 +6517,7 @@
             <a:p>
               <a:pPr algn="ctr"/>
               <a:r>
-                <a:rPr lang="en-US" sz="1050" b="1" u="sng" dirty="0" smtClean="0">
+                <a:rPr lang="en-US" sz="1050" b="1" u="sng" dirty="0">
                   <a:solidFill>
                     <a:prstClr val="white"/>
                   </a:solidFill>
@@ -6606,10 +6531,10 @@
                 <a:buChar char="•"/>
               </a:pPr>
               <a:r>
-                <a:rPr lang="en-US" sz="1050" dirty="0" err="1" smtClean="0"/>
+                <a:rPr lang="en-US" sz="1050" dirty="0" err="1"/>
                 <a:t>LobarPneumonia</a:t>
               </a:r>
-              <a:endParaRPr lang="en-US" sz="1050" dirty="0" smtClean="0"/>
+              <a:endParaRPr lang="en-US" sz="1050" dirty="0"/>
             </a:p>
             <a:p>
               <a:pPr marL="344488" lvl="1" indent="-111125">
@@ -6636,14 +6561,14 @@
                 <a:buChar char="•"/>
               </a:pPr>
               <a:r>
-                <a:rPr lang="en-US" sz="1050" dirty="0" err="1" smtClean="0">
+                <a:rPr lang="en-US" sz="1050" dirty="0" err="1">
                   <a:solidFill>
                     <a:prstClr val="white"/>
                   </a:solidFill>
                 </a:rPr>
                 <a:t>UpdateGasDiffusionSurfaceArea</a:t>
               </a:r>
-              <a:endParaRPr lang="en-US" sz="1050" dirty="0" smtClean="0">
+              <a:endParaRPr lang="en-US" sz="1050" dirty="0">
                 <a:solidFill>
                   <a:prstClr val="white"/>
                 </a:solidFill>
@@ -6655,7 +6580,7 @@
                 <a:buChar char="•"/>
               </a:pPr>
               <a:r>
-                <a:rPr lang="en-US" sz="1050" dirty="0" smtClean="0">
+                <a:rPr lang="en-US" sz="1050" dirty="0">
                   <a:solidFill>
                     <a:prstClr val="white"/>
                   </a:solidFill>
@@ -6669,14 +6594,14 @@
                 <a:buChar char="•"/>
               </a:pPr>
               <a:r>
-                <a:rPr lang="en-US" sz="1050" dirty="0" err="1" smtClean="0">
+                <a:rPr lang="en-US" sz="1050" dirty="0" err="1">
                   <a:solidFill>
                     <a:prstClr val="white"/>
                   </a:solidFill>
                 </a:rPr>
                 <a:t>UpdatePulmonaryCapillaryResistance</a:t>
               </a:r>
-              <a:endParaRPr lang="en-US" sz="1050" dirty="0" smtClean="0">
+              <a:endParaRPr lang="en-US" sz="1050" dirty="0">
                 <a:solidFill>
                   <a:prstClr val="white"/>
                 </a:solidFill>
@@ -6688,14 +6613,14 @@
                 <a:buChar char="•"/>
               </a:pPr>
               <a:r>
-                <a:rPr lang="en-US" sz="1050" dirty="0" err="1" smtClean="0">
+                <a:rPr lang="en-US" sz="1050" dirty="0" err="1">
                   <a:solidFill>
                     <a:prstClr val="white"/>
                   </a:solidFill>
                 </a:rPr>
                 <a:t>UpdateAlveoliCompliance</a:t>
               </a:r>
-              <a:endParaRPr lang="en-US" sz="1050" dirty="0" smtClean="0">
+              <a:endParaRPr lang="en-US" sz="1050" dirty="0">
                 <a:solidFill>
                   <a:prstClr val="white"/>
                 </a:solidFill>
@@ -6707,14 +6632,14 @@
                 <a:buChar char="•"/>
               </a:pPr>
               <a:r>
-                <a:rPr lang="en-US" sz="1050" dirty="0" err="1" smtClean="0">
+                <a:rPr lang="en-US" sz="1050" dirty="0" err="1">
                   <a:solidFill>
                     <a:prstClr val="white"/>
                   </a:solidFill>
                 </a:rPr>
                 <a:t>UpdateGasDiffusionSurfaceArea</a:t>
               </a:r>
-              <a:endParaRPr lang="en-US" sz="1050" dirty="0" smtClean="0">
+              <a:endParaRPr lang="en-US" sz="1050" dirty="0">
                 <a:solidFill>
                   <a:prstClr val="white"/>
                 </a:solidFill>
@@ -6726,7 +6651,7 @@
                 <a:buChar char="•"/>
               </a:pPr>
               <a:r>
-                <a:rPr lang="en-US" sz="1050" dirty="0" err="1" smtClean="0">
+                <a:rPr lang="en-US" sz="1050" dirty="0" err="1">
                   <a:solidFill>
                     <a:prstClr val="white"/>
                   </a:solidFill>
@@ -6916,7 +6841,7 @@
             <a:p>
               <a:pPr algn="ctr"/>
               <a:r>
-                <a:rPr lang="en-US" sz="1050" b="1" u="sng" dirty="0" smtClean="0">
+                <a:rPr lang="en-US" sz="1050" b="1" u="sng" dirty="0">
                   <a:solidFill>
                     <a:prstClr val="white"/>
                   </a:solidFill>
@@ -6930,7 +6855,7 @@
                 <a:buChar char="•"/>
               </a:pPr>
               <a:r>
-                <a:rPr lang="en-US" sz="1050" dirty="0" err="1" smtClean="0"/>
+                <a:rPr lang="en-US" sz="1050" dirty="0" err="1"/>
                 <a:t>CalculatePulmonaryFunctionTest</a:t>
               </a:r>
               <a:endParaRPr lang="en-US" sz="1050" dirty="0">
@@ -6952,13 +6877,6 @@
   <p:clrMapOvr>
     <a:masterClrMapping/>
   </p:clrMapOvr>
-  <p:timing>
-    <p:tnLst>
-      <p:par>
-        <p:cTn id="1" dur="indefinite" restart="never" nodeType="tmRoot"/>
-      </p:par>
-    </p:tnLst>
-  </p:timing>
 </p:sld>
 </file>
 
@@ -7339,6 +7257,231 @@
 </p:sld>
 </file>
 
+<file path=ppt/slides/slide13.xml><?xml version="1.0" encoding="utf-8"?>
+<p:sld xmlns:a="http://schemas.openxmlformats.org/drawingml/2006/main" xmlns:r="http://schemas.openxmlformats.org/officeDocument/2006/relationships" xmlns:p="http://schemas.openxmlformats.org/presentationml/2006/main">
+  <p:cSld>
+    <p:spTree>
+      <p:nvGrpSpPr>
+        <p:cNvPr id="1" name=""/>
+        <p:cNvGrpSpPr/>
+        <p:nvPr/>
+      </p:nvGrpSpPr>
+      <p:grpSpPr>
+        <a:xfrm>
+          <a:off x="0" y="0"/>
+          <a:ext cx="0" cy="0"/>
+          <a:chOff x="0" y="0"/>
+          <a:chExt cx="0" cy="0"/>
+        </a:xfrm>
+      </p:grpSpPr>
+      <p:pic>
+        <p:nvPicPr>
+          <p:cNvPr id="2" name="Picture 1">
+            <a:extLst>
+              <a:ext uri="{FF2B5EF4-FFF2-40B4-BE49-F238E27FC236}">
+                <a16:creationId xmlns:a16="http://schemas.microsoft.com/office/drawing/2014/main" id="{074E69B6-AA0C-45DD-B960-7366DAF92005}"/>
+              </a:ext>
+            </a:extLst>
+          </p:cNvPr>
+          <p:cNvPicPr>
+            <a:picLocks noChangeAspect="1"/>
+          </p:cNvPicPr>
+          <p:nvPr/>
+        </p:nvPicPr>
+        <p:blipFill rotWithShape="1">
+          <a:blip r:embed="rId2"/>
+          <a:srcRect l="5000" t="1773" r="65834" b="60154"/>
+          <a:stretch/>
+        </p:blipFill>
+        <p:spPr>
+          <a:xfrm>
+            <a:off x="38100" y="2985257"/>
+            <a:ext cx="2667000" cy="2286000"/>
+          </a:xfrm>
+          <a:prstGeom prst="rect">
+            <a:avLst/>
+          </a:prstGeom>
+        </p:spPr>
+      </p:pic>
+      <p:pic>
+        <p:nvPicPr>
+          <p:cNvPr id="3" name="Picture 2">
+            <a:extLst>
+              <a:ext uri="{FF2B5EF4-FFF2-40B4-BE49-F238E27FC236}">
+                <a16:creationId xmlns:a16="http://schemas.microsoft.com/office/drawing/2014/main" id="{2D7EA3AD-147B-4942-9585-9C0F6DD05A04}"/>
+              </a:ext>
+            </a:extLst>
+          </p:cNvPr>
+          <p:cNvPicPr>
+            <a:picLocks noChangeAspect="1"/>
+          </p:cNvPicPr>
+          <p:nvPr/>
+        </p:nvPicPr>
+        <p:blipFill rotWithShape="1">
+          <a:blip r:embed="rId2"/>
+          <a:srcRect l="62500" t="17767" b="30197"/>
+          <a:stretch/>
+        </p:blipFill>
+        <p:spPr>
+          <a:xfrm>
+            <a:off x="5410200" y="2209800"/>
+            <a:ext cx="3429000" cy="3124200"/>
+          </a:xfrm>
+          <a:prstGeom prst="rect">
+            <a:avLst/>
+          </a:prstGeom>
+        </p:spPr>
+      </p:pic>
+      <p:pic>
+        <p:nvPicPr>
+          <p:cNvPr id="4" name="Picture 3">
+            <a:extLst>
+              <a:ext uri="{FF2B5EF4-FFF2-40B4-BE49-F238E27FC236}">
+                <a16:creationId xmlns:a16="http://schemas.microsoft.com/office/drawing/2014/main" id="{83D330CC-57F1-490E-8D95-B0EBC7CA3E29}"/>
+              </a:ext>
+            </a:extLst>
+          </p:cNvPr>
+          <p:cNvPicPr>
+            <a:picLocks noChangeAspect="1"/>
+          </p:cNvPicPr>
+          <p:nvPr/>
+        </p:nvPicPr>
+        <p:blipFill rotWithShape="1">
+          <a:blip r:embed="rId2"/>
+          <a:srcRect l="5000" t="58380" r="64583"/>
+          <a:stretch/>
+        </p:blipFill>
+        <p:spPr>
+          <a:xfrm>
+            <a:off x="2705100" y="2878806"/>
+            <a:ext cx="2781300" cy="2498901"/>
+          </a:xfrm>
+          <a:prstGeom prst="rect">
+            <a:avLst/>
+          </a:prstGeom>
+        </p:spPr>
+      </p:pic>
+      <p:sp>
+        <p:nvSpPr>
+          <p:cNvPr id="5" name="TextBox 4">
+            <a:extLst>
+              <a:ext uri="{FF2B5EF4-FFF2-40B4-BE49-F238E27FC236}">
+                <a16:creationId xmlns:a16="http://schemas.microsoft.com/office/drawing/2014/main" id="{5DB82A9F-7B96-41D1-9326-B8AE8D92E7EF}"/>
+              </a:ext>
+            </a:extLst>
+          </p:cNvPr>
+          <p:cNvSpPr txBox="1"/>
+          <p:nvPr/>
+        </p:nvSpPr>
+        <p:spPr>
+          <a:xfrm>
+            <a:off x="825617" y="1828800"/>
+            <a:ext cx="1091966" cy="276999"/>
+          </a:xfrm>
+          <a:prstGeom prst="rect">
+            <a:avLst/>
+          </a:prstGeom>
+          <a:noFill/>
+        </p:spPr>
+        <p:txBody>
+          <a:bodyPr wrap="none" rtlCol="0">
+            <a:spAutoFit/>
+          </a:bodyPr>
+          <a:lstStyle/>
+          <a:p>
+            <a:pPr algn="ctr"/>
+            <a:r>
+              <a:rPr lang="en-US" sz="1200" b="1" dirty="0"/>
+              <a:t>Nasal Cannula</a:t>
+            </a:r>
+          </a:p>
+        </p:txBody>
+      </p:sp>
+      <p:sp>
+        <p:nvSpPr>
+          <p:cNvPr id="6" name="TextBox 5">
+            <a:extLst>
+              <a:ext uri="{FF2B5EF4-FFF2-40B4-BE49-F238E27FC236}">
+                <a16:creationId xmlns:a16="http://schemas.microsoft.com/office/drawing/2014/main" id="{2D252178-A42C-413A-9714-6DC81BA0251D}"/>
+              </a:ext>
+            </a:extLst>
+          </p:cNvPr>
+          <p:cNvSpPr txBox="1"/>
+          <p:nvPr/>
+        </p:nvSpPr>
+        <p:spPr>
+          <a:xfrm>
+            <a:off x="6366351" y="1828800"/>
+            <a:ext cx="1516697" cy="276999"/>
+          </a:xfrm>
+          <a:prstGeom prst="rect">
+            <a:avLst/>
+          </a:prstGeom>
+          <a:noFill/>
+        </p:spPr>
+        <p:txBody>
+          <a:bodyPr wrap="none" rtlCol="0">
+            <a:spAutoFit/>
+          </a:bodyPr>
+          <a:lstStyle/>
+          <a:p>
+            <a:pPr algn="ctr"/>
+            <a:r>
+              <a:rPr lang="en-US" sz="1200" b="1" dirty="0"/>
+              <a:t>Nonrebreather Mask</a:t>
+            </a:r>
+          </a:p>
+        </p:txBody>
+      </p:sp>
+      <p:sp>
+        <p:nvSpPr>
+          <p:cNvPr id="7" name="TextBox 6">
+            <a:extLst>
+              <a:ext uri="{FF2B5EF4-FFF2-40B4-BE49-F238E27FC236}">
+                <a16:creationId xmlns:a16="http://schemas.microsoft.com/office/drawing/2014/main" id="{2753AFEC-FB89-478E-8007-D84B1C1802DA}"/>
+              </a:ext>
+            </a:extLst>
+          </p:cNvPr>
+          <p:cNvSpPr txBox="1"/>
+          <p:nvPr/>
+        </p:nvSpPr>
+        <p:spPr>
+          <a:xfrm>
+            <a:off x="3596254" y="1828800"/>
+            <a:ext cx="998991" cy="276999"/>
+          </a:xfrm>
+          <a:prstGeom prst="rect">
+            <a:avLst/>
+          </a:prstGeom>
+          <a:noFill/>
+        </p:spPr>
+        <p:txBody>
+          <a:bodyPr wrap="none" rtlCol="0">
+            <a:spAutoFit/>
+          </a:bodyPr>
+          <a:lstStyle/>
+          <a:p>
+            <a:pPr algn="ctr"/>
+            <a:r>
+              <a:rPr lang="en-US" sz="1200" b="1" dirty="0"/>
+              <a:t>Simple Mask</a:t>
+            </a:r>
+          </a:p>
+        </p:txBody>
+      </p:sp>
+    </p:spTree>
+    <p:extLst>
+      <p:ext uri="{BB962C8B-B14F-4D97-AF65-F5344CB8AC3E}">
+        <p14:creationId xmlns:p14="http://schemas.microsoft.com/office/powerpoint/2010/main" val="2038784041"/>
+      </p:ext>
+    </p:extLst>
+  </p:cSld>
+  <p:clrMapOvr>
+    <a:masterClrMapping/>
+  </p:clrMapOvr>
+</p:sld>
+</file>
+
 <file path=ppt/slides/slide2.xml><?xml version="1.0" encoding="utf-8"?>
 <p:sld xmlns:a="http://schemas.openxmlformats.org/drawingml/2006/main" xmlns:r="http://schemas.openxmlformats.org/officeDocument/2006/relationships" xmlns:p="http://schemas.openxmlformats.org/presentationml/2006/main">
   <p:cSld>
@@ -7441,10 +7584,9 @@
           <a:lstStyle/>
           <a:p>
             <a:r>
-              <a:rPr lang="en-US" dirty="0" smtClean="0"/>
+              <a:rPr lang="en-US" dirty="0"/>
               <a:t>Figure 4</a:t>
             </a:r>
-            <a:endParaRPr lang="en-US" dirty="0"/>
           </a:p>
         </p:txBody>
       </p:sp>
@@ -7568,7 +7710,7 @@
                       <m:fPr>
                         <m:ctrlPr>
                           <a:rPr lang="en-US" i="1" smtClean="0">
-                            <a:latin typeface="Cambria Math"/>
+                            <a:latin typeface="Cambria Math" panose="02040503050406030204" pitchFamily="18" charset="0"/>
                             <a:ea typeface="Calibri"/>
                             <a:cs typeface="Times New Roman"/>
                           </a:rPr>
@@ -7644,7 +7786,7 @@
                       <m:dPr>
                         <m:ctrlPr>
                           <a:rPr lang="en-US" b="0" i="1" smtClean="0">
-                            <a:latin typeface="Cambria Math"/>
+                            <a:latin typeface="Cambria Math" panose="02040503050406030204" pitchFamily="18" charset="0"/>
                             <a:ea typeface="Cambria Math"/>
                             <a:cs typeface="Times New Roman"/>
                           </a:rPr>
@@ -7705,7 +7847,7 @@
                       <m:dPr>
                         <m:ctrlPr>
                           <a:rPr lang="en-US" b="0" i="1" smtClean="0">
-                            <a:latin typeface="Cambria Math"/>
+                            <a:latin typeface="Cambria Math" panose="02040503050406030204" pitchFamily="18" charset="0"/>
                             <a:ea typeface="Cambria Math"/>
                             <a:cs typeface="Times New Roman"/>
                           </a:rPr>
@@ -7756,7 +7898,7 @@
                     </m:r>
                   </m:oMath>
                 </a14:m>
-                <a:endParaRPr lang="en-US" i="1" dirty="0" smtClean="0">
+                <a:endParaRPr lang="en-US" i="1" dirty="0">
                   <a:latin typeface="Cambria Math"/>
                   <a:ea typeface="Cambria Math"/>
                   <a:cs typeface="Times New Roman"/>
@@ -7840,7 +7982,7 @@
                       <m:fPr>
                         <m:ctrlPr>
                           <a:rPr lang="en-US" i="1">
-                            <a:latin typeface="Cambria Math"/>
+                            <a:latin typeface="Cambria Math" panose="02040503050406030204" pitchFamily="18" charset="0"/>
                             <a:cs typeface="Times New Roman"/>
                           </a:rPr>
                         </m:ctrlPr>
@@ -7884,7 +8026,7 @@
                     </m:f>
                   </m:oMath>
                 </a14:m>
-                <a:endParaRPr lang="en-US" dirty="0" smtClean="0"/>
+                <a:endParaRPr lang="en-US" dirty="0"/>
               </a:p>
               <a:p>
                 <a:pPr marL="0" marR="0">
@@ -7916,7 +8058,7 @@
                     </m:r>
                   </m:oMath>
                 </a14:m>
-                <a:endParaRPr lang="en-US" b="0" dirty="0" smtClean="0">
+                <a:endParaRPr lang="en-US" b="0" dirty="0">
                   <a:ea typeface="Cambria Math"/>
                 </a:endParaRPr>
               </a:p>
@@ -7952,7 +8094,7 @@
                       <m:fPr>
                         <m:ctrlPr>
                           <a:rPr lang="en-US" b="0" i="1" smtClean="0">
-                            <a:latin typeface="Cambria Math"/>
+                            <a:latin typeface="Cambria Math" panose="02040503050406030204" pitchFamily="18" charset="0"/>
                             <a:ea typeface="Cambria Math"/>
                           </a:rPr>
                         </m:ctrlPr>
@@ -7985,7 +8127,7 @@
                           <m:sSupPr>
                             <m:ctrlPr>
                               <a:rPr lang="en-US" b="0" i="1" smtClean="0">
-                                <a:latin typeface="Cambria Math"/>
+                                <a:latin typeface="Cambria Math" panose="02040503050406030204" pitchFamily="18" charset="0"/>
                                 <a:ea typeface="Cambria Math"/>
                               </a:rPr>
                             </m:ctrlPr>
@@ -8020,7 +8162,7 @@
                     </m:f>
                   </m:oMath>
                 </a14:m>
-                <a:endParaRPr lang="en-US" dirty="0" smtClean="0"/>
+                <a:endParaRPr lang="en-US" dirty="0"/>
               </a:p>
               <a:p>
                 <a:pPr marL="0" marR="0" indent="0">
@@ -8116,7 +8258,7 @@
                       <m:sSubPr>
                         <m:ctrlPr>
                           <a:rPr lang="en-US" i="1">
-                            <a:latin typeface="Cambria Math"/>
+                            <a:latin typeface="Cambria Math" panose="02040503050406030204" pitchFamily="18" charset="0"/>
                           </a:rPr>
                         </m:ctrlPr>
                       </m:sSubPr>
@@ -8147,7 +8289,7 @@
                       <m:fPr>
                         <m:ctrlPr>
                           <a:rPr lang="en-US" i="1">
-                            <a:latin typeface="Cambria Math"/>
+                            <a:latin typeface="Cambria Math" panose="02040503050406030204" pitchFamily="18" charset="0"/>
                           </a:rPr>
                         </m:ctrlPr>
                       </m:fPr>
@@ -8156,7 +8298,7 @@
                           <m:sSubPr>
                             <m:ctrlPr>
                               <a:rPr lang="en-US" i="1">
-                                <a:latin typeface="Cambria Math"/>
+                                <a:latin typeface="Cambria Math" panose="02040503050406030204" pitchFamily="18" charset="0"/>
                               </a:rPr>
                             </m:ctrlPr>
                           </m:sSubPr>
@@ -8187,7 +8329,7 @@
                           <m:sSubPr>
                             <m:ctrlPr>
                               <a:rPr lang="en-US" i="1">
-                                <a:latin typeface="Cambria Math"/>
+                                <a:latin typeface="Cambria Math" panose="02040503050406030204" pitchFamily="18" charset="0"/>
                               </a:rPr>
                             </m:ctrlPr>
                           </m:sSubPr>
@@ -8214,7 +8356,7 @@
                           <m:sSubPr>
                             <m:ctrlPr>
                               <a:rPr lang="en-US" i="1">
-                                <a:latin typeface="Cambria Math"/>
+                                <a:latin typeface="Cambria Math" panose="02040503050406030204" pitchFamily="18" charset="0"/>
                               </a:rPr>
                             </m:ctrlPr>
                           </m:sSubPr>
@@ -8248,7 +8390,7 @@
                       <m:sSubPr>
                         <m:ctrlPr>
                           <a:rPr lang="en-US" i="1">
-                            <a:latin typeface="Cambria Math"/>
+                            <a:latin typeface="Cambria Math" panose="02040503050406030204" pitchFamily="18" charset="0"/>
                           </a:rPr>
                         </m:ctrlPr>
                       </m:sSubPr>
@@ -8280,7 +8422,7 @@
                       <m:sSubPr>
                         <m:ctrlPr>
                           <a:rPr lang="en-US" i="1">
-                            <a:latin typeface="Cambria Math"/>
+                            <a:latin typeface="Cambria Math" panose="02040503050406030204" pitchFamily="18" charset="0"/>
                           </a:rPr>
                         </m:ctrlPr>
                       </m:sSubPr>
@@ -8312,7 +8454,7 @@
                       <m:sSubPr>
                         <m:ctrlPr>
                           <a:rPr lang="en-US" i="1">
-                            <a:latin typeface="Cambria Math"/>
+                            <a:latin typeface="Cambria Math" panose="02040503050406030204" pitchFamily="18" charset="0"/>
                           </a:rPr>
                         </m:ctrlPr>
                       </m:sSubPr>
@@ -8343,7 +8485,7 @@
                       <m:sSubPr>
                         <m:ctrlPr>
                           <a:rPr lang="en-US" i="1">
-                            <a:latin typeface="Cambria Math"/>
+                            <a:latin typeface="Cambria Math" panose="02040503050406030204" pitchFamily="18" charset="0"/>
                           </a:rPr>
                         </m:ctrlPr>
                       </m:sSubPr>
@@ -8375,7 +8517,7 @@
                       <m:sSubPr>
                         <m:ctrlPr>
                           <a:rPr lang="en-US" i="1">
-                            <a:latin typeface="Cambria Math"/>
+                            <a:latin typeface="Cambria Math" panose="02040503050406030204" pitchFamily="18" charset="0"/>
                             <a:ea typeface="Cambria Math"/>
                           </a:rPr>
                         </m:ctrlPr>
@@ -8410,7 +8552,7 @@
                       <m:sSubPr>
                         <m:ctrlPr>
                           <a:rPr lang="en-US" i="1">
-                            <a:latin typeface="Cambria Math"/>
+                            <a:latin typeface="Cambria Math" panose="02040503050406030204" pitchFamily="18" charset="0"/>
                           </a:rPr>
                         </m:ctrlPr>
                       </m:sSubPr>
@@ -8442,7 +8584,7 @@
                       <m:sSubPr>
                         <m:ctrlPr>
                           <a:rPr lang="en-US" i="1">
-                            <a:latin typeface="Cambria Math"/>
+                            <a:latin typeface="Cambria Math" panose="02040503050406030204" pitchFamily="18" charset="0"/>
                           </a:rPr>
                         </m:ctrlPr>
                       </m:sSubPr>
@@ -8474,7 +8616,7 @@
                       <m:sSubPr>
                         <m:ctrlPr>
                           <a:rPr lang="en-US" i="1">
-                            <a:latin typeface="Cambria Math"/>
+                            <a:latin typeface="Cambria Math" panose="02040503050406030204" pitchFamily="18" charset="0"/>
                           </a:rPr>
                         </m:ctrlPr>
                       </m:sSubPr>
@@ -8499,7 +8641,7 @@
                       <m:sSubPr>
                         <m:ctrlPr>
                           <a:rPr lang="en-US" i="1">
-                            <a:latin typeface="Cambria Math"/>
+                            <a:latin typeface="Cambria Math" panose="02040503050406030204" pitchFamily="18" charset="0"/>
                           </a:rPr>
                         </m:ctrlPr>
                       </m:sSubPr>
@@ -8643,7 +8785,7 @@
                       <m:sSubPr>
                         <m:ctrlPr>
                           <a:rPr lang="en-US" b="0" i="1" smtClean="0">
-                            <a:latin typeface="Cambria Math"/>
+                            <a:latin typeface="Cambria Math" panose="02040503050406030204" pitchFamily="18" charset="0"/>
                           </a:rPr>
                         </m:ctrlPr>
                       </m:sSubPr>
@@ -8666,7 +8808,7 @@
                           <m:sSubPr>
                             <m:ctrlPr>
                               <a:rPr lang="en-US" b="0" i="1" smtClean="0">
-                                <a:latin typeface="Cambria Math"/>
+                                <a:latin typeface="Cambria Math" panose="02040503050406030204" pitchFamily="18" charset="0"/>
                               </a:rPr>
                             </m:ctrlPr>
                           </m:sSubPr>
@@ -8683,7 +8825,7 @@
                               <m:sSubPr>
                                 <m:ctrlPr>
                                   <a:rPr lang="en-US" b="0" i="1" smtClean="0">
-                                    <a:latin typeface="Cambria Math"/>
+                                    <a:latin typeface="Cambria Math" panose="02040503050406030204" pitchFamily="18" charset="0"/>
                                   </a:rPr>
                                 </m:ctrlPr>
                               </m:sSubPr>
@@ -8724,7 +8866,7 @@
                       <m:sSubPr>
                         <m:ctrlPr>
                           <a:rPr lang="en-US" b="0" i="1" smtClean="0">
-                            <a:latin typeface="Cambria Math"/>
+                            <a:latin typeface="Cambria Math" panose="02040503050406030204" pitchFamily="18" charset="0"/>
                           </a:rPr>
                         </m:ctrlPr>
                       </m:sSubPr>
@@ -8747,7 +8889,7 @@
                           <m:sSubPr>
                             <m:ctrlPr>
                               <a:rPr lang="en-US" b="0" i="1" smtClean="0">
-                                <a:latin typeface="Cambria Math"/>
+                                <a:latin typeface="Cambria Math" panose="02040503050406030204" pitchFamily="18" charset="0"/>
                               </a:rPr>
                             </m:ctrlPr>
                           </m:sSubPr>
@@ -8764,7 +8906,7 @@
                               <m:sSubPr>
                                 <m:ctrlPr>
                                   <a:rPr lang="en-US" b="0" i="1" smtClean="0">
-                                    <a:latin typeface="Cambria Math"/>
+                                    <a:latin typeface="Cambria Math" panose="02040503050406030204" pitchFamily="18" charset="0"/>
                                   </a:rPr>
                                 </m:ctrlPr>
                               </m:sSubPr>
@@ -8800,7 +8942,7 @@
                       <m:sSubPr>
                         <m:ctrlPr>
                           <a:rPr lang="en-US" b="0" i="1" smtClean="0">
-                            <a:latin typeface="Cambria Math"/>
+                            <a:latin typeface="Cambria Math" panose="02040503050406030204" pitchFamily="18" charset="0"/>
                             <a:ea typeface="Cambria Math"/>
                           </a:rPr>
                         </m:ctrlPr>
@@ -8826,7 +8968,7 @@
                     </m:sSub>
                   </m:oMath>
                 </a14:m>
-                <a:endParaRPr lang="en-US" dirty="0" smtClean="0"/>
+                <a:endParaRPr lang="en-US" dirty="0"/>
               </a:p>
               <a:p>
                 <a14:m>
@@ -8835,7 +8977,7 @@
                       <m:sSubPr>
                         <m:ctrlPr>
                           <a:rPr lang="en-US" b="0" i="1" smtClean="0">
-                            <a:latin typeface="Cambria Math"/>
+                            <a:latin typeface="Cambria Math" panose="02040503050406030204" pitchFamily="18" charset="0"/>
                           </a:rPr>
                         </m:ctrlPr>
                       </m:sSubPr>
@@ -8858,7 +9000,7 @@
                           <m:sSubPr>
                             <m:ctrlPr>
                               <a:rPr lang="en-US" b="0" i="1" smtClean="0">
-                                <a:latin typeface="Cambria Math"/>
+                                <a:latin typeface="Cambria Math" panose="02040503050406030204" pitchFamily="18" charset="0"/>
                               </a:rPr>
                             </m:ctrlPr>
                           </m:sSubPr>
@@ -8875,7 +9017,7 @@
                               <m:sSubPr>
                                 <m:ctrlPr>
                                   <a:rPr lang="en-US" b="0" i="1" smtClean="0">
-                                    <a:latin typeface="Cambria Math"/>
+                                    <a:latin typeface="Cambria Math" panose="02040503050406030204" pitchFamily="18" charset="0"/>
                                   </a:rPr>
                                 </m:ctrlPr>
                               </m:sSubPr>
@@ -8916,7 +9058,7 @@
                       <m:sSubPr>
                         <m:ctrlPr>
                           <a:rPr lang="en-US" b="0" i="1" smtClean="0">
-                            <a:latin typeface="Cambria Math"/>
+                            <a:latin typeface="Cambria Math" panose="02040503050406030204" pitchFamily="18" charset="0"/>
                           </a:rPr>
                         </m:ctrlPr>
                       </m:sSubPr>
@@ -8939,7 +9081,7 @@
                           <m:sSubPr>
                             <m:ctrlPr>
                               <a:rPr lang="en-US" b="0" i="1" smtClean="0">
-                                <a:latin typeface="Cambria Math"/>
+                                <a:latin typeface="Cambria Math" panose="02040503050406030204" pitchFamily="18" charset="0"/>
                               </a:rPr>
                             </m:ctrlPr>
                           </m:sSubPr>
@@ -8956,7 +9098,7 @@
                               <m:sSubPr>
                                 <m:ctrlPr>
                                   <a:rPr lang="en-US" b="0" i="1" smtClean="0">
-                                    <a:latin typeface="Cambria Math"/>
+                                    <a:latin typeface="Cambria Math" panose="02040503050406030204" pitchFamily="18" charset="0"/>
                                   </a:rPr>
                                 </m:ctrlPr>
                               </m:sSubPr>
@@ -8992,7 +9134,7 @@
                       <m:dPr>
                         <m:ctrlPr>
                           <a:rPr lang="en-US" b="0" i="1" smtClean="0">
-                            <a:latin typeface="Cambria Math"/>
+                            <a:latin typeface="Cambria Math" panose="02040503050406030204" pitchFamily="18" charset="0"/>
                             <a:ea typeface="Cambria Math"/>
                           </a:rPr>
                         </m:ctrlPr>
@@ -9002,7 +9144,7 @@
                           <m:sSubPr>
                             <m:ctrlPr>
                               <a:rPr lang="en-US" b="0" i="1" smtClean="0">
-                                <a:latin typeface="Cambria Math"/>
+                                <a:latin typeface="Cambria Math" panose="02040503050406030204" pitchFamily="18" charset="0"/>
                                 <a:ea typeface="Cambria Math"/>
                               </a:rPr>
                             </m:ctrlPr>
@@ -9037,7 +9179,7 @@
                           <m:sSubPr>
                             <m:ctrlPr>
                               <a:rPr lang="en-US" b="0" i="1" smtClean="0">
-                                <a:latin typeface="Cambria Math"/>
+                                <a:latin typeface="Cambria Math" panose="02040503050406030204" pitchFamily="18" charset="0"/>
                                 <a:ea typeface="Cambria Math"/>
                               </a:rPr>
                             </m:ctrlPr>
@@ -9056,7 +9198,7 @@
                               <m:sSubPr>
                                 <m:ctrlPr>
                                   <a:rPr lang="en-US" b="0" i="1" smtClean="0">
-                                    <a:latin typeface="Cambria Math"/>
+                                    <a:latin typeface="Cambria Math" panose="02040503050406030204" pitchFamily="18" charset="0"/>
                                     <a:ea typeface="Cambria Math"/>
                                   </a:rPr>
                                 </m:ctrlPr>
@@ -9100,7 +9242,7 @@
                           <m:sSubPr>
                             <m:ctrlPr>
                               <a:rPr lang="en-US" b="0" i="1" smtClean="0">
-                                <a:latin typeface="Cambria Math"/>
+                                <a:latin typeface="Cambria Math" panose="02040503050406030204" pitchFamily="18" charset="0"/>
                                 <a:ea typeface="Cambria Math"/>
                               </a:rPr>
                             </m:ctrlPr>
@@ -9135,7 +9277,7 @@
                     </m:r>
                   </m:oMath>
                 </a14:m>
-                <a:endParaRPr lang="en-US" b="0" dirty="0" smtClean="0">
+                <a:endParaRPr lang="en-US" b="0" dirty="0">
                   <a:ea typeface="Cambria Math"/>
                 </a:endParaRPr>
               </a:p>
@@ -9170,7 +9312,7 @@
                       <m:sSubPr>
                         <m:ctrlPr>
                           <a:rPr lang="en-US" i="1">
-                            <a:latin typeface="Cambria Math"/>
+                            <a:latin typeface="Cambria Math" panose="02040503050406030204" pitchFamily="18" charset="0"/>
                           </a:rPr>
                         </m:ctrlPr>
                       </m:sSubPr>
@@ -9193,7 +9335,7 @@
                           <m:sSubPr>
                             <m:ctrlPr>
                               <a:rPr lang="en-US" b="0" i="1" smtClean="0">
-                                <a:latin typeface="Cambria Math"/>
+                                <a:latin typeface="Cambria Math" panose="02040503050406030204" pitchFamily="18" charset="0"/>
                               </a:rPr>
                             </m:ctrlPr>
                           </m:sSubPr>
@@ -9226,7 +9368,7 @@
                       <m:sSubPr>
                         <m:ctrlPr>
                           <a:rPr lang="en-US" i="1">
-                            <a:latin typeface="Cambria Math"/>
+                            <a:latin typeface="Cambria Math" panose="02040503050406030204" pitchFamily="18" charset="0"/>
                           </a:rPr>
                         </m:ctrlPr>
                       </m:sSubPr>
@@ -9249,7 +9391,7 @@
                     </m:sSub>
                   </m:oMath>
                 </a14:m>
-                <a:endParaRPr lang="en-US" dirty="0" smtClean="0"/>
+                <a:endParaRPr lang="en-US" dirty="0"/>
               </a:p>
               <a:p>
                 <a14:m>
@@ -9294,7 +9436,7 @@
                       <m:sSubPr>
                         <m:ctrlPr>
                           <a:rPr lang="en-US" b="0" i="1" smtClean="0">
-                            <a:latin typeface="Cambria Math"/>
+                            <a:latin typeface="Cambria Math" panose="02040503050406030204" pitchFamily="18" charset="0"/>
                           </a:rPr>
                         </m:ctrlPr>
                       </m:sSubPr>
@@ -9317,7 +9459,7 @@
                     </m:sSub>
                   </m:oMath>
                 </a14:m>
-                <a:endParaRPr lang="en-US" dirty="0" smtClean="0"/>
+                <a:endParaRPr lang="en-US" dirty="0"/>
               </a:p>
               <a:p>
                 <a14:m>
@@ -9326,7 +9468,7 @@
                       <m:sSubPr>
                         <m:ctrlPr>
                           <a:rPr lang="en-US" b="0" i="1" smtClean="0">
-                            <a:latin typeface="Cambria Math"/>
+                            <a:latin typeface="Cambria Math" panose="02040503050406030204" pitchFamily="18" charset="0"/>
                           </a:rPr>
                         </m:ctrlPr>
                       </m:sSubPr>
@@ -9369,7 +9511,7 @@
                       <m:sSubPr>
                         <m:ctrlPr>
                           <a:rPr lang="en-US" b="0" i="1" smtClean="0">
-                            <a:latin typeface="Cambria Math"/>
+                            <a:latin typeface="Cambria Math" panose="02040503050406030204" pitchFamily="18" charset="0"/>
                           </a:rPr>
                         </m:ctrlPr>
                       </m:sSubPr>
@@ -9410,7 +9552,7 @@
                     </m:r>
                   </m:oMath>
                 </a14:m>
-                <a:endParaRPr lang="en-US" dirty="0" smtClean="0"/>
+                <a:endParaRPr lang="en-US" dirty="0"/>
               </a:p>
               <a:p>
                 <a14:m>
@@ -9419,7 +9561,7 @@
                       <m:sSubPr>
                         <m:ctrlPr>
                           <a:rPr lang="en-US" b="0" i="1" smtClean="0">
-                            <a:latin typeface="Cambria Math"/>
+                            <a:latin typeface="Cambria Math" panose="02040503050406030204" pitchFamily="18" charset="0"/>
                           </a:rPr>
                         </m:ctrlPr>
                       </m:sSubPr>
@@ -9472,7 +9614,7 @@
                     </m:r>
                   </m:oMath>
                 </a14:m>
-                <a:endParaRPr lang="en-US" dirty="0" smtClean="0"/>
+                <a:endParaRPr lang="en-US" dirty="0"/>
               </a:p>
               <a:p>
                 <a14:m>
@@ -9509,7 +9651,7 @@
                     </m:r>
                   </m:oMath>
                 </a14:m>
-                <a:endParaRPr lang="en-US" dirty="0" smtClean="0"/>
+                <a:endParaRPr lang="en-US" dirty="0"/>
               </a:p>
               <a:p>
                 <a14:m>
@@ -9518,7 +9660,7 @@
                       <m:sSubPr>
                         <m:ctrlPr>
                           <a:rPr lang="en-US" b="0" i="1" dirty="0" smtClean="0">
-                            <a:latin typeface="Cambria Math"/>
+                            <a:latin typeface="Cambria Math" panose="02040503050406030204" pitchFamily="18" charset="0"/>
                           </a:rPr>
                         </m:ctrlPr>
                       </m:sSubPr>
@@ -9528,7 +9670,7 @@
                             <m:chr m:val="̇"/>
                             <m:ctrlPr>
                               <a:rPr lang="en-US" i="1" dirty="0" smtClean="0">
-                                <a:latin typeface="Cambria Math"/>
+                                <a:latin typeface="Cambria Math" panose="02040503050406030204" pitchFamily="18" charset="0"/>
                               </a:rPr>
                             </m:ctrlPr>
                           </m:accPr>
@@ -9561,7 +9703,7 @@
                       <m:sSubPr>
                         <m:ctrlPr>
                           <a:rPr lang="en-US" b="0" i="1" smtClean="0">
-                            <a:latin typeface="Cambria Math"/>
+                            <a:latin typeface="Cambria Math" panose="02040503050406030204" pitchFamily="18" charset="0"/>
                           </a:rPr>
                         </m:ctrlPr>
                       </m:sSubPr>
@@ -9777,7 +9919,7 @@
                     </m:r>
                   </m:oMath>
                 </a14:m>
-                <a:endParaRPr lang="en-US" b="0" dirty="0" smtClean="0"/>
+                <a:endParaRPr lang="en-US" b="0" dirty="0"/>
               </a:p>
               <a:p>
                 <a14:m>
@@ -9786,7 +9928,7 @@
                       <m:sSubPr>
                         <m:ctrlPr>
                           <a:rPr lang="en-US" i="1">
-                            <a:latin typeface="Cambria Math"/>
+                            <a:latin typeface="Cambria Math" panose="02040503050406030204" pitchFamily="18" charset="0"/>
                           </a:rPr>
                         </m:ctrlPr>
                       </m:sSubPr>
@@ -9817,7 +9959,7 @@
                       <m:fPr>
                         <m:ctrlPr>
                           <a:rPr lang="en-US" i="1">
-                            <a:latin typeface="Cambria Math"/>
+                            <a:latin typeface="Cambria Math" panose="02040503050406030204" pitchFamily="18" charset="0"/>
                           </a:rPr>
                         </m:ctrlPr>
                       </m:fPr>
@@ -9826,7 +9968,7 @@
                           <m:sSubPr>
                             <m:ctrlPr>
                               <a:rPr lang="en-US" i="1">
-                                <a:latin typeface="Cambria Math"/>
+                                <a:latin typeface="Cambria Math" panose="02040503050406030204" pitchFamily="18" charset="0"/>
                               </a:rPr>
                             </m:ctrlPr>
                           </m:sSubPr>
@@ -9857,7 +9999,7 @@
                           <m:sSubPr>
                             <m:ctrlPr>
                               <a:rPr lang="en-US" i="1">
-                                <a:latin typeface="Cambria Math"/>
+                                <a:latin typeface="Cambria Math" panose="02040503050406030204" pitchFamily="18" charset="0"/>
                               </a:rPr>
                             </m:ctrlPr>
                           </m:sSubPr>
@@ -9884,7 +10026,7 @@
                           <m:sSubPr>
                             <m:ctrlPr>
                               <a:rPr lang="en-US" i="1">
-                                <a:latin typeface="Cambria Math"/>
+                                <a:latin typeface="Cambria Math" panose="02040503050406030204" pitchFamily="18" charset="0"/>
                               </a:rPr>
                             </m:ctrlPr>
                           </m:sSubPr>
@@ -9909,7 +10051,7 @@
                     </m:f>
                   </m:oMath>
                 </a14:m>
-                <a:endParaRPr lang="en-US" b="0" dirty="0" smtClean="0"/>
+                <a:endParaRPr lang="en-US" b="0" dirty="0"/>
               </a:p>
               <a:p>
                 <a14:m>
@@ -9918,7 +10060,7 @@
                       <m:sSubPr>
                         <m:ctrlPr>
                           <a:rPr lang="en-US" i="1">
-                            <a:latin typeface="Cambria Math"/>
+                            <a:latin typeface="Cambria Math" panose="02040503050406030204" pitchFamily="18" charset="0"/>
                           </a:rPr>
                         </m:ctrlPr>
                       </m:sSubPr>
@@ -9949,7 +10091,7 @@
                       <m:sSubPr>
                         <m:ctrlPr>
                           <a:rPr lang="en-US" i="1">
-                            <a:latin typeface="Cambria Math"/>
+                            <a:latin typeface="Cambria Math" panose="02040503050406030204" pitchFamily="18" charset="0"/>
                           </a:rPr>
                         </m:ctrlPr>
                       </m:sSubPr>
@@ -9981,7 +10123,7 @@
                       <m:sSubPr>
                         <m:ctrlPr>
                           <a:rPr lang="en-US" i="1">
-                            <a:latin typeface="Cambria Math"/>
+                            <a:latin typeface="Cambria Math" panose="02040503050406030204" pitchFamily="18" charset="0"/>
                             <a:ea typeface="Cambria Math"/>
                           </a:rPr>
                         </m:ctrlPr>
@@ -10007,7 +10149,7 @@
                     </m:sSub>
                   </m:oMath>
                 </a14:m>
-                <a:endParaRPr lang="en-US" b="0" dirty="0" smtClean="0"/>
+                <a:endParaRPr lang="en-US" b="0" dirty="0"/>
               </a:p>
               <a:p>
                 <a:endParaRPr lang="en-US" dirty="0"/>
@@ -10151,7 +10293,7 @@
                     </m:r>
                   </m:oMath>
                 </a14:m>
-                <a:endParaRPr lang="en-US" b="0" dirty="0" smtClean="0"/>
+                <a:endParaRPr lang="en-US" b="0" dirty="0"/>
               </a:p>
               <a:p>
                 <a14:m>
@@ -10160,7 +10302,7 @@
                       <m:sSubPr>
                         <m:ctrlPr>
                           <a:rPr lang="en-US" sz="2400" i="1">
-                            <a:latin typeface="Cambria Math"/>
+                            <a:latin typeface="Cambria Math" panose="02040503050406030204" pitchFamily="18" charset="0"/>
                           </a:rPr>
                         </m:ctrlPr>
                       </m:sSubPr>
@@ -10191,7 +10333,7 @@
                       <m:fPr>
                         <m:ctrlPr>
                           <a:rPr lang="en-US" sz="2400" i="1">
-                            <a:latin typeface="Cambria Math"/>
+                            <a:latin typeface="Cambria Math" panose="02040503050406030204" pitchFamily="18" charset="0"/>
                           </a:rPr>
                         </m:ctrlPr>
                       </m:fPr>
@@ -10200,7 +10342,7 @@
                           <m:sSubPr>
                             <m:ctrlPr>
                               <a:rPr lang="en-US" sz="2400" i="1">
-                                <a:latin typeface="Cambria Math"/>
+                                <a:latin typeface="Cambria Math" panose="02040503050406030204" pitchFamily="18" charset="0"/>
                               </a:rPr>
                             </m:ctrlPr>
                           </m:sSubPr>
@@ -10231,7 +10373,7 @@
                           <m:sSubPr>
                             <m:ctrlPr>
                               <a:rPr lang="en-US" sz="2400" i="1">
-                                <a:latin typeface="Cambria Math"/>
+                                <a:latin typeface="Cambria Math" panose="02040503050406030204" pitchFamily="18" charset="0"/>
                               </a:rPr>
                             </m:ctrlPr>
                           </m:sSubPr>
@@ -10258,7 +10400,7 @@
                           <m:sSubPr>
                             <m:ctrlPr>
                               <a:rPr lang="en-US" sz="2400" i="1">
-                                <a:latin typeface="Cambria Math"/>
+                                <a:latin typeface="Cambria Math" panose="02040503050406030204" pitchFamily="18" charset="0"/>
                               </a:rPr>
                             </m:ctrlPr>
                           </m:sSubPr>
@@ -10283,7 +10425,7 @@
                     </m:f>
                   </m:oMath>
                 </a14:m>
-                <a:endParaRPr lang="en-US" sz="2400" b="0" dirty="0" smtClean="0"/>
+                <a:endParaRPr lang="en-US" sz="2400" b="0" dirty="0"/>
               </a:p>
               <a:p>
                 <a14:m>
@@ -10292,7 +10434,7 @@
                       <m:sSubPr>
                         <m:ctrlPr>
                           <a:rPr lang="en-US" i="1">
-                            <a:latin typeface="Cambria Math"/>
+                            <a:latin typeface="Cambria Math" panose="02040503050406030204" pitchFamily="18" charset="0"/>
                           </a:rPr>
                         </m:ctrlPr>
                       </m:sSubPr>
@@ -10323,7 +10465,7 @@
                       <m:sSubPr>
                         <m:ctrlPr>
                           <a:rPr lang="en-US" i="1">
-                            <a:latin typeface="Cambria Math"/>
+                            <a:latin typeface="Cambria Math" panose="02040503050406030204" pitchFamily="18" charset="0"/>
                           </a:rPr>
                         </m:ctrlPr>
                       </m:sSubPr>
@@ -10355,7 +10497,7 @@
                       <m:sSubPr>
                         <m:ctrlPr>
                           <a:rPr lang="en-US" i="1">
-                            <a:latin typeface="Cambria Math"/>
+                            <a:latin typeface="Cambria Math" panose="02040503050406030204" pitchFamily="18" charset="0"/>
                             <a:ea typeface="Cambria Math"/>
                           </a:rPr>
                         </m:ctrlPr>
@@ -10381,7 +10523,7 @@
                     </m:sSub>
                   </m:oMath>
                 </a14:m>
-                <a:endParaRPr lang="en-US" b="0" dirty="0" smtClean="0"/>
+                <a:endParaRPr lang="en-US" b="0" dirty="0"/>
               </a:p>
               <a:p>
                 <a14:m>
@@ -10390,7 +10532,7 @@
                       <m:sSubPr>
                         <m:ctrlPr>
                           <a:rPr lang="en-US" sz="2400" b="0" i="1" smtClean="0">
-                            <a:latin typeface="Cambria Math"/>
+                            <a:latin typeface="Cambria Math" panose="02040503050406030204" pitchFamily="18" charset="0"/>
                           </a:rPr>
                         </m:ctrlPr>
                       </m:sSubPr>
@@ -10423,7 +10565,7 @@
                         <m:endChr m:val=""/>
                         <m:ctrlPr>
                           <a:rPr lang="en-US" sz="2400" b="0" i="1" smtClean="0">
-                            <a:latin typeface="Cambria Math"/>
+                            <a:latin typeface="Cambria Math" panose="02040503050406030204" pitchFamily="18" charset="0"/>
                           </a:rPr>
                         </m:ctrlPr>
                       </m:dPr>
@@ -10432,7 +10574,7 @@
                           <m:eqArrPr>
                             <m:ctrlPr>
                               <a:rPr lang="en-US" sz="2400" i="1">
-                                <a:latin typeface="Cambria Math"/>
+                                <a:latin typeface="Cambria Math" panose="02040503050406030204" pitchFamily="18" charset="0"/>
                               </a:rPr>
                             </m:ctrlPr>
                           </m:eqArrPr>
@@ -10441,7 +10583,7 @@
                               <m:sSubPr>
                                 <m:ctrlPr>
                                   <a:rPr lang="en-US" sz="2400" i="1">
-                                    <a:latin typeface="Cambria Math"/>
+                                    <a:latin typeface="Cambria Math" panose="02040503050406030204" pitchFamily="18" charset="0"/>
                                   </a:rPr>
                                 </m:ctrlPr>
                               </m:sSubPr>
@@ -10466,7 +10608,7 @@
                               <m:dPr>
                                 <m:ctrlPr>
                                   <a:rPr lang="en-US" sz="2400" i="1">
-                                    <a:latin typeface="Cambria Math"/>
+                                    <a:latin typeface="Cambria Math" panose="02040503050406030204" pitchFamily="18" charset="0"/>
                                   </a:rPr>
                                 </m:ctrlPr>
                               </m:dPr>
@@ -10487,7 +10629,7 @@
                                   <m:dPr>
                                     <m:ctrlPr>
                                       <a:rPr lang="en-US" sz="2400" i="1">
-                                        <a:latin typeface="Cambria Math"/>
+                                        <a:latin typeface="Cambria Math" panose="02040503050406030204" pitchFamily="18" charset="0"/>
                                       </a:rPr>
                                     </m:ctrlPr>
                                   </m:dPr>
@@ -10502,7 +10644,7 @@
                                       <m:fPr>
                                         <m:ctrlPr>
                                           <a:rPr lang="en-US" sz="2400" i="1">
-                                            <a:latin typeface="Cambria Math"/>
+                                            <a:latin typeface="Cambria Math" panose="02040503050406030204" pitchFamily="18" charset="0"/>
                                           </a:rPr>
                                         </m:ctrlPr>
                                       </m:fPr>
@@ -10511,7 +10653,7 @@
                                           <m:sSubPr>
                                             <m:ctrlPr>
                                               <a:rPr lang="en-US" sz="2400" i="1">
-                                                <a:latin typeface="Cambria Math"/>
+                                                <a:latin typeface="Cambria Math" panose="02040503050406030204" pitchFamily="18" charset="0"/>
                                               </a:rPr>
                                             </m:ctrlPr>
                                           </m:sSubPr>
@@ -10542,7 +10684,7 @@
                                           <m:sSubPr>
                                             <m:ctrlPr>
                                               <a:rPr lang="en-US" sz="2400" i="1">
-                                                <a:latin typeface="Cambria Math"/>
+                                                <a:latin typeface="Cambria Math" panose="02040503050406030204" pitchFamily="18" charset="0"/>
                                               </a:rPr>
                                             </m:ctrlPr>
                                           </m:sSubPr>
@@ -10616,7 +10758,7 @@
                               <m:sSubPr>
                                 <m:ctrlPr>
                                   <a:rPr lang="en-US" sz="2400" b="0" i="1" smtClean="0">
-                                    <a:latin typeface="Cambria Math"/>
+                                    <a:latin typeface="Cambria Math" panose="02040503050406030204" pitchFamily="18" charset="0"/>
                                     <a:ea typeface="Cambria Math"/>
                                   </a:rPr>
                                 </m:ctrlPr>
@@ -10646,7 +10788,7 @@
                               <m:sSubPr>
                                 <m:ctrlPr>
                                   <a:rPr lang="en-US" sz="2400" i="1">
-                                    <a:latin typeface="Cambria Math"/>
+                                    <a:latin typeface="Cambria Math" panose="02040503050406030204" pitchFamily="18" charset="0"/>
                                   </a:rPr>
                                 </m:ctrlPr>
                               </m:sSubPr>
@@ -10671,7 +10813,7 @@
                               <m:dPr>
                                 <m:ctrlPr>
                                   <a:rPr lang="en-US" sz="2400" i="1">
-                                    <a:latin typeface="Cambria Math"/>
+                                    <a:latin typeface="Cambria Math" panose="02040503050406030204" pitchFamily="18" charset="0"/>
                                   </a:rPr>
                                 </m:ctrlPr>
                               </m:dPr>
@@ -10686,7 +10828,7 @@
                                   <m:dPr>
                                     <m:ctrlPr>
                                       <a:rPr lang="en-US" sz="2400" i="1">
-                                        <a:latin typeface="Cambria Math"/>
+                                        <a:latin typeface="Cambria Math" panose="02040503050406030204" pitchFamily="18" charset="0"/>
                                       </a:rPr>
                                     </m:ctrlPr>
                                   </m:dPr>
@@ -10701,7 +10843,7 @@
                                       <m:fPr>
                                         <m:ctrlPr>
                                           <a:rPr lang="en-US" sz="2400" i="1">
-                                            <a:latin typeface="Cambria Math"/>
+                                            <a:latin typeface="Cambria Math" panose="02040503050406030204" pitchFamily="18" charset="0"/>
                                           </a:rPr>
                                         </m:ctrlPr>
                                       </m:fPr>
@@ -10710,7 +10852,7 @@
                                           <m:sSubPr>
                                             <m:ctrlPr>
                                               <a:rPr lang="en-US" sz="2400" i="1">
-                                                <a:latin typeface="Cambria Math"/>
+                                                <a:latin typeface="Cambria Math" panose="02040503050406030204" pitchFamily="18" charset="0"/>
                                               </a:rPr>
                                             </m:ctrlPr>
                                           </m:sSubPr>
@@ -10741,7 +10883,7 @@
                                           <m:fPr>
                                             <m:ctrlPr>
                                               <a:rPr lang="en-US" sz="2400" i="1" smtClean="0">
-                                                <a:latin typeface="Cambria Math"/>
+                                                <a:latin typeface="Cambria Math" panose="02040503050406030204" pitchFamily="18" charset="0"/>
                                               </a:rPr>
                                             </m:ctrlPr>
                                           </m:fPr>
@@ -10750,7 +10892,7 @@
                                               <m:sSubPr>
                                                 <m:ctrlPr>
                                                   <a:rPr lang="en-US" sz="2400" b="0" i="1" smtClean="0">
-                                                    <a:latin typeface="Cambria Math"/>
+                                                    <a:latin typeface="Cambria Math" panose="02040503050406030204" pitchFamily="18" charset="0"/>
                                                   </a:rPr>
                                                 </m:ctrlPr>
                                               </m:sSubPr>
@@ -10820,7 +10962,7 @@
                               <m:sSubPr>
                                 <m:ctrlPr>
                                   <a:rPr lang="en-US" sz="2400" b="0" i="1" smtClean="0">
-                                    <a:latin typeface="Cambria Math"/>
+                                    <a:latin typeface="Cambria Math" panose="02040503050406030204" pitchFamily="18" charset="0"/>
                                     <a:ea typeface="Cambria Math"/>
                                   </a:rPr>
                                 </m:ctrlPr>
@@ -10869,7 +11011,7 @@
                               <m:sSubPr>
                                 <m:ctrlPr>
                                   <a:rPr lang="en-US" sz="2400" b="0" i="1" smtClean="0">
-                                    <a:latin typeface="Cambria Math"/>
+                                    <a:latin typeface="Cambria Math" panose="02040503050406030204" pitchFamily="18" charset="0"/>
                                     <a:ea typeface="Cambria Math"/>
                                   </a:rPr>
                                 </m:ctrlPr>
@@ -10899,13 +11041,13 @@
                     </m:d>
                   </m:oMath>
                 </a14:m>
-                <a:endParaRPr lang="en-US" sz="2400" b="0" dirty="0" smtClean="0"/>
+                <a:endParaRPr lang="en-US" sz="2400" b="0" dirty="0"/>
               </a:p>
               <a:p>
-                <a:endParaRPr lang="en-US" b="0" dirty="0" smtClean="0"/>
+                <a:endParaRPr lang="en-US" b="0" dirty="0"/>
               </a:p>
               <a:p>
-                <a:endParaRPr lang="en-US" b="0" dirty="0" smtClean="0"/>
+                <a:endParaRPr lang="en-US" b="0" dirty="0"/>
               </a:p>
               <a:p>
                 <a:endParaRPr lang="en-US" dirty="0"/>
@@ -11026,7 +11168,7 @@
                       <m:sSubPr>
                         <m:ctrlPr>
                           <a:rPr lang="en-US" sz="2400" b="0" i="1" smtClean="0">
-                            <a:latin typeface="Cambria Math"/>
+                            <a:latin typeface="Cambria Math" panose="02040503050406030204" pitchFamily="18" charset="0"/>
                           </a:rPr>
                         </m:ctrlPr>
                       </m:sSubPr>
@@ -11064,7 +11206,7 @@
                       <m:fPr>
                         <m:ctrlPr>
                           <a:rPr lang="en-US" sz="2400" b="0" i="1" smtClean="0">
-                            <a:latin typeface="Cambria Math"/>
+                            <a:latin typeface="Cambria Math" panose="02040503050406030204" pitchFamily="18" charset="0"/>
                             <a:ea typeface="Cambria Math"/>
                           </a:rPr>
                         </m:ctrlPr>
@@ -11083,7 +11225,7 @@
                           <m:sSubPr>
                             <m:ctrlPr>
                               <a:rPr lang="en-US" sz="2400" b="0" i="1" smtClean="0">
-                                <a:latin typeface="Cambria Math"/>
+                                <a:latin typeface="Cambria Math" panose="02040503050406030204" pitchFamily="18" charset="0"/>
                                 <a:ea typeface="Cambria Math"/>
                               </a:rPr>
                             </m:ctrlPr>
@@ -11112,7 +11254,7 @@
                   </m:oMath>
                 </a14:m>
                 <a:r>
-                  <a:rPr lang="en-US" sz="2400" b="0" dirty="0" smtClean="0"/>
+                  <a:rPr lang="en-US" sz="2400" b="0" dirty="0"/>
                   <a:t>)</a:t>
                 </a:r>
               </a:p>
@@ -11123,7 +11265,7 @@
                       <m:sSubPr>
                         <m:ctrlPr>
                           <a:rPr lang="en-US" sz="2400" b="0" i="1" smtClean="0">
-                            <a:latin typeface="Cambria Math"/>
+                            <a:latin typeface="Cambria Math" panose="02040503050406030204" pitchFamily="18" charset="0"/>
                           </a:rPr>
                         </m:ctrlPr>
                       </m:sSubPr>
@@ -11146,17 +11288,17 @@
                     </m:sSub>
                   </m:oMath>
                 </a14:m>
-                <a:endParaRPr lang="en-US" sz="2400" b="0" dirty="0" smtClean="0"/>
+                <a:endParaRPr lang="en-US" sz="2400" b="0" dirty="0"/>
               </a:p>
               <a:p>
                 <a:r>
-                  <a:rPr lang="en-US" sz="2200" dirty="0" smtClean="0">
+                  <a:rPr lang="en-US" sz="2200" dirty="0">
                     <a:latin typeface="Cambria Math"/>
                   </a:rPr>
                   <a:t>𝑃</a:t>
                 </a:r>
                 <a:r>
-                  <a:rPr lang="en-US" sz="2800" baseline="-25000" dirty="0" smtClean="0">
+                  <a:rPr lang="en-US" sz="2800" baseline="-25000" dirty="0">
                     <a:latin typeface="Cambria Math"/>
                   </a:rPr>
                   <a:t>𝑚𝑎𝑥</a:t>
@@ -11228,19 +11370,19 @@
                   <a:t>𝑉</a:t>
                 </a:r>
                 <a:r>
-                  <a:rPr lang="en-US" sz="2200" baseline="30000" dirty="0" smtClean="0">
+                  <a:rPr lang="en-US" sz="2200" baseline="30000" dirty="0">
                     <a:latin typeface="Cambria Math"/>
                   </a:rPr>
                   <a:t>3</a:t>
                 </a:r>
                 <a:r>
-                  <a:rPr lang="en-US" sz="2200" dirty="0" smtClean="0">
+                  <a:rPr lang="en-US" sz="2200" dirty="0">
                     <a:latin typeface="Cambria Math"/>
                   </a:rPr>
                   <a:t>+</a:t>
                 </a:r>
                 <a:r>
-                  <a:rPr lang="en-US" sz="2000" dirty="0" smtClean="0">
+                  <a:rPr lang="en-US" sz="2000" dirty="0">
                     <a:latin typeface="Cambria Math"/>
                   </a:rPr>
                   <a:t>214.11</a:t>
@@ -11276,12 +11418,12 @@
                   <a:t>𝑉+</a:t>
                 </a:r>
                 <a:r>
-                  <a:rPr lang="en-US" sz="2000" dirty="0" smtClean="0">
+                  <a:rPr lang="en-US" sz="2000" dirty="0">
                     <a:latin typeface="Cambria Math"/>
                   </a:rPr>
                   <a:t>262.22</a:t>
                 </a:r>
-                <a:endParaRPr lang="en-US" sz="2000" b="0" dirty="0" smtClean="0">
+                <a:endParaRPr lang="en-US" sz="2000" b="0" dirty="0">
                   <a:latin typeface="Cambria Math"/>
                 </a:endParaRPr>
               </a:p>
@@ -11292,7 +11434,7 @@
                       <m:sSubPr>
                         <m:ctrlPr>
                           <a:rPr lang="en-US" sz="2400" b="0" i="1" smtClean="0">
-                            <a:latin typeface="Cambria Math"/>
+                            <a:latin typeface="Cambria Math" panose="02040503050406030204" pitchFamily="18" charset="0"/>
                           </a:rPr>
                         </m:ctrlPr>
                       </m:sSubPr>
@@ -11315,7 +11457,7 @@
                     </m:sSub>
                   </m:oMath>
                 </a14:m>
-                <a:endParaRPr lang="en-US" sz="2400" b="0" dirty="0" smtClean="0"/>
+                <a:endParaRPr lang="en-US" sz="2400" b="0" dirty="0"/>
               </a:p>
               <a:p>
                 <a14:m>
@@ -11324,7 +11466,7 @@
                       <m:sSubPr>
                         <m:ctrlPr>
                           <a:rPr lang="en-US" sz="2400" b="0" i="1" smtClean="0">
-                            <a:latin typeface="Cambria Math"/>
+                            <a:latin typeface="Cambria Math" panose="02040503050406030204" pitchFamily="18" charset="0"/>
                           </a:rPr>
                         </m:ctrlPr>
                       </m:sSubPr>
@@ -11347,7 +11489,7 @@
                     </m:sSub>
                   </m:oMath>
                 </a14:m>
-                <a:endParaRPr lang="en-US" sz="2400" b="0" dirty="0" smtClean="0"/>
+                <a:endParaRPr lang="en-US" sz="2400" b="0" dirty="0"/>
               </a:p>
               <a:p>
                 <a14:m>
@@ -11356,7 +11498,7 @@
                       <m:sSubPr>
                         <m:ctrlPr>
                           <a:rPr lang="en-US" sz="2400" b="0" i="1" smtClean="0">
-                            <a:latin typeface="Cambria Math"/>
+                            <a:latin typeface="Cambria Math" panose="02040503050406030204" pitchFamily="18" charset="0"/>
                           </a:rPr>
                         </m:ctrlPr>
                       </m:sSubPr>
@@ -11379,7 +11521,7 @@
                     </m:sSub>
                   </m:oMath>
                 </a14:m>
-                <a:endParaRPr lang="en-US" sz="2400" b="0" dirty="0" smtClean="0"/>
+                <a:endParaRPr lang="en-US" sz="2400" b="0" dirty="0"/>
               </a:p>
               <a:p>
                 <a14:m>
@@ -11388,7 +11530,7 @@
                       <m:fPr>
                         <m:ctrlPr>
                           <a:rPr lang="en-US" sz="2400" b="0" i="1" smtClean="0">
-                            <a:latin typeface="Cambria Math"/>
+                            <a:latin typeface="Cambria Math" panose="02040503050406030204" pitchFamily="18" charset="0"/>
                           </a:rPr>
                         </m:ctrlPr>
                       </m:fPr>
@@ -11397,7 +11539,7 @@
                           <m:sSubPr>
                             <m:ctrlPr>
                               <a:rPr lang="en-US" sz="2400" b="0" i="1" smtClean="0">
-                                <a:latin typeface="Cambria Math"/>
+                                <a:latin typeface="Cambria Math" panose="02040503050406030204" pitchFamily="18" charset="0"/>
                               </a:rPr>
                             </m:ctrlPr>
                           </m:sSubPr>
@@ -11424,7 +11566,7 @@
                           <m:sSubPr>
                             <m:ctrlPr>
                               <a:rPr lang="en-US" sz="2400" b="0" i="1" smtClean="0">
-                                <a:latin typeface="Cambria Math"/>
+                                <a:latin typeface="Cambria Math" panose="02040503050406030204" pitchFamily="18" charset="0"/>
                               </a:rPr>
                             </m:ctrlPr>
                           </m:sSubPr>
@@ -11457,7 +11599,7 @@
                       <m:sSubPr>
                         <m:ctrlPr>
                           <a:rPr lang="en-US" sz="2400" b="0" i="1" smtClean="0">
-                            <a:latin typeface="Cambria Math"/>
+                            <a:latin typeface="Cambria Math" panose="02040503050406030204" pitchFamily="18" charset="0"/>
                           </a:rPr>
                         </m:ctrlPr>
                       </m:sSubPr>
@@ -11486,7 +11628,7 @@
                     </m:r>
                   </m:oMath>
                 </a14:m>
-                <a:endParaRPr lang="en-US" sz="2400" b="0" dirty="0" smtClean="0"/>
+                <a:endParaRPr lang="en-US" sz="2400" b="0" dirty="0"/>
               </a:p>
               <a:p>
                 <a14:m>
@@ -11495,7 +11637,7 @@
                       <m:sSubPr>
                         <m:ctrlPr>
                           <a:rPr lang="en-US" sz="2400" b="0" i="1" smtClean="0">
-                            <a:latin typeface="Cambria Math"/>
+                            <a:latin typeface="Cambria Math" panose="02040503050406030204" pitchFamily="18" charset="0"/>
                           </a:rPr>
                         </m:ctrlPr>
                       </m:sSubPr>
@@ -11518,16 +11660,16 @@
                     </m:sSub>
                   </m:oMath>
                 </a14:m>
-                <a:endParaRPr lang="en-US" sz="2400" b="0" dirty="0" smtClean="0"/>
+                <a:endParaRPr lang="en-US" sz="2400" b="0" dirty="0"/>
               </a:p>
               <a:p>
-                <a:endParaRPr lang="en-US" sz="2400" b="0" dirty="0" smtClean="0"/>
+                <a:endParaRPr lang="en-US" sz="2400" b="0" dirty="0"/>
               </a:p>
               <a:p>
-                <a:endParaRPr lang="en-US" b="0" dirty="0" smtClean="0"/>
+                <a:endParaRPr lang="en-US" b="0" dirty="0"/>
               </a:p>
               <a:p>
-                <a:endParaRPr lang="en-US" b="0" dirty="0" smtClean="0"/>
+                <a:endParaRPr lang="en-US" b="0" dirty="0"/>
               </a:p>
               <a:p>
                 <a:endParaRPr lang="en-US" dirty="0"/>
@@ -11648,7 +11790,7 @@
                         <m:chr m:val="̇"/>
                         <m:ctrlPr>
                           <a:rPr lang="en-US" sz="2400" b="0" i="1" smtClean="0">
-                            <a:latin typeface="Cambria Math"/>
+                            <a:latin typeface="Cambria Math" panose="02040503050406030204" pitchFamily="18" charset="0"/>
                           </a:rPr>
                         </m:ctrlPr>
                       </m:accPr>
@@ -11657,7 +11799,7 @@
                           <m:sSubPr>
                             <m:ctrlPr>
                               <a:rPr lang="en-US" sz="2400" b="0" i="1" smtClean="0">
-                                <a:latin typeface="Cambria Math"/>
+                                <a:latin typeface="Cambria Math" panose="02040503050406030204" pitchFamily="18" charset="0"/>
                               </a:rPr>
                             </m:ctrlPr>
                           </m:sSubPr>
@@ -11690,7 +11832,7 @@
                       <m:sSubPr>
                         <m:ctrlPr>
                           <a:rPr lang="en-US" sz="2400" b="0" i="1" smtClean="0">
-                            <a:latin typeface="Cambria Math"/>
+                            <a:latin typeface="Cambria Math" panose="02040503050406030204" pitchFamily="18" charset="0"/>
                           </a:rPr>
                         </m:ctrlPr>
                       </m:sSubPr>
@@ -11715,7 +11857,7 @@
                       <m:sSubSupPr>
                         <m:ctrlPr>
                           <a:rPr lang="en-US" sz="2400" b="0" i="1" smtClean="0">
-                            <a:latin typeface="Cambria Math"/>
+                            <a:latin typeface="Cambria Math" panose="02040503050406030204" pitchFamily="18" charset="0"/>
                           </a:rPr>
                         </m:ctrlPr>
                       </m:sSubSupPr>
@@ -11739,7 +11881,7 @@
                           <m:sSubPr>
                             <m:ctrlPr>
                               <a:rPr lang="en-US" sz="2400" b="0" i="1" smtClean="0">
-                                <a:latin typeface="Cambria Math"/>
+                                <a:latin typeface="Cambria Math" panose="02040503050406030204" pitchFamily="18" charset="0"/>
                               </a:rPr>
                             </m:ctrlPr>
                           </m:sSubPr>
@@ -11764,7 +11906,7 @@
                           <m:sSubPr>
                             <m:ctrlPr>
                               <a:rPr lang="en-US" sz="2400" b="0" i="1" smtClean="0">
-                                <a:latin typeface="Cambria Math"/>
+                                <a:latin typeface="Cambria Math" panose="02040503050406030204" pitchFamily="18" charset="0"/>
                               </a:rPr>
                             </m:ctrlPr>
                           </m:sSubPr>
@@ -11800,7 +11942,7 @@
                       <m:dPr>
                         <m:ctrlPr>
                           <a:rPr lang="en-US" sz="2400" b="0" i="1" smtClean="0">
-                            <a:latin typeface="Cambria Math"/>
+                            <a:latin typeface="Cambria Math" panose="02040503050406030204" pitchFamily="18" charset="0"/>
                           </a:rPr>
                         </m:ctrlPr>
                       </m:dPr>
@@ -11815,7 +11957,7 @@
                           <m:sSubPr>
                             <m:ctrlPr>
                               <a:rPr lang="en-US" sz="2400" b="0" i="1" smtClean="0">
-                                <a:latin typeface="Cambria Math"/>
+                                <a:latin typeface="Cambria Math" panose="02040503050406030204" pitchFamily="18" charset="0"/>
                               </a:rPr>
                             </m:ctrlPr>
                           </m:sSubPr>
@@ -11838,7 +11980,7 @@
                               <m:sSubPr>
                                 <m:ctrlPr>
                                   <a:rPr lang="en-US" sz="2400" b="0" i="1" smtClean="0">
-                                    <a:latin typeface="Cambria Math"/>
+                                    <a:latin typeface="Cambria Math" panose="02040503050406030204" pitchFamily="18" charset="0"/>
                                   </a:rPr>
                                 </m:ctrlPr>
                               </m:sSubPr>
@@ -11871,7 +12013,7 @@
                           <m:sSubPr>
                             <m:ctrlPr>
                               <a:rPr lang="en-US" sz="2400" b="0" i="1" smtClean="0">
-                                <a:latin typeface="Cambria Math"/>
+                                <a:latin typeface="Cambria Math" panose="02040503050406030204" pitchFamily="18" charset="0"/>
                               </a:rPr>
                             </m:ctrlPr>
                           </m:sSubPr>
@@ -11897,7 +12039,7 @@
                   </m:oMath>
                 </a14:m>
                 <a:r>
-                  <a:rPr lang="en-US" sz="2400" b="0" dirty="0" smtClean="0"/>
+                  <a:rPr lang="en-US" sz="2400" b="0" dirty="0"/>
                   <a:t>+</a:t>
                 </a:r>
                 <a14:m>
@@ -11906,7 +12048,7 @@
                       <m:sSubPr>
                         <m:ctrlPr>
                           <a:rPr lang="en-US" sz="2400" i="1">
-                            <a:latin typeface="Cambria Math"/>
+                            <a:latin typeface="Cambria Math" panose="02040503050406030204" pitchFamily="18" charset="0"/>
                           </a:rPr>
                         </m:ctrlPr>
                       </m:sSubPr>
@@ -11940,7 +12082,7 @@
                       <m:dPr>
                         <m:ctrlPr>
                           <a:rPr lang="en-US" sz="2400" i="1">
-                            <a:latin typeface="Cambria Math"/>
+                            <a:latin typeface="Cambria Math" panose="02040503050406030204" pitchFamily="18" charset="0"/>
                           </a:rPr>
                         </m:ctrlPr>
                       </m:dPr>
@@ -11955,7 +12097,7 @@
                           <m:sSubPr>
                             <m:ctrlPr>
                               <a:rPr lang="en-US" sz="2400" i="1">
-                                <a:latin typeface="Cambria Math"/>
+                                <a:latin typeface="Cambria Math" panose="02040503050406030204" pitchFamily="18" charset="0"/>
                               </a:rPr>
                             </m:ctrlPr>
                           </m:sSubPr>
@@ -11978,7 +12120,7 @@
                               <m:sSubPr>
                                 <m:ctrlPr>
                                   <a:rPr lang="en-US" sz="2400" i="1">
-                                    <a:latin typeface="Cambria Math"/>
+                                    <a:latin typeface="Cambria Math" panose="02040503050406030204" pitchFamily="18" charset="0"/>
                                   </a:rPr>
                                 </m:ctrlPr>
                               </m:sSubPr>
@@ -12011,7 +12153,7 @@
                           <m:sSubPr>
                             <m:ctrlPr>
                               <a:rPr lang="en-US" sz="2400" i="1">
-                                <a:latin typeface="Cambria Math"/>
+                                <a:latin typeface="Cambria Math" panose="02040503050406030204" pitchFamily="18" charset="0"/>
                               </a:rPr>
                             </m:ctrlPr>
                           </m:sSubPr>
@@ -12036,7 +12178,7 @@
                     </m:d>
                   </m:oMath>
                 </a14:m>
-                <a:endParaRPr lang="en-US" sz="2400" b="0" dirty="0" smtClean="0"/>
+                <a:endParaRPr lang="en-US" sz="2400" b="0" dirty="0"/>
               </a:p>
               <a:p>
                 <a14:m>
@@ -12045,7 +12187,7 @@
                       <m:sSubPr>
                         <m:ctrlPr>
                           <a:rPr lang="en-US" sz="2400" b="0" i="1" smtClean="0">
-                            <a:latin typeface="Cambria Math"/>
+                            <a:latin typeface="Cambria Math" panose="02040503050406030204" pitchFamily="18" charset="0"/>
                           </a:rPr>
                         </m:ctrlPr>
                       </m:sSubPr>
@@ -12068,7 +12210,7 @@
                           <m:sSubPr>
                             <m:ctrlPr>
                               <a:rPr lang="en-US" sz="2400" b="0" i="1" smtClean="0">
-                                <a:latin typeface="Cambria Math"/>
+                                <a:latin typeface="Cambria Math" panose="02040503050406030204" pitchFamily="18" charset="0"/>
                               </a:rPr>
                             </m:ctrlPr>
                           </m:sSubPr>
@@ -12093,7 +12235,7 @@
                     </m:sSub>
                   </m:oMath>
                 </a14:m>
-                <a:endParaRPr lang="en-US" sz="2400" b="0" dirty="0" smtClean="0"/>
+                <a:endParaRPr lang="en-US" sz="2400" b="0" dirty="0"/>
               </a:p>
               <a:p>
                 <a14:m>
@@ -12102,7 +12244,7 @@
                       <m:sSubPr>
                         <m:ctrlPr>
                           <a:rPr lang="en-US" sz="2400" b="0" i="1" smtClean="0">
-                            <a:latin typeface="Cambria Math"/>
+                            <a:latin typeface="Cambria Math" panose="02040503050406030204" pitchFamily="18" charset="0"/>
                           </a:rPr>
                         </m:ctrlPr>
                       </m:sSubPr>
@@ -12125,7 +12267,7 @@
                           <m:sSubPr>
                             <m:ctrlPr>
                               <a:rPr lang="en-US" sz="2400" b="0" i="1" smtClean="0">
-                                <a:latin typeface="Cambria Math"/>
+                                <a:latin typeface="Cambria Math" panose="02040503050406030204" pitchFamily="18" charset="0"/>
                               </a:rPr>
                             </m:ctrlPr>
                           </m:sSubPr>
@@ -12150,7 +12292,7 @@
                     </m:sSub>
                   </m:oMath>
                 </a14:m>
-                <a:endParaRPr lang="en-US" sz="2400" b="0" dirty="0" smtClean="0"/>
+                <a:endParaRPr lang="en-US" sz="2400" b="0" dirty="0"/>
               </a:p>
               <a:p>
                 <a14:m>
@@ -12159,7 +12301,7 @@
                       <m:sSubPr>
                         <m:ctrlPr>
                           <a:rPr lang="en-US" sz="2400" b="0" i="1" smtClean="0">
-                            <a:latin typeface="Cambria Math"/>
+                            <a:latin typeface="Cambria Math" panose="02040503050406030204" pitchFamily="18" charset="0"/>
                           </a:rPr>
                         </m:ctrlPr>
                       </m:sSubPr>
@@ -12182,7 +12324,7 @@
                     </m:sSub>
                   </m:oMath>
                 </a14:m>
-                <a:endParaRPr lang="en-US" sz="2400" b="0" dirty="0" smtClean="0"/>
+                <a:endParaRPr lang="en-US" sz="2400" b="0" dirty="0"/>
               </a:p>
               <a:p>
                 <a14:m>
@@ -12191,7 +12333,7 @@
                       <m:sSubPr>
                         <m:ctrlPr>
                           <a:rPr lang="en-US" sz="2400" b="0" i="1" smtClean="0">
-                            <a:latin typeface="Cambria Math"/>
+                            <a:latin typeface="Cambria Math" panose="02040503050406030204" pitchFamily="18" charset="0"/>
                           </a:rPr>
                         </m:ctrlPr>
                       </m:sSubPr>
@@ -12214,7 +12356,7 @@
                     </m:sSub>
                   </m:oMath>
                 </a14:m>
-                <a:endParaRPr lang="en-US" sz="2400" b="0" dirty="0" smtClean="0"/>
+                <a:endParaRPr lang="en-US" sz="2400" b="0" dirty="0"/>
               </a:p>
               <a:p>
                 <a14:m>
@@ -12223,7 +12365,7 @@
                       <m:sSubPr>
                         <m:ctrlPr>
                           <a:rPr lang="en-US" sz="2400" b="0" i="1" smtClean="0">
-                            <a:latin typeface="Cambria Math"/>
+                            <a:latin typeface="Cambria Math" panose="02040503050406030204" pitchFamily="18" charset="0"/>
                           </a:rPr>
                         </m:ctrlPr>
                       </m:sSubPr>
@@ -12247,7 +12389,7 @@
                   </m:oMath>
                 </a14:m>
                 <a:r>
-                  <a:rPr lang="en-US" sz="2400" b="0" dirty="0" smtClean="0"/>
+                  <a:rPr lang="en-US" sz="2400" b="0" dirty="0"/>
                   <a:t>			</a:t>
                 </a:r>
               </a:p>
@@ -12258,7 +12400,7 @@
                       <m:sSubPr>
                         <m:ctrlPr>
                           <a:rPr lang="en-US" sz="2400" b="0" i="1" smtClean="0">
-                            <a:latin typeface="Cambria Math"/>
+                            <a:latin typeface="Cambria Math" panose="02040503050406030204" pitchFamily="18" charset="0"/>
                           </a:rPr>
                         </m:ctrlPr>
                       </m:sSubPr>
@@ -12281,7 +12423,7 @@
                     </m:sSub>
                   </m:oMath>
                 </a14:m>
-                <a:endParaRPr lang="en-US" sz="2400" b="0" dirty="0" smtClean="0"/>
+                <a:endParaRPr lang="en-US" sz="2400" b="0" dirty="0"/>
               </a:p>
               <a:p>
                 <a14:m>
@@ -12291,7 +12433,7 @@
                         <m:chr m:val="̇"/>
                         <m:ctrlPr>
                           <a:rPr lang="en-US" sz="2400" b="0" i="1" smtClean="0">
-                            <a:latin typeface="Cambria Math"/>
+                            <a:latin typeface="Cambria Math" panose="02040503050406030204" pitchFamily="18" charset="0"/>
                           </a:rPr>
                         </m:ctrlPr>
                       </m:accPr>
@@ -12300,7 +12442,7 @@
                           <m:sSubPr>
                             <m:ctrlPr>
                               <a:rPr lang="en-US" sz="2400" b="0" i="1" smtClean="0">
-                                <a:latin typeface="Cambria Math"/>
+                                <a:latin typeface="Cambria Math" panose="02040503050406030204" pitchFamily="18" charset="0"/>
                               </a:rPr>
                             </m:ctrlPr>
                           </m:sSubPr>
@@ -12326,7 +12468,7 @@
                   </m:oMath>
                 </a14:m>
                 <a:r>
-                  <a:rPr lang="en-US" sz="2400" b="0" dirty="0" smtClean="0"/>
+                  <a:rPr lang="en-US" sz="2400" b="0" dirty="0"/>
                   <a:t>		</a:t>
                 </a:r>
                 <a14:m>
@@ -12336,7 +12478,7 @@
                         <m:chr m:val="̇"/>
                         <m:ctrlPr>
                           <a:rPr lang="en-US" sz="2400" b="0" i="1" smtClean="0">
-                            <a:latin typeface="Cambria Math"/>
+                            <a:latin typeface="Cambria Math" panose="02040503050406030204" pitchFamily="18" charset="0"/>
                           </a:rPr>
                         </m:ctrlPr>
                       </m:accPr>
@@ -12345,7 +12487,7 @@
                           <m:sSubPr>
                             <m:ctrlPr>
                               <a:rPr lang="en-US" sz="2400" b="0" i="1" smtClean="0">
-                                <a:latin typeface="Cambria Math"/>
+                                <a:latin typeface="Cambria Math" panose="02040503050406030204" pitchFamily="18" charset="0"/>
                               </a:rPr>
                             </m:ctrlPr>
                           </m:sSubPr>
@@ -12379,7 +12521,7 @@
                         <m:chr m:val="̇"/>
                         <m:ctrlPr>
                           <a:rPr lang="en-US" sz="2400" b="0" i="1" smtClean="0">
-                            <a:latin typeface="Cambria Math"/>
+                            <a:latin typeface="Cambria Math" panose="02040503050406030204" pitchFamily="18" charset="0"/>
                           </a:rPr>
                         </m:ctrlPr>
                       </m:accPr>
@@ -12388,7 +12530,7 @@
                           <m:sSubPr>
                             <m:ctrlPr>
                               <a:rPr lang="en-US" sz="2400" b="0" i="1" smtClean="0">
-                                <a:latin typeface="Cambria Math"/>
+                                <a:latin typeface="Cambria Math" panose="02040503050406030204" pitchFamily="18" charset="0"/>
                               </a:rPr>
                             </m:ctrlPr>
                           </m:sSubPr>
@@ -12422,7 +12564,7 @@
                         <m:chr m:val="̇"/>
                         <m:ctrlPr>
                           <a:rPr lang="en-US" sz="2400" b="0" i="1" smtClean="0">
-                            <a:latin typeface="Cambria Math"/>
+                            <a:latin typeface="Cambria Math" panose="02040503050406030204" pitchFamily="18" charset="0"/>
                           </a:rPr>
                         </m:ctrlPr>
                       </m:accPr>
@@ -12431,7 +12573,7 @@
                           <m:sSubPr>
                             <m:ctrlPr>
                               <a:rPr lang="en-US" sz="2400" b="0" i="1" smtClean="0">
-                                <a:latin typeface="Cambria Math"/>
+                                <a:latin typeface="Cambria Math" panose="02040503050406030204" pitchFamily="18" charset="0"/>
                               </a:rPr>
                             </m:ctrlPr>
                           </m:sSubPr>
@@ -12463,7 +12605,7 @@
                   </m:oMath>
                 </a14:m>
                 <a:r>
-                  <a:rPr lang="en-US" sz="2400" b="0" dirty="0" smtClean="0"/>
+                  <a:rPr lang="en-US" sz="2400" b="0" dirty="0"/>
                   <a:t>		</a:t>
                 </a:r>
               </a:p>
@@ -12474,7 +12616,7 @@
                       <m:sSubPr>
                         <m:ctrlPr>
                           <a:rPr lang="en-US" sz="2400" b="0" i="1" smtClean="0">
-                            <a:latin typeface="Cambria Math"/>
+                            <a:latin typeface="Cambria Math" panose="02040503050406030204" pitchFamily="18" charset="0"/>
                           </a:rPr>
                         </m:ctrlPr>
                       </m:sSubPr>
@@ -12506,7 +12648,7 @@
                         <m:type m:val="lin"/>
                         <m:ctrlPr>
                           <a:rPr lang="en-US" sz="2400" b="0" i="1" smtClean="0">
-                            <a:latin typeface="Cambria Math"/>
+                            <a:latin typeface="Cambria Math" panose="02040503050406030204" pitchFamily="18" charset="0"/>
                           </a:rPr>
                         </m:ctrlPr>
                       </m:fPr>
@@ -12516,7 +12658,7 @@
                             <m:chr m:val="̇"/>
                             <m:ctrlPr>
                               <a:rPr lang="en-US" sz="2400" b="0" i="1" smtClean="0">
-                                <a:latin typeface="Cambria Math"/>
+                                <a:latin typeface="Cambria Math" panose="02040503050406030204" pitchFamily="18" charset="0"/>
                               </a:rPr>
                             </m:ctrlPr>
                           </m:accPr>
@@ -12525,7 +12667,7 @@
                               <m:sSubPr>
                                 <m:ctrlPr>
                                   <a:rPr lang="en-US" sz="2400" b="0" i="1" smtClean="0">
-                                    <a:latin typeface="Cambria Math"/>
+                                    <a:latin typeface="Cambria Math" panose="02040503050406030204" pitchFamily="18" charset="0"/>
                                   </a:rPr>
                                 </m:ctrlPr>
                               </m:sSubPr>
@@ -12554,7 +12696,7 @@
                           <m:sSubPr>
                             <m:ctrlPr>
                               <a:rPr lang="en-US" sz="2400" b="0" i="1" smtClean="0">
-                                <a:latin typeface="Cambria Math"/>
+                                <a:latin typeface="Cambria Math" panose="02040503050406030204" pitchFamily="18" charset="0"/>
                               </a:rPr>
                             </m:ctrlPr>
                           </m:sSubPr>
@@ -12580,21 +12722,21 @@
                   </m:oMath>
                 </a14:m>
                 <a:r>
-                  <a:rPr lang="en-US" sz="2400" b="0" dirty="0" smtClean="0"/>
+                  <a:rPr lang="en-US" sz="2400" b="0" dirty="0"/>
                   <a:t>			</a:t>
                 </a:r>
               </a:p>
               <a:p>
-                <a:endParaRPr lang="en-US" sz="2400" b="0" dirty="0" smtClean="0"/>
+                <a:endParaRPr lang="en-US" sz="2400" b="0" dirty="0"/>
               </a:p>
               <a:p>
-                <a:endParaRPr lang="en-US" sz="2400" b="0" dirty="0" smtClean="0"/>
+                <a:endParaRPr lang="en-US" sz="2400" b="0" dirty="0"/>
               </a:p>
               <a:p>
-                <a:endParaRPr lang="en-US" b="0" dirty="0" smtClean="0"/>
+                <a:endParaRPr lang="en-US" b="0" dirty="0"/>
               </a:p>
               <a:p>
-                <a:endParaRPr lang="en-US" b="0" dirty="0" smtClean="0"/>
+                <a:endParaRPr lang="en-US" b="0" dirty="0"/>
               </a:p>
               <a:p>
                 <a:endParaRPr lang="en-US" dirty="0"/>
@@ -12710,7 +12852,7 @@
                       <m:sSubPr>
                         <m:ctrlPr>
                           <a:rPr lang="en-US" sz="2400" b="0" i="1" smtClean="0">
-                            <a:latin typeface="Cambria Math"/>
+                            <a:latin typeface="Cambria Math" panose="02040503050406030204" pitchFamily="18" charset="0"/>
                           </a:rPr>
                         </m:ctrlPr>
                       </m:sSubPr>
@@ -12743,7 +12885,7 @@
                         <m:endChr m:val=""/>
                         <m:ctrlPr>
                           <a:rPr lang="en-US" sz="2400" b="0" i="1" smtClean="0">
-                            <a:latin typeface="Cambria Math"/>
+                            <a:latin typeface="Cambria Math" panose="02040503050406030204" pitchFamily="18" charset="0"/>
                           </a:rPr>
                         </m:ctrlPr>
                       </m:dPr>
@@ -12752,7 +12894,7 @@
                           <m:eqArrPr>
                             <m:ctrlPr>
                               <a:rPr lang="en-US" sz="2400" b="0" i="1" smtClean="0">
-                                <a:latin typeface="Cambria Math"/>
+                                <a:latin typeface="Cambria Math" panose="02040503050406030204" pitchFamily="18" charset="0"/>
                               </a:rPr>
                             </m:ctrlPr>
                           </m:eqArrPr>
@@ -12774,7 +12916,7 @@
                                 <m:chr m:val="̇"/>
                                 <m:ctrlPr>
                                   <a:rPr lang="en-US" sz="2400" b="0" i="1" smtClean="0">
-                                    <a:latin typeface="Cambria Math"/>
+                                    <a:latin typeface="Cambria Math" panose="02040503050406030204" pitchFamily="18" charset="0"/>
                                   </a:rPr>
                                 </m:ctrlPr>
                               </m:accPr>
@@ -12783,7 +12925,7 @@
                                   <m:sSubPr>
                                     <m:ctrlPr>
                                       <a:rPr lang="en-US" sz="2400" b="0" i="1" smtClean="0">
-                                        <a:latin typeface="Cambria Math"/>
+                                        <a:latin typeface="Cambria Math" panose="02040503050406030204" pitchFamily="18" charset="0"/>
                                       </a:rPr>
                                     </m:ctrlPr>
                                   </m:sSubPr>
@@ -12843,7 +12985,7 @@
                               <m:sSubPr>
                                 <m:ctrlPr>
                                   <a:rPr lang="en-US" sz="2400" b="0" i="1" smtClean="0">
-                                    <a:latin typeface="Cambria Math"/>
+                                    <a:latin typeface="Cambria Math" panose="02040503050406030204" pitchFamily="18" charset="0"/>
                                   </a:rPr>
                                 </m:ctrlPr>
                               </m:sSubPr>
@@ -12875,7 +13017,7 @@
                               <m:sSubPr>
                                 <m:ctrlPr>
                                   <a:rPr lang="en-US" sz="2400" b="0" i="1" smtClean="0">
-                                    <a:latin typeface="Cambria Math"/>
+                                    <a:latin typeface="Cambria Math" panose="02040503050406030204" pitchFamily="18" charset="0"/>
                                     <a:ea typeface="Cambria Math"/>
                                   </a:rPr>
                                 </m:ctrlPr>
@@ -12911,7 +13053,7 @@
                               <m:sSubPr>
                                 <m:ctrlPr>
                                   <a:rPr lang="en-US" sz="2400" b="0" i="1" smtClean="0">
-                                    <a:latin typeface="Cambria Math"/>
+                                    <a:latin typeface="Cambria Math" panose="02040503050406030204" pitchFamily="18" charset="0"/>
                                   </a:rPr>
                                 </m:ctrlPr>
                               </m:sSubPr>
@@ -12963,7 +13105,7 @@
                               <m:sSubPr>
                                 <m:ctrlPr>
                                   <a:rPr lang="en-US" sz="2400" b="0" i="1" smtClean="0">
-                                    <a:latin typeface="Cambria Math"/>
+                                    <a:latin typeface="Cambria Math" panose="02040503050406030204" pitchFamily="18" charset="0"/>
                                   </a:rPr>
                                 </m:ctrlPr>
                               </m:sSubPr>
@@ -12994,7 +13136,7 @@
                               <m:sSubPr>
                                 <m:ctrlPr>
                                   <a:rPr lang="en-US" sz="2400" b="0" i="1" smtClean="0">
-                                    <a:latin typeface="Cambria Math"/>
+                                    <a:latin typeface="Cambria Math" panose="02040503050406030204" pitchFamily="18" charset="0"/>
                                   </a:rPr>
                                 </m:ctrlPr>
                               </m:sSubPr>
@@ -13021,7 +13163,7 @@
                     </m:d>
                   </m:oMath>
                 </a14:m>
-                <a:endParaRPr lang="en-US" sz="2400" dirty="0" smtClean="0"/>
+                <a:endParaRPr lang="en-US" sz="2400" dirty="0"/>
               </a:p>
               <a:p>
                 <a14:m>
@@ -13030,7 +13172,7 @@
                       <m:sSubPr>
                         <m:ctrlPr>
                           <a:rPr lang="en-US" sz="2400" b="0" i="1" smtClean="0">
-                            <a:latin typeface="Cambria Math"/>
+                            <a:latin typeface="Cambria Math" panose="02040503050406030204" pitchFamily="18" charset="0"/>
                           </a:rPr>
                         </m:ctrlPr>
                       </m:sSubPr>
@@ -13061,7 +13203,7 @@
                       <m:fPr>
                         <m:ctrlPr>
                           <a:rPr lang="en-US" sz="2400" i="1" smtClean="0">
-                            <a:latin typeface="Cambria Math"/>
+                            <a:latin typeface="Cambria Math" panose="02040503050406030204" pitchFamily="18" charset="0"/>
                           </a:rPr>
                         </m:ctrlPr>
                       </m:fPr>
@@ -13070,7 +13212,7 @@
                           <m:sSubPr>
                             <m:ctrlPr>
                               <a:rPr lang="en-US" sz="2400" b="0" i="1" smtClean="0">
-                                <a:latin typeface="Cambria Math"/>
+                                <a:latin typeface="Cambria Math" panose="02040503050406030204" pitchFamily="18" charset="0"/>
                               </a:rPr>
                             </m:ctrlPr>
                           </m:sSubPr>
@@ -13101,7 +13243,7 @@
                           <m:sSubPr>
                             <m:ctrlPr>
                               <a:rPr lang="en-US" sz="2400" b="0" i="1" smtClean="0">
-                                <a:latin typeface="Cambria Math"/>
+                                <a:latin typeface="Cambria Math" panose="02040503050406030204" pitchFamily="18" charset="0"/>
                               </a:rPr>
                             </m:ctrlPr>
                           </m:sSubPr>
@@ -13128,7 +13270,7 @@
                           <m:sSubPr>
                             <m:ctrlPr>
                               <a:rPr lang="en-US" sz="2400" b="0" i="1" smtClean="0">
-                                <a:latin typeface="Cambria Math"/>
+                                <a:latin typeface="Cambria Math" panose="02040503050406030204" pitchFamily="18" charset="0"/>
                               </a:rPr>
                             </m:ctrlPr>
                           </m:sSubPr>
@@ -13153,10 +13295,10 @@
                     </m:f>
                   </m:oMath>
                 </a14:m>
-                <a:endParaRPr lang="en-US" sz="2400" dirty="0" smtClean="0"/>
+                <a:endParaRPr lang="en-US" sz="2400" dirty="0"/>
               </a:p>
               <a:p>
-                <a:endParaRPr lang="en-US" sz="2400" dirty="0" smtClean="0"/>
+                <a:endParaRPr lang="en-US" sz="2400" dirty="0"/>
               </a:p>
               <a:p>
                 <a14:m>
@@ -13165,7 +13307,7 @@
                       <m:sSubPr>
                         <m:ctrlPr>
                           <a:rPr lang="en-US" sz="2400" i="1">
-                            <a:latin typeface="Cambria Math"/>
+                            <a:latin typeface="Cambria Math" panose="02040503050406030204" pitchFamily="18" charset="0"/>
                           </a:rPr>
                         </m:ctrlPr>
                       </m:sSubPr>
@@ -13196,7 +13338,7 @@
                       <m:fPr>
                         <m:ctrlPr>
                           <a:rPr lang="en-US" sz="2400" i="1">
-                            <a:latin typeface="Cambria Math"/>
+                            <a:latin typeface="Cambria Math" panose="02040503050406030204" pitchFamily="18" charset="0"/>
                           </a:rPr>
                         </m:ctrlPr>
                       </m:fPr>
@@ -13205,7 +13347,7 @@
                           <m:sSubPr>
                             <m:ctrlPr>
                               <a:rPr lang="en-US" sz="2400" b="0" i="1" smtClean="0">
-                                <a:latin typeface="Cambria Math"/>
+                                <a:latin typeface="Cambria Math" panose="02040503050406030204" pitchFamily="18" charset="0"/>
                               </a:rPr>
                             </m:ctrlPr>
                           </m:sSubPr>
@@ -13232,7 +13374,7 @@
                           <m:sSubPr>
                             <m:ctrlPr>
                               <a:rPr lang="en-US" sz="2400" i="1">
-                                <a:latin typeface="Cambria Math"/>
+                                <a:latin typeface="Cambria Math" panose="02040503050406030204" pitchFamily="18" charset="0"/>
                               </a:rPr>
                             </m:ctrlPr>
                           </m:sSubPr>
@@ -13275,7 +13417,7 @@
                           <m:sSubPr>
                             <m:ctrlPr>
                               <a:rPr lang="en-US" sz="2400" i="1">
-                                <a:latin typeface="Cambria Math"/>
+                                <a:latin typeface="Cambria Math" panose="02040503050406030204" pitchFamily="18" charset="0"/>
                               </a:rPr>
                             </m:ctrlPr>
                           </m:sSubPr>
@@ -13318,7 +13460,7 @@
                     </m:f>
                   </m:oMath>
                 </a14:m>
-                <a:endParaRPr lang="en-US" sz="2400" dirty="0" smtClean="0"/>
+                <a:endParaRPr lang="en-US" sz="2400" dirty="0"/>
               </a:p>
               <a:p>
                 <a14:m>
@@ -13328,7 +13470,7 @@
                         <m:chr m:val="̇"/>
                         <m:ctrlPr>
                           <a:rPr lang="en-US" sz="2400" i="1" smtClean="0">
-                            <a:latin typeface="Cambria Math"/>
+                            <a:latin typeface="Cambria Math" panose="02040503050406030204" pitchFamily="18" charset="0"/>
                           </a:rPr>
                         </m:ctrlPr>
                       </m:accPr>
@@ -13337,7 +13479,7 @@
                           <m:sSubPr>
                             <m:ctrlPr>
                               <a:rPr lang="en-US" sz="2400" b="0" i="1" smtClean="0">
-                                <a:latin typeface="Cambria Math"/>
+                                <a:latin typeface="Cambria Math" panose="02040503050406030204" pitchFamily="18" charset="0"/>
                               </a:rPr>
                             </m:ctrlPr>
                           </m:sSubPr>
@@ -13376,7 +13518,7 @@
                       <m:dPr>
                         <m:ctrlPr>
                           <a:rPr lang="en-US" sz="2400" b="0" i="1" smtClean="0">
-                            <a:latin typeface="Cambria Math"/>
+                            <a:latin typeface="Cambria Math" panose="02040503050406030204" pitchFamily="18" charset="0"/>
                           </a:rPr>
                         </m:ctrlPr>
                       </m:dPr>
@@ -13385,7 +13527,7 @@
                           <m:sSubPr>
                             <m:ctrlPr>
                               <a:rPr lang="en-US" sz="2400" b="0" i="1" smtClean="0">
-                                <a:latin typeface="Cambria Math"/>
+                                <a:latin typeface="Cambria Math" panose="02040503050406030204" pitchFamily="18" charset="0"/>
                               </a:rPr>
                             </m:ctrlPr>
                           </m:sSubPr>
@@ -13422,7 +13564,7 @@
                     </m:d>
                   </m:oMath>
                 </a14:m>
-                <a:endParaRPr lang="en-US" sz="2400" dirty="0" smtClean="0"/>
+                <a:endParaRPr lang="en-US" sz="2400" dirty="0"/>
               </a:p>
               <a:p>
                 <a:endParaRPr lang="en-US" sz="2400" dirty="0"/>

</xml_diff>

<commit_message>
Lots of respiratory documentation updates. Updated current vs initial patient logic in respiratory system. Added a spirometry scenario and removed similar compliance validation scenario.
</commit_message>
<xml_diff>
--- a/docs/Figures/RespiratoryWorking.pptx
+++ b/docs/Figures/RespiratoryWorking.pptx
@@ -6,24 +6,25 @@
     <p:sldMasterId id="2147483672" r:id="rId2"/>
   </p:sldMasterIdLst>
   <p:notesMasterIdLst>
-    <p:notesMasterId r:id="rId18"/>
+    <p:notesMasterId r:id="rId19"/>
   </p:notesMasterIdLst>
   <p:sldIdLst>
     <p:sldId id="283" r:id="rId3"/>
     <p:sldId id="290" r:id="rId4"/>
     <p:sldId id="291" r:id="rId5"/>
     <p:sldId id="292" r:id="rId6"/>
-    <p:sldId id="267" r:id="rId7"/>
-    <p:sldId id="268" r:id="rId8"/>
-    <p:sldId id="269" r:id="rId9"/>
-    <p:sldId id="270" r:id="rId10"/>
-    <p:sldId id="271" r:id="rId11"/>
-    <p:sldId id="272" r:id="rId12"/>
-    <p:sldId id="273" r:id="rId13"/>
-    <p:sldId id="286" r:id="rId14"/>
-    <p:sldId id="287" r:id="rId15"/>
-    <p:sldId id="288" r:id="rId16"/>
-    <p:sldId id="289" r:id="rId17"/>
+    <p:sldId id="293" r:id="rId7"/>
+    <p:sldId id="267" r:id="rId8"/>
+    <p:sldId id="268" r:id="rId9"/>
+    <p:sldId id="269" r:id="rId10"/>
+    <p:sldId id="270" r:id="rId11"/>
+    <p:sldId id="271" r:id="rId12"/>
+    <p:sldId id="272" r:id="rId13"/>
+    <p:sldId id="273" r:id="rId14"/>
+    <p:sldId id="286" r:id="rId15"/>
+    <p:sldId id="287" r:id="rId16"/>
+    <p:sldId id="288" r:id="rId17"/>
+    <p:sldId id="289" r:id="rId18"/>
   </p:sldIdLst>
   <p:sldSz cx="9144000" cy="6858000" type="screen4x3"/>
   <p:notesSz cx="6996113" cy="9282113"/>
@@ -223,7 +224,7 @@
           <a:p>
             <a:fld id="{7B126BB8-5932-4ACC-8CD5-328D9DA138C9}" type="datetimeFigureOut">
               <a:rPr lang="en-US" smtClean="0"/>
-              <a:t>1/2/2020</a:t>
+              <a:t>1/4/2020</a:t>
             </a:fld>
             <a:endParaRPr lang="en-US"/>
           </a:p>
@@ -669,7 +670,7 @@
           <a:p>
             <a:fld id="{9E9AFD63-10BD-4598-9E1E-9FFECB76D2D7}" type="datetimeFigureOut">
               <a:rPr lang="en-US" smtClean="0"/>
-              <a:t>1/2/2020</a:t>
+              <a:t>1/4/2020</a:t>
             </a:fld>
             <a:endParaRPr lang="en-US"/>
           </a:p>
@@ -837,7 +838,7 @@
           <a:p>
             <a:fld id="{9E9AFD63-10BD-4598-9E1E-9FFECB76D2D7}" type="datetimeFigureOut">
               <a:rPr lang="en-US" smtClean="0"/>
-              <a:t>1/2/2020</a:t>
+              <a:t>1/4/2020</a:t>
             </a:fld>
             <a:endParaRPr lang="en-US"/>
           </a:p>
@@ -1015,7 +1016,7 @@
           <a:p>
             <a:fld id="{9E9AFD63-10BD-4598-9E1E-9FFECB76D2D7}" type="datetimeFigureOut">
               <a:rPr lang="en-US" smtClean="0"/>
-              <a:t>1/2/2020</a:t>
+              <a:t>1/4/2020</a:t>
             </a:fld>
             <a:endParaRPr lang="en-US"/>
           </a:p>
@@ -2770,7 +2771,7 @@
           <a:p>
             <a:fld id="{9E9AFD63-10BD-4598-9E1E-9FFECB76D2D7}" type="datetimeFigureOut">
               <a:rPr lang="en-US" smtClean="0"/>
-              <a:t>1/2/2020</a:t>
+              <a:t>1/4/2020</a:t>
             </a:fld>
             <a:endParaRPr lang="en-US"/>
           </a:p>
@@ -3214,7 +3215,7 @@
           <a:p>
             <a:fld id="{9E9AFD63-10BD-4598-9E1E-9FFECB76D2D7}" type="datetimeFigureOut">
               <a:rPr lang="en-US" smtClean="0"/>
-              <a:t>1/2/2020</a:t>
+              <a:t>1/4/2020</a:t>
             </a:fld>
             <a:endParaRPr lang="en-US"/>
           </a:p>
@@ -3499,7 +3500,7 @@
           <a:p>
             <a:fld id="{9E9AFD63-10BD-4598-9E1E-9FFECB76D2D7}" type="datetimeFigureOut">
               <a:rPr lang="en-US" smtClean="0"/>
-              <a:t>1/2/2020</a:t>
+              <a:t>1/4/2020</a:t>
             </a:fld>
             <a:endParaRPr lang="en-US"/>
           </a:p>
@@ -3918,7 +3919,7 @@
           <a:p>
             <a:fld id="{9E9AFD63-10BD-4598-9E1E-9FFECB76D2D7}" type="datetimeFigureOut">
               <a:rPr lang="en-US" smtClean="0"/>
-              <a:t>1/2/2020</a:t>
+              <a:t>1/4/2020</a:t>
             </a:fld>
             <a:endParaRPr lang="en-US"/>
           </a:p>
@@ -4035,7 +4036,7 @@
           <a:p>
             <a:fld id="{9E9AFD63-10BD-4598-9E1E-9FFECB76D2D7}" type="datetimeFigureOut">
               <a:rPr lang="en-US" smtClean="0"/>
-              <a:t>1/2/2020</a:t>
+              <a:t>1/4/2020</a:t>
             </a:fld>
             <a:endParaRPr lang="en-US"/>
           </a:p>
@@ -4130,7 +4131,7 @@
           <a:p>
             <a:fld id="{9E9AFD63-10BD-4598-9E1E-9FFECB76D2D7}" type="datetimeFigureOut">
               <a:rPr lang="en-US" smtClean="0"/>
-              <a:t>1/2/2020</a:t>
+              <a:t>1/4/2020</a:t>
             </a:fld>
             <a:endParaRPr lang="en-US"/>
           </a:p>
@@ -4405,7 +4406,7 @@
           <a:p>
             <a:fld id="{9E9AFD63-10BD-4598-9E1E-9FFECB76D2D7}" type="datetimeFigureOut">
               <a:rPr lang="en-US" smtClean="0"/>
-              <a:t>1/2/2020</a:t>
+              <a:t>1/4/2020</a:t>
             </a:fld>
             <a:endParaRPr lang="en-US"/>
           </a:p>
@@ -4657,7 +4658,7 @@
           <a:p>
             <a:fld id="{9E9AFD63-10BD-4598-9E1E-9FFECB76D2D7}" type="datetimeFigureOut">
               <a:rPr lang="en-US" smtClean="0"/>
-              <a:t>1/2/2020</a:t>
+              <a:t>1/4/2020</a:t>
             </a:fld>
             <a:endParaRPr lang="en-US"/>
           </a:p>
@@ -4868,7 +4869,7 @@
           <a:p>
             <a:fld id="{9E9AFD63-10BD-4598-9E1E-9FFECB76D2D7}" type="datetimeFigureOut">
               <a:rPr lang="en-US" smtClean="0"/>
-              <a:t>1/2/2020</a:t>
+              <a:t>1/4/2020</a:t>
             </a:fld>
             <a:endParaRPr lang="en-US"/>
           </a:p>
@@ -7286,6 +7287,632 @@
                 <p:ph idx="1"/>
               </p:nvPr>
             </p:nvSpPr>
+            <p:spPr>
+              <a:xfrm>
+                <a:off x="152400" y="1600200"/>
+                <a:ext cx="8991600" cy="4525963"/>
+              </a:xfrm>
+            </p:spPr>
+            <p:txBody>
+              <a:bodyPr>
+                <a:noAutofit/>
+              </a:bodyPr>
+              <a:lstStyle/>
+              <a:p>
+                <a14:m>
+                  <m:oMath xmlns:m="http://schemas.openxmlformats.org/officeDocument/2006/math">
+                    <m:sSub>
+                      <m:sSubPr>
+                        <m:ctrlPr>
+                          <a:rPr lang="en-US" sz="2400" b="0" i="1" smtClean="0">
+                            <a:latin typeface="Cambria Math" panose="02040503050406030204" pitchFamily="18" charset="0"/>
+                          </a:rPr>
+                        </m:ctrlPr>
+                      </m:sSubPr>
+                      <m:e>
+                        <m:r>
+                          <a:rPr lang="en-US" sz="2400" b="0" i="1" smtClean="0">
+                            <a:latin typeface="Cambria Math"/>
+                          </a:rPr>
+                          <m:t>𝑓</m:t>
+                        </m:r>
+                      </m:e>
+                      <m:sub>
+                        <m:r>
+                          <a:rPr lang="en-US" sz="2400" b="0" i="1" smtClean="0">
+                            <a:latin typeface="Cambria Math"/>
+                          </a:rPr>
+                          <m:t>𝑣</m:t>
+                        </m:r>
+                      </m:sub>
+                    </m:sSub>
+                    <m:r>
+                      <a:rPr lang="en-US" sz="2400" b="0" i="1" smtClean="0">
+                        <a:latin typeface="Cambria Math"/>
+                      </a:rPr>
+                      <m:t>(</m:t>
+                    </m:r>
+                    <m:r>
+                      <a:rPr lang="en-US" sz="2400" b="0" i="1" smtClean="0">
+                        <a:latin typeface="Cambria Math"/>
+                        <a:ea typeface="Cambria Math"/>
+                      </a:rPr>
+                      <m:t>≡</m:t>
+                    </m:r>
+                    <m:f>
+                      <m:fPr>
+                        <m:ctrlPr>
+                          <a:rPr lang="en-US" sz="2400" b="0" i="1" smtClean="0">
+                            <a:latin typeface="Cambria Math" panose="02040503050406030204" pitchFamily="18" charset="0"/>
+                            <a:ea typeface="Cambria Math"/>
+                          </a:rPr>
+                        </m:ctrlPr>
+                      </m:fPr>
+                      <m:num>
+                        <m:r>
+                          <a:rPr lang="en-US" sz="2400" b="0" i="1" smtClean="0">
+                            <a:latin typeface="Cambria Math"/>
+                            <a:ea typeface="Cambria Math"/>
+                          </a:rPr>
+                          <m:t>1</m:t>
+                        </m:r>
+                      </m:num>
+                      <m:den>
+                        <m:sSub>
+                          <m:sSubPr>
+                            <m:ctrlPr>
+                              <a:rPr lang="en-US" sz="2400" b="0" i="1" smtClean="0">
+                                <a:latin typeface="Cambria Math" panose="02040503050406030204" pitchFamily="18" charset="0"/>
+                                <a:ea typeface="Cambria Math"/>
+                              </a:rPr>
+                            </m:ctrlPr>
+                          </m:sSubPr>
+                          <m:e>
+                            <m:r>
+                              <a:rPr lang="en-US" sz="2400" b="0" i="1" smtClean="0">
+                                <a:latin typeface="Cambria Math"/>
+                                <a:ea typeface="Cambria Math"/>
+                              </a:rPr>
+                              <m:t>𝑇</m:t>
+                            </m:r>
+                          </m:e>
+                          <m:sub>
+                            <m:r>
+                              <a:rPr lang="en-US" sz="2400" b="0" i="1" smtClean="0">
+                                <a:latin typeface="Cambria Math"/>
+                                <a:ea typeface="Cambria Math"/>
+                              </a:rPr>
+                              <m:t>𝑡𝑜𝑡</m:t>
+                            </m:r>
+                          </m:sub>
+                        </m:sSub>
+                      </m:den>
+                    </m:f>
+                  </m:oMath>
+                </a14:m>
+                <a:r>
+                  <a:rPr lang="en-US" sz="2400" b="0" dirty="0"/>
+                  <a:t>)</a:t>
+                </a:r>
+              </a:p>
+              <a:p>
+                <a14:m>
+                  <m:oMath xmlns:m="http://schemas.openxmlformats.org/officeDocument/2006/math">
+                    <m:sSub>
+                      <m:sSubPr>
+                        <m:ctrlPr>
+                          <a:rPr lang="en-US" sz="2400" b="0" i="1" smtClean="0">
+                            <a:latin typeface="Cambria Math" panose="02040503050406030204" pitchFamily="18" charset="0"/>
+                          </a:rPr>
+                        </m:ctrlPr>
+                      </m:sSubPr>
+                      <m:e>
+                        <m:r>
+                          <a:rPr lang="en-US" sz="2400" b="0" i="1" smtClean="0">
+                            <a:latin typeface="Cambria Math"/>
+                          </a:rPr>
+                          <m:t>𝑃</m:t>
+                        </m:r>
+                      </m:e>
+                      <m:sub>
+                        <m:r>
+                          <a:rPr lang="en-US" sz="2400" b="0" i="1" smtClean="0">
+                            <a:latin typeface="Cambria Math"/>
+                          </a:rPr>
+                          <m:t>0.1</m:t>
+                        </m:r>
+                      </m:sub>
+                    </m:sSub>
+                  </m:oMath>
+                </a14:m>
+                <a:endParaRPr lang="en-US" sz="2400" b="0" dirty="0"/>
+              </a:p>
+              <a:p>
+                <a:r>
+                  <a:rPr lang="en-US" sz="2200" dirty="0">
+                    <a:latin typeface="Cambria Math"/>
+                  </a:rPr>
+                  <a:t>𝑃</a:t>
+                </a:r>
+                <a:r>
+                  <a:rPr lang="en-US" sz="2800" baseline="-25000" dirty="0">
+                    <a:latin typeface="Cambria Math"/>
+                  </a:rPr>
+                  <a:t>𝑚𝑎𝑥</a:t>
+                </a:r>
+                <a:r>
+                  <a:rPr lang="en-US" sz="2200" dirty="0">
+                    <a:latin typeface="Cambria Math"/>
+                  </a:rPr>
+                  <a:t>=−</a:t>
+                </a:r>
+                <a:r>
+                  <a:rPr lang="en-US" sz="2000" dirty="0">
+                    <a:latin typeface="Cambria Math"/>
+                  </a:rPr>
+                  <a:t>0.3743</a:t>
+                </a:r>
+                <a:r>
+                  <a:rPr lang="en-US" sz="2200" dirty="0">
+                    <a:latin typeface="Cambria Math"/>
+                  </a:rPr>
+                  <a:t>𝑉</a:t>
+                </a:r>
+                <a:r>
+                  <a:rPr lang="en-US" sz="2200" baseline="30000" dirty="0">
+                    <a:latin typeface="Cambria Math"/>
+                  </a:rPr>
+                  <a:t>5</a:t>
+                </a:r>
+                <a:r>
+                  <a:rPr lang="en-US" sz="2200" dirty="0">
+                    <a:latin typeface="Cambria Math"/>
+                  </a:rPr>
+                  <a:t>+</a:t>
+                </a:r>
+                <a:r>
+                  <a:rPr lang="en-US" sz="2000" dirty="0">
+                    <a:latin typeface="Cambria Math"/>
+                  </a:rPr>
+                  <a:t>7.4105</a:t>
+                </a:r>
+                <a:r>
+                  <a:rPr lang="en-US" sz="2200" dirty="0">
+                    <a:latin typeface="Cambria Math"/>
+                  </a:rPr>
+                  <a:t>𝑉</a:t>
+                </a:r>
+                <a:r>
+                  <a:rPr lang="en-US" sz="2200" baseline="30000" dirty="0">
+                    <a:latin typeface="Cambria Math"/>
+                  </a:rPr>
+                  <a:t>4</a:t>
+                </a:r>
+                <a:r>
+                  <a:rPr lang="en-US" sz="2200" dirty="0">
+                    <a:latin typeface="Cambria Math"/>
+                  </a:rPr>
+                  <a:t>−</a:t>
+                </a:r>
+                <a:r>
+                  <a:rPr lang="en-US" sz="2000" dirty="0">
+                    <a:latin typeface="Cambria Math"/>
+                  </a:rPr>
+                  <a:t>57.076</a:t>
+                </a:r>
+                <a:r>
+                  <a:rPr lang="en-US" sz="2200" dirty="0">
+                    <a:latin typeface="Cambria Math"/>
+                  </a:rPr>
+                  <a:t>𝑉</a:t>
+                </a:r>
+                <a:r>
+                  <a:rPr lang="en-US" sz="2200" baseline="30000" dirty="0">
+                    <a:latin typeface="Cambria Math"/>
+                  </a:rPr>
+                  <a:t>3</a:t>
+                </a:r>
+                <a:r>
+                  <a:rPr lang="en-US" sz="2200" dirty="0">
+                    <a:latin typeface="Cambria Math"/>
+                  </a:rPr>
+                  <a:t>+</a:t>
+                </a:r>
+                <a:r>
+                  <a:rPr lang="en-US" sz="2000" dirty="0">
+                    <a:latin typeface="Cambria Math"/>
+                  </a:rPr>
+                  <a:t>214.11</a:t>
+                </a:r>
+                <a:r>
+                  <a:rPr lang="en-US" sz="2200" dirty="0">
+                    <a:latin typeface="Cambria Math"/>
+                  </a:rPr>
+                  <a:t>𝑉</a:t>
+                </a:r>
+                <a:r>
+                  <a:rPr lang="en-US" sz="2200" baseline="30000" dirty="0">
+                    <a:latin typeface="Cambria Math"/>
+                  </a:rPr>
+                  <a:t>2</a:t>
+                </a:r>
+                <a:r>
+                  <a:rPr lang="en-US" sz="2200" dirty="0">
+                    <a:latin typeface="Cambria Math"/>
+                  </a:rPr>
+                  <a:t> − </a:t>
+                </a:r>
+                <a:r>
+                  <a:rPr lang="en-US" sz="2000" dirty="0">
+                    <a:latin typeface="Cambria Math"/>
+                  </a:rPr>
+                  <a:t>409.97</a:t>
+                </a:r>
+                <a:r>
+                  <a:rPr lang="en-US" sz="2200" dirty="0">
+                    <a:latin typeface="Cambria Math"/>
+                  </a:rPr>
+                  <a:t>𝑉+</a:t>
+                </a:r>
+                <a:r>
+                  <a:rPr lang="en-US" sz="2000" dirty="0">
+                    <a:latin typeface="Cambria Math"/>
+                  </a:rPr>
+                  <a:t>262.22</a:t>
+                </a:r>
+                <a:endParaRPr lang="en-US" sz="2000" b="0" dirty="0">
+                  <a:latin typeface="Cambria Math"/>
+                </a:endParaRPr>
+              </a:p>
+              <a:p>
+                <a14:m>
+                  <m:oMath xmlns:m="http://schemas.openxmlformats.org/officeDocument/2006/math">
+                    <m:sSub>
+                      <m:sSubPr>
+                        <m:ctrlPr>
+                          <a:rPr lang="en-US" sz="2400" b="0" i="1" smtClean="0">
+                            <a:latin typeface="Cambria Math" panose="02040503050406030204" pitchFamily="18" charset="0"/>
+                          </a:rPr>
+                        </m:ctrlPr>
+                      </m:sSubPr>
+                      <m:e>
+                        <m:r>
+                          <a:rPr lang="en-US" sz="2400" b="0" i="1" smtClean="0">
+                            <a:latin typeface="Cambria Math"/>
+                          </a:rPr>
+                          <m:t>𝑃</m:t>
+                        </m:r>
+                      </m:e>
+                      <m:sub>
+                        <m:r>
+                          <a:rPr lang="en-US" sz="2400" b="0" i="1" smtClean="0">
+                            <a:latin typeface="Cambria Math"/>
+                          </a:rPr>
+                          <m:t>𝑚𝑎𝑥</m:t>
+                        </m:r>
+                      </m:sub>
+                    </m:sSub>
+                  </m:oMath>
+                </a14:m>
+                <a:endParaRPr lang="en-US" sz="2400" b="0" dirty="0"/>
+              </a:p>
+              <a:p>
+                <a14:m>
+                  <m:oMath xmlns:m="http://schemas.openxmlformats.org/officeDocument/2006/math">
+                    <m:sSub>
+                      <m:sSubPr>
+                        <m:ctrlPr>
+                          <a:rPr lang="en-US" sz="2400" b="0" i="1" smtClean="0">
+                            <a:latin typeface="Cambria Math" panose="02040503050406030204" pitchFamily="18" charset="0"/>
+                          </a:rPr>
+                        </m:ctrlPr>
+                      </m:sSubPr>
+                      <m:e>
+                        <m:r>
+                          <a:rPr lang="en-US" sz="2400" b="0" i="1" smtClean="0">
+                            <a:latin typeface="Cambria Math"/>
+                          </a:rPr>
+                          <m:t>𝑇</m:t>
+                        </m:r>
+                      </m:e>
+                      <m:sub>
+                        <m:r>
+                          <a:rPr lang="en-US" sz="2400" b="0" i="1" smtClean="0">
+                            <a:latin typeface="Cambria Math"/>
+                          </a:rPr>
+                          <m:t>𝐼</m:t>
+                        </m:r>
+                      </m:sub>
+                    </m:sSub>
+                  </m:oMath>
+                </a14:m>
+                <a:endParaRPr lang="en-US" sz="2400" b="0" dirty="0"/>
+              </a:p>
+              <a:p>
+                <a14:m>
+                  <m:oMath xmlns:m="http://schemas.openxmlformats.org/officeDocument/2006/math">
+                    <m:sSub>
+                      <m:sSubPr>
+                        <m:ctrlPr>
+                          <a:rPr lang="en-US" sz="2400" b="0" i="1" smtClean="0">
+                            <a:latin typeface="Cambria Math" panose="02040503050406030204" pitchFamily="18" charset="0"/>
+                          </a:rPr>
+                        </m:ctrlPr>
+                      </m:sSubPr>
+                      <m:e>
+                        <m:r>
+                          <a:rPr lang="en-US" sz="2400" b="0" i="1" smtClean="0">
+                            <a:latin typeface="Cambria Math"/>
+                          </a:rPr>
+                          <m:t>𝑇</m:t>
+                        </m:r>
+                      </m:e>
+                      <m:sub>
+                        <m:r>
+                          <a:rPr lang="en-US" sz="2400" b="0" i="1" smtClean="0">
+                            <a:latin typeface="Cambria Math"/>
+                          </a:rPr>
+                          <m:t>𝑡𝑜𝑡</m:t>
+                        </m:r>
+                      </m:sub>
+                    </m:sSub>
+                  </m:oMath>
+                </a14:m>
+                <a:endParaRPr lang="en-US" sz="2400" b="0" dirty="0"/>
+              </a:p>
+              <a:p>
+                <a14:m>
+                  <m:oMath xmlns:m="http://schemas.openxmlformats.org/officeDocument/2006/math">
+                    <m:f>
+                      <m:fPr>
+                        <m:ctrlPr>
+                          <a:rPr lang="en-US" sz="2400" b="0" i="1" smtClean="0">
+                            <a:latin typeface="Cambria Math" panose="02040503050406030204" pitchFamily="18" charset="0"/>
+                          </a:rPr>
+                        </m:ctrlPr>
+                      </m:fPr>
+                      <m:num>
+                        <m:sSub>
+                          <m:sSubPr>
+                            <m:ctrlPr>
+                              <a:rPr lang="en-US" sz="2400" b="0" i="1" smtClean="0">
+                                <a:latin typeface="Cambria Math" panose="02040503050406030204" pitchFamily="18" charset="0"/>
+                              </a:rPr>
+                            </m:ctrlPr>
+                          </m:sSubPr>
+                          <m:e>
+                            <m:r>
+                              <a:rPr lang="en-US" sz="2400" b="0" i="1" smtClean="0">
+                                <a:latin typeface="Cambria Math"/>
+                              </a:rPr>
+                              <m:t>𝑇</m:t>
+                            </m:r>
+                          </m:e>
+                          <m:sub>
+                            <m:r>
+                              <a:rPr lang="en-US" sz="2400" b="0" i="1" smtClean="0">
+                                <a:latin typeface="Cambria Math"/>
+                              </a:rPr>
+                              <m:t>𝐼</m:t>
+                            </m:r>
+                          </m:sub>
+                        </m:sSub>
+                      </m:num>
+                      <m:den>
+                        <m:sSub>
+                          <m:sSubPr>
+                            <m:ctrlPr>
+                              <a:rPr lang="en-US" sz="2400" b="0" i="1" smtClean="0">
+                                <a:latin typeface="Cambria Math" panose="02040503050406030204" pitchFamily="18" charset="0"/>
+                              </a:rPr>
+                            </m:ctrlPr>
+                          </m:sSubPr>
+                          <m:e>
+                            <m:r>
+                              <a:rPr lang="en-US" sz="2400" b="0" i="1" smtClean="0">
+                                <a:latin typeface="Cambria Math"/>
+                              </a:rPr>
+                              <m:t>𝑇</m:t>
+                            </m:r>
+                          </m:e>
+                          <m:sub>
+                            <m:r>
+                              <a:rPr lang="en-US" sz="2400" b="0" i="1" smtClean="0">
+                                <a:latin typeface="Cambria Math"/>
+                              </a:rPr>
+                              <m:t>𝑡𝑜𝑡</m:t>
+                            </m:r>
+                          </m:sub>
+                        </m:sSub>
+                      </m:den>
+                    </m:f>
+                    <m:r>
+                      <a:rPr lang="en-US" sz="2400" b="0" i="1" smtClean="0">
+                        <a:latin typeface="Cambria Math"/>
+                      </a:rPr>
+                      <m:t>=0.0125</m:t>
+                    </m:r>
+                    <m:sSub>
+                      <m:sSubPr>
+                        <m:ctrlPr>
+                          <a:rPr lang="en-US" sz="2400" b="0" i="1" smtClean="0">
+                            <a:latin typeface="Cambria Math" panose="02040503050406030204" pitchFamily="18" charset="0"/>
+                          </a:rPr>
+                        </m:ctrlPr>
+                      </m:sSubPr>
+                      <m:e>
+                        <m:r>
+                          <a:rPr lang="en-US" sz="2400" b="0" i="1" smtClean="0">
+                            <a:latin typeface="Cambria Math"/>
+                          </a:rPr>
+                          <m:t>𝑓</m:t>
+                        </m:r>
+                      </m:e>
+                      <m:sub>
+                        <m:r>
+                          <a:rPr lang="en-US" sz="2400" b="0" i="1" smtClean="0">
+                            <a:latin typeface="Cambria Math"/>
+                          </a:rPr>
+                          <m:t>𝑣</m:t>
+                        </m:r>
+                      </m:sub>
+                    </m:sSub>
+                    <m:r>
+                      <a:rPr lang="en-US" sz="2400" b="0" i="1" smtClean="0">
+                        <a:latin typeface="Cambria Math"/>
+                      </a:rPr>
+                      <m:t>+0.125</m:t>
+                    </m:r>
+                  </m:oMath>
+                </a14:m>
+                <a:endParaRPr lang="en-US" sz="2400" b="0" dirty="0"/>
+              </a:p>
+              <a:p>
+                <a14:m>
+                  <m:oMath xmlns:m="http://schemas.openxmlformats.org/officeDocument/2006/math">
+                    <m:sSub>
+                      <m:sSubPr>
+                        <m:ctrlPr>
+                          <a:rPr lang="en-US" sz="2400" b="0" i="1" smtClean="0">
+                            <a:latin typeface="Cambria Math" panose="02040503050406030204" pitchFamily="18" charset="0"/>
+                          </a:rPr>
+                        </m:ctrlPr>
+                      </m:sSubPr>
+                      <m:e>
+                        <m:r>
+                          <a:rPr lang="en-US" sz="2400" b="0" i="1" smtClean="0">
+                            <a:latin typeface="Cambria Math"/>
+                          </a:rPr>
+                          <m:t>𝑓</m:t>
+                        </m:r>
+                      </m:e>
+                      <m:sub>
+                        <m:r>
+                          <a:rPr lang="en-US" sz="2400" b="0" i="1" smtClean="0">
+                            <a:latin typeface="Cambria Math"/>
+                          </a:rPr>
+                          <m:t>𝑣</m:t>
+                        </m:r>
+                      </m:sub>
+                    </m:sSub>
+                  </m:oMath>
+                </a14:m>
+                <a:endParaRPr lang="en-US" sz="2400" b="0" dirty="0"/>
+              </a:p>
+              <a:p>
+                <a:endParaRPr lang="en-US" sz="2400" b="0" dirty="0"/>
+              </a:p>
+              <a:p>
+                <a:endParaRPr lang="en-US" b="0" dirty="0"/>
+              </a:p>
+              <a:p>
+                <a:endParaRPr lang="en-US" b="0" dirty="0"/>
+              </a:p>
+              <a:p>
+                <a:endParaRPr lang="en-US" dirty="0"/>
+              </a:p>
+            </p:txBody>
+          </p:sp>
+        </mc:Choice>
+        <mc:Fallback xmlns="">
+          <p:sp>
+            <p:nvSpPr>
+              <p:cNvPr id="6" name="Content Placeholder 5"/>
+              <p:cNvSpPr>
+                <a:spLocks noGrp="1" noRot="1" noChangeAspect="1" noMove="1" noResize="1" noEditPoints="1" noAdjustHandles="1" noChangeArrowheads="1" noChangeShapeType="1" noTextEdit="1"/>
+              </p:cNvSpPr>
+              <p:nvPr>
+                <p:ph idx="1"/>
+              </p:nvPr>
+            </p:nvSpPr>
+            <p:spPr>
+              <a:xfrm>
+                <a:off x="152400" y="1600200"/>
+                <a:ext cx="8991600" cy="4525963"/>
+              </a:xfrm>
+              <a:blipFill rotWithShape="1">
+                <a:blip r:embed="rId2"/>
+                <a:stretch>
+                  <a:fillRect l="-881"/>
+                </a:stretch>
+              </a:blipFill>
+            </p:spPr>
+            <p:txBody>
+              <a:bodyPr/>
+              <a:lstStyle/>
+              <a:p>
+                <a:r>
+                  <a:rPr lang="en-US">
+                    <a:noFill/>
+                  </a:rPr>
+                  <a:t> </a:t>
+                </a:r>
+              </a:p>
+            </p:txBody>
+          </p:sp>
+        </mc:Fallback>
+      </mc:AlternateContent>
+    </p:spTree>
+    <p:extLst>
+      <p:ext uri="{BB962C8B-B14F-4D97-AF65-F5344CB8AC3E}">
+        <p14:creationId xmlns:p14="http://schemas.microsoft.com/office/powerpoint/2010/main" val="4121545883"/>
+      </p:ext>
+    </p:extLst>
+  </p:cSld>
+  <p:clrMapOvr>
+    <a:masterClrMapping/>
+  </p:clrMapOvr>
+</p:sld>
+</file>
+
+<file path=ppt/slides/slide11.xml><?xml version="1.0" encoding="utf-8"?>
+<p:sld xmlns:a="http://schemas.openxmlformats.org/drawingml/2006/main" xmlns:r="http://schemas.openxmlformats.org/officeDocument/2006/relationships" xmlns:p="http://schemas.openxmlformats.org/presentationml/2006/main">
+  <p:cSld>
+    <p:spTree>
+      <p:nvGrpSpPr>
+        <p:cNvPr id="1" name=""/>
+        <p:cNvGrpSpPr/>
+        <p:nvPr/>
+      </p:nvGrpSpPr>
+      <p:grpSpPr>
+        <a:xfrm>
+          <a:off x="0" y="0"/>
+          <a:ext cx="0" cy="0"/>
+          <a:chOff x="0" y="0"/>
+          <a:chExt cx="0" cy="0"/>
+        </a:xfrm>
+      </p:grpSpPr>
+      <p:sp>
+        <p:nvSpPr>
+          <p:cNvPr id="9" name="Title 8"/>
+          <p:cNvSpPr>
+            <a:spLocks noGrp="1"/>
+          </p:cNvSpPr>
+          <p:nvPr>
+            <p:ph type="title"/>
+          </p:nvPr>
+        </p:nvSpPr>
+        <p:spPr/>
+        <p:txBody>
+          <a:bodyPr/>
+          <a:lstStyle/>
+          <a:p>
+            <a:endParaRPr lang="en-US"/>
+          </a:p>
+        </p:txBody>
+      </p:sp>
+      <mc:AlternateContent xmlns:mc="http://schemas.openxmlformats.org/markup-compatibility/2006" xmlns:a14="http://schemas.microsoft.com/office/drawing/2010/main">
+        <mc:Choice Requires="a14">
+          <p:sp>
+            <p:nvSpPr>
+              <p:cNvPr id="6" name="Content Placeholder 5"/>
+              <p:cNvSpPr>
+                <a:spLocks noGrp="1"/>
+              </p:cNvSpPr>
+              <p:nvPr>
+                <p:ph idx="1"/>
+              </p:nvPr>
+            </p:nvSpPr>
             <p:spPr/>
             <p:txBody>
               <a:bodyPr>
@@ -8316,7 +8943,7 @@
           <a:graphicData uri="http://schemas.openxmlformats.org/presentationml/2006/ole">
             <mc:AlternateContent xmlns:mc="http://schemas.openxmlformats.org/markup-compatibility/2006">
               <mc:Choice xmlns:v="urn:schemas-microsoft-com:vml" Requires="v">
-                <p:oleObj spid="_x0000_s2114" name="Equation" r:id="rId4" imgW="914400" imgH="198720" progId="Equation.DSMT4">
+                <p:oleObj spid="_x0000_s2124" name="Equation" r:id="rId4" imgW="914400" imgH="198720" progId="Equation.DSMT4">
                   <p:embed/>
                 </p:oleObj>
               </mc:Choice>
@@ -8379,7 +9006,7 @@
           <a:graphicData uri="http://schemas.openxmlformats.org/presentationml/2006/ole">
             <mc:AlternateContent xmlns:mc="http://schemas.openxmlformats.org/markup-compatibility/2006">
               <mc:Choice xmlns:v="urn:schemas-microsoft-com:vml" Requires="v">
-                <p:oleObj spid="_x0000_s2115" name="Equation" r:id="rId6" imgW="114120" imgH="177480" progId="Equation.DSMT4">
+                <p:oleObj spid="_x0000_s2125" name="Equation" r:id="rId6" imgW="114120" imgH="177480" progId="Equation.DSMT4">
                   <p:embed/>
                 </p:oleObj>
               </mc:Choice>
@@ -8427,7 +9054,7 @@
 </p:sld>
 </file>
 
-<file path=ppt/slides/slide11.xml><?xml version="1.0" encoding="utf-8"?>
+<file path=ppt/slides/slide12.xml><?xml version="1.0" encoding="utf-8"?>
 <p:sld xmlns:a="http://schemas.openxmlformats.org/drawingml/2006/main" xmlns:r="http://schemas.openxmlformats.org/officeDocument/2006/relationships" xmlns:p="http://schemas.openxmlformats.org/presentationml/2006/main">
   <p:cSld>
     <p:spTree>
@@ -9255,7 +9882,7 @@
 </p:sld>
 </file>
 
-<file path=ppt/slides/slide12.xml><?xml version="1.0" encoding="utf-8"?>
+<file path=ppt/slides/slide13.xml><?xml version="1.0" encoding="utf-8"?>
 <p:sld xmlns:a="http://schemas.openxmlformats.org/drawingml/2006/main" xmlns:r="http://schemas.openxmlformats.org/officeDocument/2006/relationships" xmlns:p="http://schemas.openxmlformats.org/presentationml/2006/main">
   <p:cSld>
     <p:spTree>
@@ -9481,7 +10108,7 @@
 </p:sld>
 </file>
 
-<file path=ppt/slides/slide13.xml><?xml version="1.0" encoding="utf-8"?>
+<file path=ppt/slides/slide14.xml><?xml version="1.0" encoding="utf-8"?>
 <p:sld xmlns:a="http://schemas.openxmlformats.org/drawingml/2006/main" xmlns:r="http://schemas.openxmlformats.org/officeDocument/2006/relationships" xmlns:p="http://schemas.openxmlformats.org/presentationml/2006/main">
   <p:cSld>
     <p:spTree>
@@ -9563,7 +10190,7 @@
 </p:sld>
 </file>
 
-<file path=ppt/slides/slide14.xml><?xml version="1.0" encoding="utf-8"?>
+<file path=ppt/slides/slide15.xml><?xml version="1.0" encoding="utf-8"?>
 <p:sld xmlns:a="http://schemas.openxmlformats.org/drawingml/2006/main" xmlns:r="http://schemas.openxmlformats.org/officeDocument/2006/relationships" xmlns:p="http://schemas.openxmlformats.org/presentationml/2006/main">
   <p:cSld>
     <p:spTree>
@@ -9623,7 +10250,7 @@
 </p:sld>
 </file>
 
-<file path=ppt/slides/slide15.xml><?xml version="1.0" encoding="utf-8"?>
+<file path=ppt/slides/slide16.xml><?xml version="1.0" encoding="utf-8"?>
 <p:sld xmlns:a="http://schemas.openxmlformats.org/drawingml/2006/main" xmlns:r="http://schemas.openxmlformats.org/officeDocument/2006/relationships" xmlns:p="http://schemas.openxmlformats.org/presentationml/2006/main">
   <p:cSld>
     <p:spTree>
@@ -9893,7 +10520,7 @@
           <a:graphicData uri="http://schemas.openxmlformats.org/presentationml/2006/ole">
             <mc:AlternateContent xmlns:mc="http://schemas.openxmlformats.org/markup-compatibility/2006">
               <mc:Choice xmlns:v="urn:schemas-microsoft-com:vml" Requires="v">
-                <p:oleObj spid="_x0000_s1079" name="Equation" r:id="rId3" imgW="2412720" imgH="3060360" progId="Equation.DSMT4">
+                <p:oleObj spid="_x0000_s1089" name="Equation" r:id="rId3" imgW="2412720" imgH="3060360" progId="Equation.DSMT4">
                   <p:embed/>
                 </p:oleObj>
               </mc:Choice>
@@ -9956,7 +10583,7 @@
           <a:graphicData uri="http://schemas.openxmlformats.org/presentationml/2006/ole">
             <mc:AlternateContent xmlns:mc="http://schemas.openxmlformats.org/markup-compatibility/2006">
               <mc:Choice xmlns:v="urn:schemas-microsoft-com:vml" Requires="v">
-                <p:oleObj spid="_x0000_s1080" name="Equation" r:id="rId5" imgW="2095200" imgH="1066680" progId="Equation.DSMT4">
+                <p:oleObj spid="_x0000_s1090" name="Equation" r:id="rId5" imgW="2095200" imgH="1066680" progId="Equation.DSMT4">
                   <p:embed/>
                 </p:oleObj>
               </mc:Choice>
@@ -10355,7 +10982,7 @@
         <p:spPr>
           <a:xfrm>
             <a:off x="3018932" y="4996190"/>
-            <a:ext cx="591829" cy="261610"/>
+            <a:ext cx="639919" cy="261610"/>
           </a:xfrm>
           <a:prstGeom prst="rect">
             <a:avLst/>
@@ -10380,7 +11007,7 @@
                 <a:latin typeface="Arial" panose="020B0604020202020204" pitchFamily="34" charset="0"/>
                 <a:cs typeface="Arial" panose="020B0604020202020204" pitchFamily="34" charset="0"/>
               </a:rPr>
-              <a:t>healthy</a:t>
+              <a:t>baseline</a:t>
             </a:r>
             <a:endParaRPr lang="en-US" sz="1100" dirty="0">
               <a:latin typeface="Arial" panose="020B0604020202020204" pitchFamily="34" charset="0"/>
@@ -10711,7 +11338,7 @@
           <p:nvPr>
             <p:extLst>
               <p:ext uri="{D42A27DB-BD31-4B8C-83A1-F6EECF244321}">
-                <p14:modId xmlns:p14="http://schemas.microsoft.com/office/powerpoint/2010/main" val="1554386410"/>
+                <p14:modId xmlns:p14="http://schemas.microsoft.com/office/powerpoint/2010/main" val="2178429932"/>
               </p:ext>
             </p:extLst>
           </p:nvPr>
@@ -10724,7 +11351,7 @@
           <a:graphicData uri="http://schemas.openxmlformats.org/presentationml/2006/ole">
             <mc:AlternateContent xmlns:mc="http://schemas.openxmlformats.org/markup-compatibility/2006">
               <mc:Choice xmlns:v="urn:schemas-microsoft-com:vml" Requires="v">
-                <p:oleObj spid="_x0000_s3085" name="Equation" r:id="rId3" imgW="1765080" imgH="4978080" progId="Equation.DSMT4">
+                <p:oleObj spid="_x0000_s3090" name="Equation" r:id="rId3" imgW="1765080" imgH="4978080" progId="Equation.DSMT4">
                   <p:embed/>
                 </p:oleObj>
               </mc:Choice>
@@ -10773,6 +11400,66 @@
 </file>
 
 <file path=ppt/slides/slide5.xml><?xml version="1.0" encoding="utf-8"?>
+<p:sld xmlns:a="http://schemas.openxmlformats.org/drawingml/2006/main" xmlns:r="http://schemas.openxmlformats.org/officeDocument/2006/relationships" xmlns:p="http://schemas.openxmlformats.org/presentationml/2006/main">
+  <p:cSld>
+    <p:spTree>
+      <p:nvGrpSpPr>
+        <p:cNvPr id="1" name=""/>
+        <p:cNvGrpSpPr/>
+        <p:nvPr/>
+      </p:nvGrpSpPr>
+      <p:grpSpPr>
+        <a:xfrm>
+          <a:off x="0" y="0"/>
+          <a:ext cx="0" cy="0"/>
+          <a:chOff x="0" y="0"/>
+          <a:chExt cx="0" cy="0"/>
+        </a:xfrm>
+      </p:grpSpPr>
+      <p:pic>
+        <p:nvPicPr>
+          <p:cNvPr id="2" name="Picture 1">
+            <a:extLst>
+              <a:ext uri="{FF2B5EF4-FFF2-40B4-BE49-F238E27FC236}">
+                <a16:creationId xmlns:a16="http://schemas.microsoft.com/office/drawing/2014/main" id="{77D25DDC-0CF3-4DB9-A36D-F1A8210538F8}"/>
+              </a:ext>
+            </a:extLst>
+          </p:cNvPr>
+          <p:cNvPicPr>
+            <a:picLocks noChangeAspect="1"/>
+          </p:cNvPicPr>
+          <p:nvPr/>
+        </p:nvPicPr>
+        <p:blipFill>
+          <a:blip r:embed="rId2"/>
+          <a:stretch>
+            <a:fillRect/>
+          </a:stretch>
+        </p:blipFill>
+        <p:spPr>
+          <a:xfrm>
+            <a:off x="850069" y="377687"/>
+            <a:ext cx="7443861" cy="6102625"/>
+          </a:xfrm>
+          <a:prstGeom prst="rect">
+            <a:avLst/>
+          </a:prstGeom>
+        </p:spPr>
+      </p:pic>
+    </p:spTree>
+    <p:extLst>
+      <p:ext uri="{BB962C8B-B14F-4D97-AF65-F5344CB8AC3E}">
+        <p14:creationId xmlns:p14="http://schemas.microsoft.com/office/powerpoint/2010/main" val="2178491318"/>
+      </p:ext>
+    </p:extLst>
+  </p:cSld>
+  <p:clrMapOvr>
+    <a:masterClrMapping/>
+  </p:clrMapOvr>
+</p:sld>
+</file>
+
+<file path=ppt/slides/slide6.xml><?xml version="1.0" encoding="utf-8"?>
 <p:sld xmlns:a="http://schemas.openxmlformats.org/drawingml/2006/main" xmlns:r="http://schemas.openxmlformats.org/officeDocument/2006/relationships" xmlns:p="http://schemas.openxmlformats.org/presentationml/2006/main">
   <p:cSld>
     <p:spTree>
@@ -11888,7 +12575,7 @@
 </p:sld>
 </file>
 
-<file path=ppt/slides/slide6.xml><?xml version="1.0" encoding="utf-8"?>
+<file path=ppt/slides/slide7.xml><?xml version="1.0" encoding="utf-8"?>
 <p:sld xmlns:a="http://schemas.openxmlformats.org/drawingml/2006/main" xmlns:r="http://schemas.openxmlformats.org/officeDocument/2006/relationships" xmlns:p="http://schemas.openxmlformats.org/presentationml/2006/main">
   <p:cSld>
     <p:spTree>
@@ -13001,7 +13688,7 @@
 </p:sld>
 </file>
 
-<file path=ppt/slides/slide7.xml><?xml version="1.0" encoding="utf-8"?>
+<file path=ppt/slides/slide8.xml><?xml version="1.0" encoding="utf-8"?>
 <p:sld xmlns:a="http://schemas.openxmlformats.org/drawingml/2006/main" xmlns:r="http://schemas.openxmlformats.org/officeDocument/2006/relationships" xmlns:p="http://schemas.openxmlformats.org/presentationml/2006/main">
   <p:cSld>
     <p:spTree>
@@ -13373,7 +14060,7 @@
 </p:sld>
 </file>
 
-<file path=ppt/slides/slide8.xml><?xml version="1.0" encoding="utf-8"?>
+<file path=ppt/slides/slide9.xml><?xml version="1.0" encoding="utf-8"?>
 <p:sld xmlns:a="http://schemas.openxmlformats.org/drawingml/2006/main" xmlns:r="http://schemas.openxmlformats.org/officeDocument/2006/relationships" xmlns:p="http://schemas.openxmlformats.org/presentationml/2006/main">
   <p:cSld>
     <p:spTree>
@@ -14262,632 +14949,6 @@
     <p:extLst>
       <p:ext uri="{BB962C8B-B14F-4D97-AF65-F5344CB8AC3E}">
         <p14:creationId xmlns:p14="http://schemas.microsoft.com/office/powerpoint/2010/main" val="324816981"/>
-      </p:ext>
-    </p:extLst>
-  </p:cSld>
-  <p:clrMapOvr>
-    <a:masterClrMapping/>
-  </p:clrMapOvr>
-</p:sld>
-</file>
-
-<file path=ppt/slides/slide9.xml><?xml version="1.0" encoding="utf-8"?>
-<p:sld xmlns:a="http://schemas.openxmlformats.org/drawingml/2006/main" xmlns:r="http://schemas.openxmlformats.org/officeDocument/2006/relationships" xmlns:p="http://schemas.openxmlformats.org/presentationml/2006/main">
-  <p:cSld>
-    <p:spTree>
-      <p:nvGrpSpPr>
-        <p:cNvPr id="1" name=""/>
-        <p:cNvGrpSpPr/>
-        <p:nvPr/>
-      </p:nvGrpSpPr>
-      <p:grpSpPr>
-        <a:xfrm>
-          <a:off x="0" y="0"/>
-          <a:ext cx="0" cy="0"/>
-          <a:chOff x="0" y="0"/>
-          <a:chExt cx="0" cy="0"/>
-        </a:xfrm>
-      </p:grpSpPr>
-      <p:sp>
-        <p:nvSpPr>
-          <p:cNvPr id="9" name="Title 8"/>
-          <p:cNvSpPr>
-            <a:spLocks noGrp="1"/>
-          </p:cNvSpPr>
-          <p:nvPr>
-            <p:ph type="title"/>
-          </p:nvPr>
-        </p:nvSpPr>
-        <p:spPr/>
-        <p:txBody>
-          <a:bodyPr/>
-          <a:lstStyle/>
-          <a:p>
-            <a:endParaRPr lang="en-US"/>
-          </a:p>
-        </p:txBody>
-      </p:sp>
-      <mc:AlternateContent xmlns:mc="http://schemas.openxmlformats.org/markup-compatibility/2006" xmlns:a14="http://schemas.microsoft.com/office/drawing/2010/main">
-        <mc:Choice Requires="a14">
-          <p:sp>
-            <p:nvSpPr>
-              <p:cNvPr id="6" name="Content Placeholder 5"/>
-              <p:cNvSpPr>
-                <a:spLocks noGrp="1"/>
-              </p:cNvSpPr>
-              <p:nvPr>
-                <p:ph idx="1"/>
-              </p:nvPr>
-            </p:nvSpPr>
-            <p:spPr>
-              <a:xfrm>
-                <a:off x="152400" y="1600200"/>
-                <a:ext cx="8991600" cy="4525963"/>
-              </a:xfrm>
-            </p:spPr>
-            <p:txBody>
-              <a:bodyPr>
-                <a:noAutofit/>
-              </a:bodyPr>
-              <a:lstStyle/>
-              <a:p>
-                <a14:m>
-                  <m:oMath xmlns:m="http://schemas.openxmlformats.org/officeDocument/2006/math">
-                    <m:sSub>
-                      <m:sSubPr>
-                        <m:ctrlPr>
-                          <a:rPr lang="en-US" sz="2400" b="0" i="1" smtClean="0">
-                            <a:latin typeface="Cambria Math" panose="02040503050406030204" pitchFamily="18" charset="0"/>
-                          </a:rPr>
-                        </m:ctrlPr>
-                      </m:sSubPr>
-                      <m:e>
-                        <m:r>
-                          <a:rPr lang="en-US" sz="2400" b="0" i="1" smtClean="0">
-                            <a:latin typeface="Cambria Math"/>
-                          </a:rPr>
-                          <m:t>𝑓</m:t>
-                        </m:r>
-                      </m:e>
-                      <m:sub>
-                        <m:r>
-                          <a:rPr lang="en-US" sz="2400" b="0" i="1" smtClean="0">
-                            <a:latin typeface="Cambria Math"/>
-                          </a:rPr>
-                          <m:t>𝑣</m:t>
-                        </m:r>
-                      </m:sub>
-                    </m:sSub>
-                    <m:r>
-                      <a:rPr lang="en-US" sz="2400" b="0" i="1" smtClean="0">
-                        <a:latin typeface="Cambria Math"/>
-                      </a:rPr>
-                      <m:t>(</m:t>
-                    </m:r>
-                    <m:r>
-                      <a:rPr lang="en-US" sz="2400" b="0" i="1" smtClean="0">
-                        <a:latin typeface="Cambria Math"/>
-                        <a:ea typeface="Cambria Math"/>
-                      </a:rPr>
-                      <m:t>≡</m:t>
-                    </m:r>
-                    <m:f>
-                      <m:fPr>
-                        <m:ctrlPr>
-                          <a:rPr lang="en-US" sz="2400" b="0" i="1" smtClean="0">
-                            <a:latin typeface="Cambria Math" panose="02040503050406030204" pitchFamily="18" charset="0"/>
-                            <a:ea typeface="Cambria Math"/>
-                          </a:rPr>
-                        </m:ctrlPr>
-                      </m:fPr>
-                      <m:num>
-                        <m:r>
-                          <a:rPr lang="en-US" sz="2400" b="0" i="1" smtClean="0">
-                            <a:latin typeface="Cambria Math"/>
-                            <a:ea typeface="Cambria Math"/>
-                          </a:rPr>
-                          <m:t>1</m:t>
-                        </m:r>
-                      </m:num>
-                      <m:den>
-                        <m:sSub>
-                          <m:sSubPr>
-                            <m:ctrlPr>
-                              <a:rPr lang="en-US" sz="2400" b="0" i="1" smtClean="0">
-                                <a:latin typeface="Cambria Math" panose="02040503050406030204" pitchFamily="18" charset="0"/>
-                                <a:ea typeface="Cambria Math"/>
-                              </a:rPr>
-                            </m:ctrlPr>
-                          </m:sSubPr>
-                          <m:e>
-                            <m:r>
-                              <a:rPr lang="en-US" sz="2400" b="0" i="1" smtClean="0">
-                                <a:latin typeface="Cambria Math"/>
-                                <a:ea typeface="Cambria Math"/>
-                              </a:rPr>
-                              <m:t>𝑇</m:t>
-                            </m:r>
-                          </m:e>
-                          <m:sub>
-                            <m:r>
-                              <a:rPr lang="en-US" sz="2400" b="0" i="1" smtClean="0">
-                                <a:latin typeface="Cambria Math"/>
-                                <a:ea typeface="Cambria Math"/>
-                              </a:rPr>
-                              <m:t>𝑡𝑜𝑡</m:t>
-                            </m:r>
-                          </m:sub>
-                        </m:sSub>
-                      </m:den>
-                    </m:f>
-                  </m:oMath>
-                </a14:m>
-                <a:r>
-                  <a:rPr lang="en-US" sz="2400" b="0" dirty="0"/>
-                  <a:t>)</a:t>
-                </a:r>
-              </a:p>
-              <a:p>
-                <a14:m>
-                  <m:oMath xmlns:m="http://schemas.openxmlformats.org/officeDocument/2006/math">
-                    <m:sSub>
-                      <m:sSubPr>
-                        <m:ctrlPr>
-                          <a:rPr lang="en-US" sz="2400" b="0" i="1" smtClean="0">
-                            <a:latin typeface="Cambria Math" panose="02040503050406030204" pitchFamily="18" charset="0"/>
-                          </a:rPr>
-                        </m:ctrlPr>
-                      </m:sSubPr>
-                      <m:e>
-                        <m:r>
-                          <a:rPr lang="en-US" sz="2400" b="0" i="1" smtClean="0">
-                            <a:latin typeface="Cambria Math"/>
-                          </a:rPr>
-                          <m:t>𝑃</m:t>
-                        </m:r>
-                      </m:e>
-                      <m:sub>
-                        <m:r>
-                          <a:rPr lang="en-US" sz="2400" b="0" i="1" smtClean="0">
-                            <a:latin typeface="Cambria Math"/>
-                          </a:rPr>
-                          <m:t>0.1</m:t>
-                        </m:r>
-                      </m:sub>
-                    </m:sSub>
-                  </m:oMath>
-                </a14:m>
-                <a:endParaRPr lang="en-US" sz="2400" b="0" dirty="0"/>
-              </a:p>
-              <a:p>
-                <a:r>
-                  <a:rPr lang="en-US" sz="2200" dirty="0">
-                    <a:latin typeface="Cambria Math"/>
-                  </a:rPr>
-                  <a:t>𝑃</a:t>
-                </a:r>
-                <a:r>
-                  <a:rPr lang="en-US" sz="2800" baseline="-25000" dirty="0">
-                    <a:latin typeface="Cambria Math"/>
-                  </a:rPr>
-                  <a:t>𝑚𝑎𝑥</a:t>
-                </a:r>
-                <a:r>
-                  <a:rPr lang="en-US" sz="2200" dirty="0">
-                    <a:latin typeface="Cambria Math"/>
-                  </a:rPr>
-                  <a:t>=−</a:t>
-                </a:r>
-                <a:r>
-                  <a:rPr lang="en-US" sz="2000" dirty="0">
-                    <a:latin typeface="Cambria Math"/>
-                  </a:rPr>
-                  <a:t>0.3743</a:t>
-                </a:r>
-                <a:r>
-                  <a:rPr lang="en-US" sz="2200" dirty="0">
-                    <a:latin typeface="Cambria Math"/>
-                  </a:rPr>
-                  <a:t>𝑉</a:t>
-                </a:r>
-                <a:r>
-                  <a:rPr lang="en-US" sz="2200" baseline="30000" dirty="0">
-                    <a:latin typeface="Cambria Math"/>
-                  </a:rPr>
-                  <a:t>5</a:t>
-                </a:r>
-                <a:r>
-                  <a:rPr lang="en-US" sz="2200" dirty="0">
-                    <a:latin typeface="Cambria Math"/>
-                  </a:rPr>
-                  <a:t>+</a:t>
-                </a:r>
-                <a:r>
-                  <a:rPr lang="en-US" sz="2000" dirty="0">
-                    <a:latin typeface="Cambria Math"/>
-                  </a:rPr>
-                  <a:t>7.4105</a:t>
-                </a:r>
-                <a:r>
-                  <a:rPr lang="en-US" sz="2200" dirty="0">
-                    <a:latin typeface="Cambria Math"/>
-                  </a:rPr>
-                  <a:t>𝑉</a:t>
-                </a:r>
-                <a:r>
-                  <a:rPr lang="en-US" sz="2200" baseline="30000" dirty="0">
-                    <a:latin typeface="Cambria Math"/>
-                  </a:rPr>
-                  <a:t>4</a:t>
-                </a:r>
-                <a:r>
-                  <a:rPr lang="en-US" sz="2200" dirty="0">
-                    <a:latin typeface="Cambria Math"/>
-                  </a:rPr>
-                  <a:t>−</a:t>
-                </a:r>
-                <a:r>
-                  <a:rPr lang="en-US" sz="2000" dirty="0">
-                    <a:latin typeface="Cambria Math"/>
-                  </a:rPr>
-                  <a:t>57.076</a:t>
-                </a:r>
-                <a:r>
-                  <a:rPr lang="en-US" sz="2200" dirty="0">
-                    <a:latin typeface="Cambria Math"/>
-                  </a:rPr>
-                  <a:t>𝑉</a:t>
-                </a:r>
-                <a:r>
-                  <a:rPr lang="en-US" sz="2200" baseline="30000" dirty="0">
-                    <a:latin typeface="Cambria Math"/>
-                  </a:rPr>
-                  <a:t>3</a:t>
-                </a:r>
-                <a:r>
-                  <a:rPr lang="en-US" sz="2200" dirty="0">
-                    <a:latin typeface="Cambria Math"/>
-                  </a:rPr>
-                  <a:t>+</a:t>
-                </a:r>
-                <a:r>
-                  <a:rPr lang="en-US" sz="2000" dirty="0">
-                    <a:latin typeface="Cambria Math"/>
-                  </a:rPr>
-                  <a:t>214.11</a:t>
-                </a:r>
-                <a:r>
-                  <a:rPr lang="en-US" sz="2200" dirty="0">
-                    <a:latin typeface="Cambria Math"/>
-                  </a:rPr>
-                  <a:t>𝑉</a:t>
-                </a:r>
-                <a:r>
-                  <a:rPr lang="en-US" sz="2200" baseline="30000" dirty="0">
-                    <a:latin typeface="Cambria Math"/>
-                  </a:rPr>
-                  <a:t>2</a:t>
-                </a:r>
-                <a:r>
-                  <a:rPr lang="en-US" sz="2200" dirty="0">
-                    <a:latin typeface="Cambria Math"/>
-                  </a:rPr>
-                  <a:t> − </a:t>
-                </a:r>
-                <a:r>
-                  <a:rPr lang="en-US" sz="2000" dirty="0">
-                    <a:latin typeface="Cambria Math"/>
-                  </a:rPr>
-                  <a:t>409.97</a:t>
-                </a:r>
-                <a:r>
-                  <a:rPr lang="en-US" sz="2200" dirty="0">
-                    <a:latin typeface="Cambria Math"/>
-                  </a:rPr>
-                  <a:t>𝑉+</a:t>
-                </a:r>
-                <a:r>
-                  <a:rPr lang="en-US" sz="2000" dirty="0">
-                    <a:latin typeface="Cambria Math"/>
-                  </a:rPr>
-                  <a:t>262.22</a:t>
-                </a:r>
-                <a:endParaRPr lang="en-US" sz="2000" b="0" dirty="0">
-                  <a:latin typeface="Cambria Math"/>
-                </a:endParaRPr>
-              </a:p>
-              <a:p>
-                <a14:m>
-                  <m:oMath xmlns:m="http://schemas.openxmlformats.org/officeDocument/2006/math">
-                    <m:sSub>
-                      <m:sSubPr>
-                        <m:ctrlPr>
-                          <a:rPr lang="en-US" sz="2400" b="0" i="1" smtClean="0">
-                            <a:latin typeface="Cambria Math" panose="02040503050406030204" pitchFamily="18" charset="0"/>
-                          </a:rPr>
-                        </m:ctrlPr>
-                      </m:sSubPr>
-                      <m:e>
-                        <m:r>
-                          <a:rPr lang="en-US" sz="2400" b="0" i="1" smtClean="0">
-                            <a:latin typeface="Cambria Math"/>
-                          </a:rPr>
-                          <m:t>𝑃</m:t>
-                        </m:r>
-                      </m:e>
-                      <m:sub>
-                        <m:r>
-                          <a:rPr lang="en-US" sz="2400" b="0" i="1" smtClean="0">
-                            <a:latin typeface="Cambria Math"/>
-                          </a:rPr>
-                          <m:t>𝑚𝑎𝑥</m:t>
-                        </m:r>
-                      </m:sub>
-                    </m:sSub>
-                  </m:oMath>
-                </a14:m>
-                <a:endParaRPr lang="en-US" sz="2400" b="0" dirty="0"/>
-              </a:p>
-              <a:p>
-                <a14:m>
-                  <m:oMath xmlns:m="http://schemas.openxmlformats.org/officeDocument/2006/math">
-                    <m:sSub>
-                      <m:sSubPr>
-                        <m:ctrlPr>
-                          <a:rPr lang="en-US" sz="2400" b="0" i="1" smtClean="0">
-                            <a:latin typeface="Cambria Math" panose="02040503050406030204" pitchFamily="18" charset="0"/>
-                          </a:rPr>
-                        </m:ctrlPr>
-                      </m:sSubPr>
-                      <m:e>
-                        <m:r>
-                          <a:rPr lang="en-US" sz="2400" b="0" i="1" smtClean="0">
-                            <a:latin typeface="Cambria Math"/>
-                          </a:rPr>
-                          <m:t>𝑇</m:t>
-                        </m:r>
-                      </m:e>
-                      <m:sub>
-                        <m:r>
-                          <a:rPr lang="en-US" sz="2400" b="0" i="1" smtClean="0">
-                            <a:latin typeface="Cambria Math"/>
-                          </a:rPr>
-                          <m:t>𝐼</m:t>
-                        </m:r>
-                      </m:sub>
-                    </m:sSub>
-                  </m:oMath>
-                </a14:m>
-                <a:endParaRPr lang="en-US" sz="2400" b="0" dirty="0"/>
-              </a:p>
-              <a:p>
-                <a14:m>
-                  <m:oMath xmlns:m="http://schemas.openxmlformats.org/officeDocument/2006/math">
-                    <m:sSub>
-                      <m:sSubPr>
-                        <m:ctrlPr>
-                          <a:rPr lang="en-US" sz="2400" b="0" i="1" smtClean="0">
-                            <a:latin typeface="Cambria Math" panose="02040503050406030204" pitchFamily="18" charset="0"/>
-                          </a:rPr>
-                        </m:ctrlPr>
-                      </m:sSubPr>
-                      <m:e>
-                        <m:r>
-                          <a:rPr lang="en-US" sz="2400" b="0" i="1" smtClean="0">
-                            <a:latin typeface="Cambria Math"/>
-                          </a:rPr>
-                          <m:t>𝑇</m:t>
-                        </m:r>
-                      </m:e>
-                      <m:sub>
-                        <m:r>
-                          <a:rPr lang="en-US" sz="2400" b="0" i="1" smtClean="0">
-                            <a:latin typeface="Cambria Math"/>
-                          </a:rPr>
-                          <m:t>𝑡𝑜𝑡</m:t>
-                        </m:r>
-                      </m:sub>
-                    </m:sSub>
-                  </m:oMath>
-                </a14:m>
-                <a:endParaRPr lang="en-US" sz="2400" b="0" dirty="0"/>
-              </a:p>
-              <a:p>
-                <a14:m>
-                  <m:oMath xmlns:m="http://schemas.openxmlformats.org/officeDocument/2006/math">
-                    <m:f>
-                      <m:fPr>
-                        <m:ctrlPr>
-                          <a:rPr lang="en-US" sz="2400" b="0" i="1" smtClean="0">
-                            <a:latin typeface="Cambria Math" panose="02040503050406030204" pitchFamily="18" charset="0"/>
-                          </a:rPr>
-                        </m:ctrlPr>
-                      </m:fPr>
-                      <m:num>
-                        <m:sSub>
-                          <m:sSubPr>
-                            <m:ctrlPr>
-                              <a:rPr lang="en-US" sz="2400" b="0" i="1" smtClean="0">
-                                <a:latin typeface="Cambria Math" panose="02040503050406030204" pitchFamily="18" charset="0"/>
-                              </a:rPr>
-                            </m:ctrlPr>
-                          </m:sSubPr>
-                          <m:e>
-                            <m:r>
-                              <a:rPr lang="en-US" sz="2400" b="0" i="1" smtClean="0">
-                                <a:latin typeface="Cambria Math"/>
-                              </a:rPr>
-                              <m:t>𝑇</m:t>
-                            </m:r>
-                          </m:e>
-                          <m:sub>
-                            <m:r>
-                              <a:rPr lang="en-US" sz="2400" b="0" i="1" smtClean="0">
-                                <a:latin typeface="Cambria Math"/>
-                              </a:rPr>
-                              <m:t>𝐼</m:t>
-                            </m:r>
-                          </m:sub>
-                        </m:sSub>
-                      </m:num>
-                      <m:den>
-                        <m:sSub>
-                          <m:sSubPr>
-                            <m:ctrlPr>
-                              <a:rPr lang="en-US" sz="2400" b="0" i="1" smtClean="0">
-                                <a:latin typeface="Cambria Math" panose="02040503050406030204" pitchFamily="18" charset="0"/>
-                              </a:rPr>
-                            </m:ctrlPr>
-                          </m:sSubPr>
-                          <m:e>
-                            <m:r>
-                              <a:rPr lang="en-US" sz="2400" b="0" i="1" smtClean="0">
-                                <a:latin typeface="Cambria Math"/>
-                              </a:rPr>
-                              <m:t>𝑇</m:t>
-                            </m:r>
-                          </m:e>
-                          <m:sub>
-                            <m:r>
-                              <a:rPr lang="en-US" sz="2400" b="0" i="1" smtClean="0">
-                                <a:latin typeface="Cambria Math"/>
-                              </a:rPr>
-                              <m:t>𝑡𝑜𝑡</m:t>
-                            </m:r>
-                          </m:sub>
-                        </m:sSub>
-                      </m:den>
-                    </m:f>
-                    <m:r>
-                      <a:rPr lang="en-US" sz="2400" b="0" i="1" smtClean="0">
-                        <a:latin typeface="Cambria Math"/>
-                      </a:rPr>
-                      <m:t>=0.0125</m:t>
-                    </m:r>
-                    <m:sSub>
-                      <m:sSubPr>
-                        <m:ctrlPr>
-                          <a:rPr lang="en-US" sz="2400" b="0" i="1" smtClean="0">
-                            <a:latin typeface="Cambria Math" panose="02040503050406030204" pitchFamily="18" charset="0"/>
-                          </a:rPr>
-                        </m:ctrlPr>
-                      </m:sSubPr>
-                      <m:e>
-                        <m:r>
-                          <a:rPr lang="en-US" sz="2400" b="0" i="1" smtClean="0">
-                            <a:latin typeface="Cambria Math"/>
-                          </a:rPr>
-                          <m:t>𝑓</m:t>
-                        </m:r>
-                      </m:e>
-                      <m:sub>
-                        <m:r>
-                          <a:rPr lang="en-US" sz="2400" b="0" i="1" smtClean="0">
-                            <a:latin typeface="Cambria Math"/>
-                          </a:rPr>
-                          <m:t>𝑣</m:t>
-                        </m:r>
-                      </m:sub>
-                    </m:sSub>
-                    <m:r>
-                      <a:rPr lang="en-US" sz="2400" b="0" i="1" smtClean="0">
-                        <a:latin typeface="Cambria Math"/>
-                      </a:rPr>
-                      <m:t>+0.125</m:t>
-                    </m:r>
-                  </m:oMath>
-                </a14:m>
-                <a:endParaRPr lang="en-US" sz="2400" b="0" dirty="0"/>
-              </a:p>
-              <a:p>
-                <a14:m>
-                  <m:oMath xmlns:m="http://schemas.openxmlformats.org/officeDocument/2006/math">
-                    <m:sSub>
-                      <m:sSubPr>
-                        <m:ctrlPr>
-                          <a:rPr lang="en-US" sz="2400" b="0" i="1" smtClean="0">
-                            <a:latin typeface="Cambria Math" panose="02040503050406030204" pitchFamily="18" charset="0"/>
-                          </a:rPr>
-                        </m:ctrlPr>
-                      </m:sSubPr>
-                      <m:e>
-                        <m:r>
-                          <a:rPr lang="en-US" sz="2400" b="0" i="1" smtClean="0">
-                            <a:latin typeface="Cambria Math"/>
-                          </a:rPr>
-                          <m:t>𝑓</m:t>
-                        </m:r>
-                      </m:e>
-                      <m:sub>
-                        <m:r>
-                          <a:rPr lang="en-US" sz="2400" b="0" i="1" smtClean="0">
-                            <a:latin typeface="Cambria Math"/>
-                          </a:rPr>
-                          <m:t>𝑣</m:t>
-                        </m:r>
-                      </m:sub>
-                    </m:sSub>
-                  </m:oMath>
-                </a14:m>
-                <a:endParaRPr lang="en-US" sz="2400" b="0" dirty="0"/>
-              </a:p>
-              <a:p>
-                <a:endParaRPr lang="en-US" sz="2400" b="0" dirty="0"/>
-              </a:p>
-              <a:p>
-                <a:endParaRPr lang="en-US" b="0" dirty="0"/>
-              </a:p>
-              <a:p>
-                <a:endParaRPr lang="en-US" b="0" dirty="0"/>
-              </a:p>
-              <a:p>
-                <a:endParaRPr lang="en-US" dirty="0"/>
-              </a:p>
-            </p:txBody>
-          </p:sp>
-        </mc:Choice>
-        <mc:Fallback xmlns="">
-          <p:sp>
-            <p:nvSpPr>
-              <p:cNvPr id="6" name="Content Placeholder 5"/>
-              <p:cNvSpPr>
-                <a:spLocks noGrp="1" noRot="1" noChangeAspect="1" noMove="1" noResize="1" noEditPoints="1" noAdjustHandles="1" noChangeArrowheads="1" noChangeShapeType="1" noTextEdit="1"/>
-              </p:cNvSpPr>
-              <p:nvPr>
-                <p:ph idx="1"/>
-              </p:nvPr>
-            </p:nvSpPr>
-            <p:spPr>
-              <a:xfrm>
-                <a:off x="152400" y="1600200"/>
-                <a:ext cx="8991600" cy="4525963"/>
-              </a:xfrm>
-              <a:blipFill rotWithShape="1">
-                <a:blip r:embed="rId2"/>
-                <a:stretch>
-                  <a:fillRect l="-881"/>
-                </a:stretch>
-              </a:blipFill>
-            </p:spPr>
-            <p:txBody>
-              <a:bodyPr/>
-              <a:lstStyle/>
-              <a:p>
-                <a:r>
-                  <a:rPr lang="en-US">
-                    <a:noFill/>
-                  </a:rPr>
-                  <a:t> </a:t>
-                </a:r>
-              </a:p>
-            </p:txBody>
-          </p:sp>
-        </mc:Fallback>
-      </mc:AlternateContent>
-    </p:spTree>
-    <p:extLst>
-      <p:ext uri="{BB962C8B-B14F-4D97-AF65-F5344CB8AC3E}">
-        <p14:creationId xmlns:p14="http://schemas.microsoft.com/office/powerpoint/2010/main" val="4121545883"/>
       </p:ext>
     </p:extLst>
   </p:cSld>

</xml_diff>

<commit_message>
Tweak to respiratory plot and equations.
</commit_message>
<xml_diff>
--- a/docs/Figures/RespiratoryWorking.pptx
+++ b/docs/Figures/RespiratoryWorking.pptx
@@ -224,7 +224,7 @@
           <a:p>
             <a:fld id="{7B126BB8-5932-4ACC-8CD5-328D9DA138C9}" type="datetimeFigureOut">
               <a:rPr lang="en-US" smtClean="0"/>
-              <a:t>1/8/2020</a:t>
+              <a:t>1/12/2020</a:t>
             </a:fld>
             <a:endParaRPr lang="en-US"/>
           </a:p>
@@ -670,7 +670,7 @@
           <a:p>
             <a:fld id="{9E9AFD63-10BD-4598-9E1E-9FFECB76D2D7}" type="datetimeFigureOut">
               <a:rPr lang="en-US" smtClean="0"/>
-              <a:t>1/8/2020</a:t>
+              <a:t>1/12/2020</a:t>
             </a:fld>
             <a:endParaRPr lang="en-US"/>
           </a:p>
@@ -838,7 +838,7 @@
           <a:p>
             <a:fld id="{9E9AFD63-10BD-4598-9E1E-9FFECB76D2D7}" type="datetimeFigureOut">
               <a:rPr lang="en-US" smtClean="0"/>
-              <a:t>1/8/2020</a:t>
+              <a:t>1/12/2020</a:t>
             </a:fld>
             <a:endParaRPr lang="en-US"/>
           </a:p>
@@ -1016,7 +1016,7 @@
           <a:p>
             <a:fld id="{9E9AFD63-10BD-4598-9E1E-9FFECB76D2D7}" type="datetimeFigureOut">
               <a:rPr lang="en-US" smtClean="0"/>
-              <a:t>1/8/2020</a:t>
+              <a:t>1/12/2020</a:t>
             </a:fld>
             <a:endParaRPr lang="en-US"/>
           </a:p>
@@ -2771,7 +2771,7 @@
           <a:p>
             <a:fld id="{9E9AFD63-10BD-4598-9E1E-9FFECB76D2D7}" type="datetimeFigureOut">
               <a:rPr lang="en-US" smtClean="0"/>
-              <a:t>1/8/2020</a:t>
+              <a:t>1/12/2020</a:t>
             </a:fld>
             <a:endParaRPr lang="en-US"/>
           </a:p>
@@ -3215,7 +3215,7 @@
           <a:p>
             <a:fld id="{9E9AFD63-10BD-4598-9E1E-9FFECB76D2D7}" type="datetimeFigureOut">
               <a:rPr lang="en-US" smtClean="0"/>
-              <a:t>1/8/2020</a:t>
+              <a:t>1/12/2020</a:t>
             </a:fld>
             <a:endParaRPr lang="en-US"/>
           </a:p>
@@ -3500,7 +3500,7 @@
           <a:p>
             <a:fld id="{9E9AFD63-10BD-4598-9E1E-9FFECB76D2D7}" type="datetimeFigureOut">
               <a:rPr lang="en-US" smtClean="0"/>
-              <a:t>1/8/2020</a:t>
+              <a:t>1/12/2020</a:t>
             </a:fld>
             <a:endParaRPr lang="en-US"/>
           </a:p>
@@ -3919,7 +3919,7 @@
           <a:p>
             <a:fld id="{9E9AFD63-10BD-4598-9E1E-9FFECB76D2D7}" type="datetimeFigureOut">
               <a:rPr lang="en-US" smtClean="0"/>
-              <a:t>1/8/2020</a:t>
+              <a:t>1/12/2020</a:t>
             </a:fld>
             <a:endParaRPr lang="en-US"/>
           </a:p>
@@ -4036,7 +4036,7 @@
           <a:p>
             <a:fld id="{9E9AFD63-10BD-4598-9E1E-9FFECB76D2D7}" type="datetimeFigureOut">
               <a:rPr lang="en-US" smtClean="0"/>
-              <a:t>1/8/2020</a:t>
+              <a:t>1/12/2020</a:t>
             </a:fld>
             <a:endParaRPr lang="en-US"/>
           </a:p>
@@ -4131,7 +4131,7 @@
           <a:p>
             <a:fld id="{9E9AFD63-10BD-4598-9E1E-9FFECB76D2D7}" type="datetimeFigureOut">
               <a:rPr lang="en-US" smtClean="0"/>
-              <a:t>1/8/2020</a:t>
+              <a:t>1/12/2020</a:t>
             </a:fld>
             <a:endParaRPr lang="en-US"/>
           </a:p>
@@ -4406,7 +4406,7 @@
           <a:p>
             <a:fld id="{9E9AFD63-10BD-4598-9E1E-9FFECB76D2D7}" type="datetimeFigureOut">
               <a:rPr lang="en-US" smtClean="0"/>
-              <a:t>1/8/2020</a:t>
+              <a:t>1/12/2020</a:t>
             </a:fld>
             <a:endParaRPr lang="en-US"/>
           </a:p>
@@ -4658,7 +4658,7 @@
           <a:p>
             <a:fld id="{9E9AFD63-10BD-4598-9E1E-9FFECB76D2D7}" type="datetimeFigureOut">
               <a:rPr lang="en-US" smtClean="0"/>
-              <a:t>1/8/2020</a:t>
+              <a:t>1/12/2020</a:t>
             </a:fld>
             <a:endParaRPr lang="en-US"/>
           </a:p>
@@ -4869,7 +4869,7 @@
           <a:p>
             <a:fld id="{9E9AFD63-10BD-4598-9E1E-9FFECB76D2D7}" type="datetimeFigureOut">
               <a:rPr lang="en-US" smtClean="0"/>
-              <a:t>1/8/2020</a:t>
+              <a:t>1/12/2020</a:t>
             </a:fld>
             <a:endParaRPr lang="en-US"/>
           </a:p>
@@ -9802,7 +9802,7 @@
           <a:graphicData uri="http://schemas.openxmlformats.org/presentationml/2006/ole">
             <mc:AlternateContent xmlns:mc="http://schemas.openxmlformats.org/markup-compatibility/2006">
               <mc:Choice xmlns:v="urn:schemas-microsoft-com:vml" Requires="v">
-                <p:oleObj spid="_x0000_s2142" name="Equation" r:id="rId4" imgW="914400" imgH="198720" progId="Equation.DSMT4">
+                <p:oleObj spid="_x0000_s2154" name="Equation" r:id="rId4" imgW="914400" imgH="198720" progId="Equation.DSMT4">
                   <p:embed/>
                 </p:oleObj>
               </mc:Choice>
@@ -9865,7 +9865,7 @@
           <a:graphicData uri="http://schemas.openxmlformats.org/presentationml/2006/ole">
             <mc:AlternateContent xmlns:mc="http://schemas.openxmlformats.org/markup-compatibility/2006">
               <mc:Choice xmlns:v="urn:schemas-microsoft-com:vml" Requires="v">
-                <p:oleObj spid="_x0000_s2143" name="Equation" r:id="rId6" imgW="114120" imgH="177480" progId="Equation.DSMT4">
+                <p:oleObj spid="_x0000_s2155" name="Equation" r:id="rId6" imgW="114120" imgH="177480" progId="Equation.DSMT4">
                   <p:embed/>
                 </p:oleObj>
               </mc:Choice>
@@ -11153,7 +11153,7 @@
           <a:graphicData uri="http://schemas.openxmlformats.org/presentationml/2006/ole">
             <mc:AlternateContent xmlns:mc="http://schemas.openxmlformats.org/markup-compatibility/2006">
               <mc:Choice xmlns:v="urn:schemas-microsoft-com:vml" Requires="v">
-                <p:oleObj spid="_x0000_s1107" name="Equation" r:id="rId3" imgW="2412720" imgH="3060360" progId="Equation.DSMT4">
+                <p:oleObj spid="_x0000_s1119" name="Equation" r:id="rId3" imgW="2412720" imgH="3060360" progId="Equation.DSMT4">
                   <p:embed/>
                 </p:oleObj>
               </mc:Choice>
@@ -11216,7 +11216,7 @@
           <a:graphicData uri="http://schemas.openxmlformats.org/presentationml/2006/ole">
             <mc:AlternateContent xmlns:mc="http://schemas.openxmlformats.org/markup-compatibility/2006">
               <mc:Choice xmlns:v="urn:schemas-microsoft-com:vml" Requires="v">
-                <p:oleObj spid="_x0000_s1108" name="Equation" r:id="rId5" imgW="2095200" imgH="1066680" progId="Equation.DSMT4">
+                <p:oleObj spid="_x0000_s1120" name="Equation" r:id="rId5" imgW="2095200" imgH="1066680" progId="Equation.DSMT4">
                   <p:embed/>
                 </p:oleObj>
               </mc:Choice>
@@ -11457,7 +11457,7 @@
         <p:spPr>
           <a:xfrm>
             <a:off x="6602439" y="4445327"/>
-            <a:ext cx="542136" cy="261610"/>
+            <a:ext cx="381836" cy="261610"/>
           </a:xfrm>
           <a:prstGeom prst="rect">
             <a:avLst/>
@@ -11475,7 +11475,7 @@
                 <a:latin typeface="Arial" panose="020B0604020202020204" pitchFamily="34" charset="0"/>
                 <a:cs typeface="Arial" panose="020B0604020202020204" pitchFamily="34" charset="0"/>
               </a:rPr>
-              <a:t>a=RV</a:t>
+              <a:t>RV</a:t>
             </a:r>
           </a:p>
         </p:txBody>
@@ -11903,7 +11903,7 @@
         <p:spPr>
           <a:xfrm>
             <a:off x="7436638" y="3095903"/>
-            <a:ext cx="263214" cy="261610"/>
+            <a:ext cx="381836" cy="261610"/>
           </a:xfrm>
           <a:prstGeom prst="rect">
             <a:avLst/>
@@ -11921,7 +11921,7 @@
                 <a:latin typeface="Arial" panose="020B0604020202020204" pitchFamily="34" charset="0"/>
                 <a:cs typeface="Arial" panose="020B0604020202020204" pitchFamily="34" charset="0"/>
               </a:rPr>
-              <a:t>b</a:t>
+              <a:t>VC</a:t>
             </a:r>
           </a:p>
         </p:txBody>
@@ -11971,7 +11971,7 @@
           <p:nvPr>
             <p:extLst>
               <p:ext uri="{D42A27DB-BD31-4B8C-83A1-F6EECF244321}">
-                <p14:modId xmlns:p14="http://schemas.microsoft.com/office/powerpoint/2010/main" val="2178429932"/>
+                <p14:modId xmlns:p14="http://schemas.microsoft.com/office/powerpoint/2010/main" val="1060257641"/>
               </p:ext>
             </p:extLst>
           </p:nvPr>
@@ -11984,7 +11984,7 @@
           <a:graphicData uri="http://schemas.openxmlformats.org/presentationml/2006/ole">
             <mc:AlternateContent xmlns:mc="http://schemas.openxmlformats.org/markup-compatibility/2006">
               <mc:Choice xmlns:v="urn:schemas-microsoft-com:vml" Requires="v">
-                <p:oleObj spid="_x0000_s3099" name="Equation" r:id="rId3" imgW="1765080" imgH="4978080" progId="Equation.DSMT4">
+                <p:oleObj spid="_x0000_s3105" name="Equation" r:id="rId3" imgW="1765080" imgH="4978080" progId="Equation.DSMT4">
                   <p:embed/>
                 </p:oleObj>
               </mc:Choice>

</xml_diff>

<commit_message>
Small fixes to patient and respiratory documentation.
</commit_message>
<xml_diff>
--- a/docs/Figures/RespiratoryWorking.pptx
+++ b/docs/Figures/RespiratoryWorking.pptx
@@ -6,25 +6,26 @@
     <p:sldMasterId id="2147483672" r:id="rId2"/>
   </p:sldMasterIdLst>
   <p:notesMasterIdLst>
-    <p:notesMasterId r:id="rId19"/>
+    <p:notesMasterId r:id="rId20"/>
   </p:notesMasterIdLst>
   <p:sldIdLst>
     <p:sldId id="283" r:id="rId3"/>
     <p:sldId id="290" r:id="rId4"/>
     <p:sldId id="291" r:id="rId5"/>
     <p:sldId id="292" r:id="rId6"/>
-    <p:sldId id="293" r:id="rId7"/>
-    <p:sldId id="294" r:id="rId8"/>
-    <p:sldId id="267" r:id="rId9"/>
-    <p:sldId id="268" r:id="rId10"/>
-    <p:sldId id="269" r:id="rId11"/>
-    <p:sldId id="270" r:id="rId12"/>
-    <p:sldId id="271" r:id="rId13"/>
-    <p:sldId id="272" r:id="rId14"/>
-    <p:sldId id="273" r:id="rId15"/>
-    <p:sldId id="287" r:id="rId16"/>
-    <p:sldId id="288" r:id="rId17"/>
-    <p:sldId id="289" r:id="rId18"/>
+    <p:sldId id="295" r:id="rId7"/>
+    <p:sldId id="293" r:id="rId8"/>
+    <p:sldId id="294" r:id="rId9"/>
+    <p:sldId id="267" r:id="rId10"/>
+    <p:sldId id="268" r:id="rId11"/>
+    <p:sldId id="269" r:id="rId12"/>
+    <p:sldId id="270" r:id="rId13"/>
+    <p:sldId id="271" r:id="rId14"/>
+    <p:sldId id="272" r:id="rId15"/>
+    <p:sldId id="273" r:id="rId16"/>
+    <p:sldId id="287" r:id="rId17"/>
+    <p:sldId id="288" r:id="rId18"/>
+    <p:sldId id="289" r:id="rId19"/>
   </p:sldIdLst>
   <p:sldSz cx="9144000" cy="6858000" type="screen4x3"/>
   <p:notesSz cx="6996113" cy="9282113"/>
@@ -224,7 +225,7 @@
           <a:p>
             <a:fld id="{7B126BB8-5932-4ACC-8CD5-328D9DA138C9}" type="datetimeFigureOut">
               <a:rPr lang="en-US" smtClean="0"/>
-              <a:t>1/12/2020</a:t>
+              <a:t>2/12/2020</a:t>
             </a:fld>
             <a:endParaRPr lang="en-US"/>
           </a:p>
@@ -670,7 +671,7 @@
           <a:p>
             <a:fld id="{9E9AFD63-10BD-4598-9E1E-9FFECB76D2D7}" type="datetimeFigureOut">
               <a:rPr lang="en-US" smtClean="0"/>
-              <a:t>1/12/2020</a:t>
+              <a:t>2/12/2020</a:t>
             </a:fld>
             <a:endParaRPr lang="en-US"/>
           </a:p>
@@ -838,7 +839,7 @@
           <a:p>
             <a:fld id="{9E9AFD63-10BD-4598-9E1E-9FFECB76D2D7}" type="datetimeFigureOut">
               <a:rPr lang="en-US" smtClean="0"/>
-              <a:t>1/12/2020</a:t>
+              <a:t>2/12/2020</a:t>
             </a:fld>
             <a:endParaRPr lang="en-US"/>
           </a:p>
@@ -1016,7 +1017,7 @@
           <a:p>
             <a:fld id="{9E9AFD63-10BD-4598-9E1E-9FFECB76D2D7}" type="datetimeFigureOut">
               <a:rPr lang="en-US" smtClean="0"/>
-              <a:t>1/12/2020</a:t>
+              <a:t>2/12/2020</a:t>
             </a:fld>
             <a:endParaRPr lang="en-US"/>
           </a:p>
@@ -2771,7 +2772,7 @@
           <a:p>
             <a:fld id="{9E9AFD63-10BD-4598-9E1E-9FFECB76D2D7}" type="datetimeFigureOut">
               <a:rPr lang="en-US" smtClean="0"/>
-              <a:t>1/12/2020</a:t>
+              <a:t>2/12/2020</a:t>
             </a:fld>
             <a:endParaRPr lang="en-US"/>
           </a:p>
@@ -3215,7 +3216,7 @@
           <a:p>
             <a:fld id="{9E9AFD63-10BD-4598-9E1E-9FFECB76D2D7}" type="datetimeFigureOut">
               <a:rPr lang="en-US" smtClean="0"/>
-              <a:t>1/12/2020</a:t>
+              <a:t>2/12/2020</a:t>
             </a:fld>
             <a:endParaRPr lang="en-US"/>
           </a:p>
@@ -3500,7 +3501,7 @@
           <a:p>
             <a:fld id="{9E9AFD63-10BD-4598-9E1E-9FFECB76D2D7}" type="datetimeFigureOut">
               <a:rPr lang="en-US" smtClean="0"/>
-              <a:t>1/12/2020</a:t>
+              <a:t>2/12/2020</a:t>
             </a:fld>
             <a:endParaRPr lang="en-US"/>
           </a:p>
@@ -3919,7 +3920,7 @@
           <a:p>
             <a:fld id="{9E9AFD63-10BD-4598-9E1E-9FFECB76D2D7}" type="datetimeFigureOut">
               <a:rPr lang="en-US" smtClean="0"/>
-              <a:t>1/12/2020</a:t>
+              <a:t>2/12/2020</a:t>
             </a:fld>
             <a:endParaRPr lang="en-US"/>
           </a:p>
@@ -4036,7 +4037,7 @@
           <a:p>
             <a:fld id="{9E9AFD63-10BD-4598-9E1E-9FFECB76D2D7}" type="datetimeFigureOut">
               <a:rPr lang="en-US" smtClean="0"/>
-              <a:t>1/12/2020</a:t>
+              <a:t>2/12/2020</a:t>
             </a:fld>
             <a:endParaRPr lang="en-US"/>
           </a:p>
@@ -4131,7 +4132,7 @@
           <a:p>
             <a:fld id="{9E9AFD63-10BD-4598-9E1E-9FFECB76D2D7}" type="datetimeFigureOut">
               <a:rPr lang="en-US" smtClean="0"/>
-              <a:t>1/12/2020</a:t>
+              <a:t>2/12/2020</a:t>
             </a:fld>
             <a:endParaRPr lang="en-US"/>
           </a:p>
@@ -4406,7 +4407,7 @@
           <a:p>
             <a:fld id="{9E9AFD63-10BD-4598-9E1E-9FFECB76D2D7}" type="datetimeFigureOut">
               <a:rPr lang="en-US" smtClean="0"/>
-              <a:t>1/12/2020</a:t>
+              <a:t>2/12/2020</a:t>
             </a:fld>
             <a:endParaRPr lang="en-US"/>
           </a:p>
@@ -4658,7 +4659,7 @@
           <a:p>
             <a:fld id="{9E9AFD63-10BD-4598-9E1E-9FFECB76D2D7}" type="datetimeFigureOut">
               <a:rPr lang="en-US" smtClean="0"/>
-              <a:t>1/12/2020</a:t>
+              <a:t>2/12/2020</a:t>
             </a:fld>
             <a:endParaRPr lang="en-US"/>
           </a:p>
@@ -4869,7 +4870,7 @@
           <a:p>
             <a:fld id="{9E9AFD63-10BD-4598-9E1E-9FFECB76D2D7}" type="datetimeFigureOut">
               <a:rPr lang="en-US" smtClean="0"/>
-              <a:t>1/12/2020</a:t>
+              <a:t>2/12/2020</a:t>
             </a:fld>
             <a:endParaRPr lang="en-US"/>
           </a:p>
@@ -7201,6 +7202,378 @@
 </file>
 
 <file path=ppt/slides/slide10.xml><?xml version="1.0" encoding="utf-8"?>
+<p:sld xmlns:a="http://schemas.openxmlformats.org/drawingml/2006/main" xmlns:r="http://schemas.openxmlformats.org/officeDocument/2006/relationships" xmlns:p="http://schemas.openxmlformats.org/presentationml/2006/main">
+  <p:cSld>
+    <p:spTree>
+      <p:nvGrpSpPr>
+        <p:cNvPr id="1" name=""/>
+        <p:cNvGrpSpPr/>
+        <p:nvPr/>
+      </p:nvGrpSpPr>
+      <p:grpSpPr>
+        <a:xfrm>
+          <a:off x="0" y="0"/>
+          <a:ext cx="0" cy="0"/>
+          <a:chOff x="0" y="0"/>
+          <a:chExt cx="0" cy="0"/>
+        </a:xfrm>
+      </p:grpSpPr>
+      <p:sp>
+        <p:nvSpPr>
+          <p:cNvPr id="9" name="Title 8"/>
+          <p:cNvSpPr>
+            <a:spLocks noGrp="1"/>
+          </p:cNvSpPr>
+          <p:nvPr>
+            <p:ph type="title"/>
+          </p:nvPr>
+        </p:nvSpPr>
+        <p:spPr/>
+        <p:txBody>
+          <a:bodyPr/>
+          <a:lstStyle/>
+          <a:p>
+            <a:endParaRPr lang="en-US"/>
+          </a:p>
+        </p:txBody>
+      </p:sp>
+      <mc:AlternateContent xmlns:mc="http://schemas.openxmlformats.org/markup-compatibility/2006" xmlns:a14="http://schemas.microsoft.com/office/drawing/2010/main">
+        <mc:Choice Requires="a14">
+          <p:sp>
+            <p:nvSpPr>
+              <p:cNvPr id="6" name="Content Placeholder 5"/>
+              <p:cNvSpPr>
+                <a:spLocks noGrp="1"/>
+              </p:cNvSpPr>
+              <p:nvPr>
+                <p:ph idx="1"/>
+              </p:nvPr>
+            </p:nvSpPr>
+            <p:spPr/>
+            <p:txBody>
+              <a:bodyPr/>
+              <a:lstStyle/>
+              <a:p>
+                <a14:m>
+                  <m:oMath xmlns:m="http://schemas.openxmlformats.org/officeDocument/2006/math">
+                    <m:r>
+                      <a:rPr lang="en-US" b="0" i="1" smtClean="0">
+                        <a:latin typeface="Cambria Math"/>
+                      </a:rPr>
+                      <m:t>𝐸𝑅𝑉</m:t>
+                    </m:r>
+                    <m:r>
+                      <a:rPr lang="en-US" b="0" i="1" smtClean="0">
+                        <a:latin typeface="Cambria Math"/>
+                      </a:rPr>
+                      <m:t>=</m:t>
+                    </m:r>
+                    <m:r>
+                      <a:rPr lang="en-US" b="0" i="1" smtClean="0">
+                        <a:latin typeface="Cambria Math"/>
+                      </a:rPr>
+                      <m:t>𝐹𝑅𝐶</m:t>
+                    </m:r>
+                    <m:r>
+                      <a:rPr lang="en-US" b="0" i="1" smtClean="0">
+                        <a:latin typeface="Cambria Math"/>
+                      </a:rPr>
+                      <m:t>−</m:t>
+                    </m:r>
+                    <m:r>
+                      <a:rPr lang="en-US" b="0" i="1" smtClean="0">
+                        <a:latin typeface="Cambria Math"/>
+                      </a:rPr>
+                      <m:t>𝑅𝑉</m:t>
+                    </m:r>
+                  </m:oMath>
+                </a14:m>
+                <a:endParaRPr lang="en-US" b="0" dirty="0"/>
+              </a:p>
+              <a:p>
+                <a14:m>
+                  <m:oMath xmlns:m="http://schemas.openxmlformats.org/officeDocument/2006/math">
+                    <m:sSub>
+                      <m:sSubPr>
+                        <m:ctrlPr>
+                          <a:rPr lang="en-US" i="1">
+                            <a:latin typeface="Cambria Math" panose="02040503050406030204" pitchFamily="18" charset="0"/>
+                          </a:rPr>
+                        </m:ctrlPr>
+                      </m:sSubPr>
+                      <m:e>
+                        <m:r>
+                          <a:rPr lang="en-US" i="1">
+                            <a:latin typeface="Cambria Math"/>
+                          </a:rPr>
+                          <m:t>𝑄</m:t>
+                        </m:r>
+                      </m:e>
+                      <m:sub>
+                        <m:r>
+                          <a:rPr lang="en-US" i="1">
+                            <a:latin typeface="Cambria Math"/>
+                          </a:rPr>
+                          <m:t>𝑡𝑟𝑎𝑐h𝑒𝑎</m:t>
+                        </m:r>
+                      </m:sub>
+                    </m:sSub>
+                    <m:r>
+                      <a:rPr lang="en-US" i="1">
+                        <a:latin typeface="Cambria Math"/>
+                      </a:rPr>
+                      <m:t>=</m:t>
+                    </m:r>
+                    <m:f>
+                      <m:fPr>
+                        <m:ctrlPr>
+                          <a:rPr lang="en-US" i="1">
+                            <a:latin typeface="Cambria Math" panose="02040503050406030204" pitchFamily="18" charset="0"/>
+                          </a:rPr>
+                        </m:ctrlPr>
+                      </m:fPr>
+                      <m:num>
+                        <m:sSub>
+                          <m:sSubPr>
+                            <m:ctrlPr>
+                              <a:rPr lang="en-US" i="1">
+                                <a:latin typeface="Cambria Math" panose="02040503050406030204" pitchFamily="18" charset="0"/>
+                              </a:rPr>
+                            </m:ctrlPr>
+                          </m:sSubPr>
+                          <m:e>
+                            <m:r>
+                              <a:rPr lang="en-US" i="1">
+                                <a:latin typeface="Cambria Math"/>
+                              </a:rPr>
+                              <m:t>𝑃</m:t>
+                            </m:r>
+                          </m:e>
+                          <m:sub>
+                            <m:r>
+                              <a:rPr lang="en-US" i="1">
+                                <a:latin typeface="Cambria Math"/>
+                              </a:rPr>
+                              <m:t>𝑎𝑖𝑟𝑤𝑎𝑦</m:t>
+                            </m:r>
+                          </m:sub>
+                        </m:sSub>
+                        <m:r>
+                          <a:rPr lang="en-US" i="1">
+                            <a:latin typeface="Cambria Math"/>
+                          </a:rPr>
+                          <m:t>−</m:t>
+                        </m:r>
+                        <m:sSub>
+                          <m:sSubPr>
+                            <m:ctrlPr>
+                              <a:rPr lang="en-US" i="1">
+                                <a:latin typeface="Cambria Math" panose="02040503050406030204" pitchFamily="18" charset="0"/>
+                              </a:rPr>
+                            </m:ctrlPr>
+                          </m:sSubPr>
+                          <m:e>
+                            <m:r>
+                              <a:rPr lang="en-US" i="1">
+                                <a:latin typeface="Cambria Math"/>
+                              </a:rPr>
+                              <m:t>𝑃</m:t>
+                            </m:r>
+                          </m:e>
+                          <m:sub>
+                            <m:r>
+                              <a:rPr lang="en-US" i="1">
+                                <a:latin typeface="Cambria Math"/>
+                              </a:rPr>
+                              <m:t>𝑐𝑎𝑟𝑖𝑛𝑎</m:t>
+                            </m:r>
+                          </m:sub>
+                        </m:sSub>
+                      </m:num>
+                      <m:den>
+                        <m:sSub>
+                          <m:sSubPr>
+                            <m:ctrlPr>
+                              <a:rPr lang="en-US" i="1">
+                                <a:latin typeface="Cambria Math" panose="02040503050406030204" pitchFamily="18" charset="0"/>
+                              </a:rPr>
+                            </m:ctrlPr>
+                          </m:sSubPr>
+                          <m:e>
+                            <m:r>
+                              <a:rPr lang="en-US" i="1">
+                                <a:latin typeface="Cambria Math"/>
+                              </a:rPr>
+                              <m:t>𝑅</m:t>
+                            </m:r>
+                          </m:e>
+                          <m:sub>
+                            <m:r>
+                              <a:rPr lang="en-US" i="1">
+                                <a:latin typeface="Cambria Math"/>
+                              </a:rPr>
+                              <m:t>𝑡𝑟𝑎𝑐h𝑒𝑎</m:t>
+                            </m:r>
+                          </m:sub>
+                        </m:sSub>
+                      </m:den>
+                    </m:f>
+                  </m:oMath>
+                </a14:m>
+                <a:endParaRPr lang="en-US" b="0" dirty="0"/>
+              </a:p>
+              <a:p>
+                <a14:m>
+                  <m:oMath xmlns:m="http://schemas.openxmlformats.org/officeDocument/2006/math">
+                    <m:sSub>
+                      <m:sSubPr>
+                        <m:ctrlPr>
+                          <a:rPr lang="en-US" i="1">
+                            <a:latin typeface="Cambria Math" panose="02040503050406030204" pitchFamily="18" charset="0"/>
+                          </a:rPr>
+                        </m:ctrlPr>
+                      </m:sSubPr>
+                      <m:e>
+                        <m:r>
+                          <a:rPr lang="en-US" i="1">
+                            <a:latin typeface="Cambria Math"/>
+                          </a:rPr>
+                          <m:t>𝑃</m:t>
+                        </m:r>
+                      </m:e>
+                      <m:sub>
+                        <m:r>
+                          <a:rPr lang="en-US" i="1">
+                            <a:latin typeface="Cambria Math"/>
+                          </a:rPr>
+                          <m:t>𝑔𝑎𝑠</m:t>
+                        </m:r>
+                      </m:sub>
+                    </m:sSub>
+                    <m:r>
+                      <a:rPr lang="en-US" i="1">
+                        <a:latin typeface="Cambria Math"/>
+                      </a:rPr>
+                      <m:t>=</m:t>
+                    </m:r>
+                    <m:sSub>
+                      <m:sSubPr>
+                        <m:ctrlPr>
+                          <a:rPr lang="en-US" i="1">
+                            <a:latin typeface="Cambria Math" panose="02040503050406030204" pitchFamily="18" charset="0"/>
+                          </a:rPr>
+                        </m:ctrlPr>
+                      </m:sSubPr>
+                      <m:e>
+                        <m:r>
+                          <a:rPr lang="en-US" i="1">
+                            <a:latin typeface="Cambria Math"/>
+                          </a:rPr>
+                          <m:t>𝐹</m:t>
+                        </m:r>
+                      </m:e>
+                      <m:sub>
+                        <m:r>
+                          <a:rPr lang="en-US" i="1">
+                            <a:latin typeface="Cambria Math"/>
+                          </a:rPr>
+                          <m:t>𝑔𝑎𝑠</m:t>
+                        </m:r>
+                      </m:sub>
+                    </m:sSub>
+                    <m:r>
+                      <a:rPr lang="en-US" i="1">
+                        <a:latin typeface="Cambria Math"/>
+                        <a:ea typeface="Cambria Math"/>
+                      </a:rPr>
+                      <m:t>×</m:t>
+                    </m:r>
+                    <m:sSub>
+                      <m:sSubPr>
+                        <m:ctrlPr>
+                          <a:rPr lang="en-US" i="1">
+                            <a:latin typeface="Cambria Math" panose="02040503050406030204" pitchFamily="18" charset="0"/>
+                            <a:ea typeface="Cambria Math"/>
+                          </a:rPr>
+                        </m:ctrlPr>
+                      </m:sSubPr>
+                      <m:e>
+                        <m:r>
+                          <a:rPr lang="en-US" i="1">
+                            <a:latin typeface="Cambria Math"/>
+                            <a:ea typeface="Cambria Math"/>
+                          </a:rPr>
+                          <m:t>𝑃</m:t>
+                        </m:r>
+                      </m:e>
+                      <m:sub>
+                        <m:r>
+                          <a:rPr lang="en-US" i="1">
+                            <a:latin typeface="Cambria Math"/>
+                            <a:ea typeface="Cambria Math"/>
+                          </a:rPr>
+                          <m:t>𝑡𝑜𝑡𝑎𝑙</m:t>
+                        </m:r>
+                      </m:sub>
+                    </m:sSub>
+                  </m:oMath>
+                </a14:m>
+                <a:endParaRPr lang="en-US" b="0" dirty="0"/>
+              </a:p>
+              <a:p>
+                <a:endParaRPr lang="en-US" dirty="0"/>
+              </a:p>
+            </p:txBody>
+          </p:sp>
+        </mc:Choice>
+        <mc:Fallback xmlns="">
+          <p:sp>
+            <p:nvSpPr>
+              <p:cNvPr id="6" name="Content Placeholder 5"/>
+              <p:cNvSpPr>
+                <a:spLocks noGrp="1" noRot="1" noChangeAspect="1" noMove="1" noResize="1" noEditPoints="1" noAdjustHandles="1" noChangeArrowheads="1" noChangeShapeType="1" noTextEdit="1"/>
+              </p:cNvSpPr>
+              <p:nvPr>
+                <p:ph idx="1"/>
+              </p:nvPr>
+            </p:nvSpPr>
+            <p:spPr>
+              <a:blipFill rotWithShape="1">
+                <a:blip r:embed="rId2"/>
+                <a:stretch>
+                  <a:fillRect/>
+                </a:stretch>
+              </a:blipFill>
+            </p:spPr>
+            <p:txBody>
+              <a:bodyPr/>
+              <a:lstStyle/>
+              <a:p>
+                <a:r>
+                  <a:rPr lang="en-US">
+                    <a:noFill/>
+                  </a:rPr>
+                  <a:t> </a:t>
+                </a:r>
+              </a:p>
+            </p:txBody>
+          </p:sp>
+        </mc:Fallback>
+      </mc:AlternateContent>
+    </p:spTree>
+    <p:extLst>
+      <p:ext uri="{BB962C8B-B14F-4D97-AF65-F5344CB8AC3E}">
+        <p14:creationId xmlns:p14="http://schemas.microsoft.com/office/powerpoint/2010/main" val="3172890189"/>
+      </p:ext>
+    </p:extLst>
+  </p:cSld>
+  <p:clrMapOvr>
+    <a:masterClrMapping/>
+  </p:clrMapOvr>
+</p:sld>
+</file>
+
+<file path=ppt/slides/slide11.xml><?xml version="1.0" encoding="utf-8"?>
 <p:sld xmlns:a="http://schemas.openxmlformats.org/drawingml/2006/main" xmlns:r="http://schemas.openxmlformats.org/officeDocument/2006/relationships" xmlns:p="http://schemas.openxmlformats.org/presentationml/2006/main">
   <p:cSld>
     <p:spTree>
@@ -8098,7 +8471,7 @@
 </p:sld>
 </file>
 
-<file path=ppt/slides/slide11.xml><?xml version="1.0" encoding="utf-8"?>
+<file path=ppt/slides/slide12.xml><?xml version="1.0" encoding="utf-8"?>
 <p:sld xmlns:a="http://schemas.openxmlformats.org/drawingml/2006/main" xmlns:r="http://schemas.openxmlformats.org/officeDocument/2006/relationships" xmlns:p="http://schemas.openxmlformats.org/presentationml/2006/main">
   <p:cSld>
     <p:spTree>
@@ -8724,7 +9097,7 @@
 </p:sld>
 </file>
 
-<file path=ppt/slides/slide12.xml><?xml version="1.0" encoding="utf-8"?>
+<file path=ppt/slides/slide13.xml><?xml version="1.0" encoding="utf-8"?>
 <p:sld xmlns:a="http://schemas.openxmlformats.org/drawingml/2006/main" xmlns:r="http://schemas.openxmlformats.org/officeDocument/2006/relationships" xmlns:p="http://schemas.openxmlformats.org/presentationml/2006/main">
   <p:cSld>
     <p:spTree>
@@ -9802,7 +10175,7 @@
           <a:graphicData uri="http://schemas.openxmlformats.org/presentationml/2006/ole">
             <mc:AlternateContent xmlns:mc="http://schemas.openxmlformats.org/markup-compatibility/2006">
               <mc:Choice xmlns:v="urn:schemas-microsoft-com:vml" Requires="v">
-                <p:oleObj spid="_x0000_s2154" name="Equation" r:id="rId4" imgW="914400" imgH="198720" progId="Equation.DSMT4">
+                <p:oleObj spid="_x0000_s2158" name="Equation" r:id="rId4" imgW="914400" imgH="198720" progId="Equation.DSMT4">
                   <p:embed/>
                 </p:oleObj>
               </mc:Choice>
@@ -9865,7 +10238,7 @@
           <a:graphicData uri="http://schemas.openxmlformats.org/presentationml/2006/ole">
             <mc:AlternateContent xmlns:mc="http://schemas.openxmlformats.org/markup-compatibility/2006">
               <mc:Choice xmlns:v="urn:schemas-microsoft-com:vml" Requires="v">
-                <p:oleObj spid="_x0000_s2155" name="Equation" r:id="rId6" imgW="114120" imgH="177480" progId="Equation.DSMT4">
+                <p:oleObj spid="_x0000_s2159" name="Equation" r:id="rId6" imgW="114120" imgH="177480" progId="Equation.DSMT4">
                   <p:embed/>
                 </p:oleObj>
               </mc:Choice>
@@ -9913,7 +10286,7 @@
 </p:sld>
 </file>
 
-<file path=ppt/slides/slide13.xml><?xml version="1.0" encoding="utf-8"?>
+<file path=ppt/slides/slide14.xml><?xml version="1.0" encoding="utf-8"?>
 <p:sld xmlns:a="http://schemas.openxmlformats.org/drawingml/2006/main" xmlns:r="http://schemas.openxmlformats.org/officeDocument/2006/relationships" xmlns:p="http://schemas.openxmlformats.org/presentationml/2006/main">
   <p:cSld>
     <p:spTree>
@@ -10741,7 +11114,7 @@
 </p:sld>
 </file>
 
-<file path=ppt/slides/slide14.xml><?xml version="1.0" encoding="utf-8"?>
+<file path=ppt/slides/slide15.xml><?xml version="1.0" encoding="utf-8"?>
 <p:sld xmlns:a="http://schemas.openxmlformats.org/drawingml/2006/main" xmlns:r="http://schemas.openxmlformats.org/officeDocument/2006/relationships" xmlns:p="http://schemas.openxmlformats.org/presentationml/2006/main">
   <p:cSld>
     <p:spTree>
@@ -10823,7 +11196,7 @@
 </p:sld>
 </file>
 
-<file path=ppt/slides/slide15.xml><?xml version="1.0" encoding="utf-8"?>
+<file path=ppt/slides/slide16.xml><?xml version="1.0" encoding="utf-8"?>
 <p:sld xmlns:a="http://schemas.openxmlformats.org/drawingml/2006/main" xmlns:r="http://schemas.openxmlformats.org/officeDocument/2006/relationships" xmlns:p="http://schemas.openxmlformats.org/presentationml/2006/main">
   <p:cSld>
     <p:spTree>
@@ -10883,7 +11256,7 @@
 </p:sld>
 </file>
 
-<file path=ppt/slides/slide16.xml><?xml version="1.0" encoding="utf-8"?>
+<file path=ppt/slides/slide17.xml><?xml version="1.0" encoding="utf-8"?>
 <p:sld xmlns:a="http://schemas.openxmlformats.org/drawingml/2006/main" xmlns:r="http://schemas.openxmlformats.org/officeDocument/2006/relationships" xmlns:p="http://schemas.openxmlformats.org/presentationml/2006/main">
   <p:cSld>
     <p:spTree>
@@ -11140,25 +11513,25 @@
           <p:nvPr>
             <p:extLst>
               <p:ext uri="{D42A27DB-BD31-4B8C-83A1-F6EECF244321}">
-                <p14:modId xmlns:p14="http://schemas.microsoft.com/office/powerpoint/2010/main" val="2724244248"/>
+                <p14:modId xmlns:p14="http://schemas.microsoft.com/office/powerpoint/2010/main" val="1531156437"/>
               </p:ext>
             </p:extLst>
           </p:nvPr>
         </p:nvGraphicFramePr>
         <p:xfrm>
-          <a:off x="1295400" y="698500"/>
-          <a:ext cx="2413000" cy="3060700"/>
+          <a:off x="1295400" y="711200"/>
+          <a:ext cx="2413000" cy="3035300"/>
         </p:xfrm>
         <a:graphic>
           <a:graphicData uri="http://schemas.openxmlformats.org/presentationml/2006/ole">
             <mc:AlternateContent xmlns:mc="http://schemas.openxmlformats.org/markup-compatibility/2006">
               <mc:Choice xmlns:v="urn:schemas-microsoft-com:vml" Requires="v">
-                <p:oleObj spid="_x0000_s1119" name="Equation" r:id="rId3" imgW="2412720" imgH="3060360" progId="Equation.DSMT4">
+                <p:oleObj spid="_x0000_s1123" name="Equation" r:id="rId3" imgW="2412720" imgH="3035160" progId="Equation.DSMT4">
                   <p:embed/>
                 </p:oleObj>
               </mc:Choice>
               <mc:Fallback>
-                <p:oleObj name="Equation" r:id="rId3" imgW="2412720" imgH="3060360" progId="Equation.DSMT4">
+                <p:oleObj name="Equation" r:id="rId3" imgW="2412720" imgH="3035160" progId="Equation.DSMT4">
                   <p:embed/>
                   <p:pic>
                     <p:nvPicPr>
@@ -11174,8 +11547,8 @@
                     </p:blipFill>
                     <p:spPr>
                       <a:xfrm>
-                        <a:off x="1295400" y="698500"/>
-                        <a:ext cx="2413000" cy="3060700"/>
+                        <a:off x="1295400" y="711200"/>
+                        <a:ext cx="2413000" cy="3035300"/>
                       </a:xfrm>
                       <a:prstGeom prst="rect">
                         <a:avLst/>
@@ -11216,7 +11589,7 @@
           <a:graphicData uri="http://schemas.openxmlformats.org/presentationml/2006/ole">
             <mc:AlternateContent xmlns:mc="http://schemas.openxmlformats.org/markup-compatibility/2006">
               <mc:Choice xmlns:v="urn:schemas-microsoft-com:vml" Requires="v">
-                <p:oleObj spid="_x0000_s1120" name="Equation" r:id="rId5" imgW="2095200" imgH="1066680" progId="Equation.DSMT4">
+                <p:oleObj spid="_x0000_s1124" name="Equation" r:id="rId5" imgW="2095200" imgH="1066680" progId="Equation.DSMT4">
                   <p:embed/>
                 </p:oleObj>
               </mc:Choice>
@@ -11984,7 +12357,7 @@
           <a:graphicData uri="http://schemas.openxmlformats.org/presentationml/2006/ole">
             <mc:AlternateContent xmlns:mc="http://schemas.openxmlformats.org/markup-compatibility/2006">
               <mc:Choice xmlns:v="urn:schemas-microsoft-com:vml" Requires="v">
-                <p:oleObj spid="_x0000_s3105" name="Equation" r:id="rId3" imgW="1765080" imgH="4978080" progId="Equation.DSMT4">
+                <p:oleObj spid="_x0000_s3107" name="Equation" r:id="rId3" imgW="1765080" imgH="4978080" progId="Equation.DSMT4">
                   <p:embed/>
                 </p:oleObj>
               </mc:Choice>
@@ -12049,6 +12422,99 @@
           <a:chExt cx="0" cy="0"/>
         </a:xfrm>
       </p:grpSpPr>
+      <p:graphicFrame>
+        <p:nvGraphicFramePr>
+          <p:cNvPr id="2" name="Object 1">
+            <a:extLst>
+              <a:ext uri="{FF2B5EF4-FFF2-40B4-BE49-F238E27FC236}">
+                <a16:creationId xmlns:a16="http://schemas.microsoft.com/office/drawing/2014/main" id="{5190AA5F-CD3C-4786-A9AA-7ABA4BE8CBB4}"/>
+              </a:ext>
+            </a:extLst>
+          </p:cNvPr>
+          <p:cNvGraphicFramePr>
+            <a:graphicFrameLocks noChangeAspect="1"/>
+          </p:cNvGraphicFramePr>
+          <p:nvPr>
+            <p:extLst>
+              <p:ext uri="{D42A27DB-BD31-4B8C-83A1-F6EECF244321}">
+                <p14:modId xmlns:p14="http://schemas.microsoft.com/office/powerpoint/2010/main" val="2503694216"/>
+              </p:ext>
+            </p:extLst>
+          </p:nvPr>
+        </p:nvGraphicFramePr>
+        <p:xfrm>
+          <a:off x="1066800" y="1524000"/>
+          <a:ext cx="863600" cy="546100"/>
+        </p:xfrm>
+        <a:graphic>
+          <a:graphicData uri="http://schemas.openxmlformats.org/presentationml/2006/ole">
+            <mc:AlternateContent xmlns:mc="http://schemas.openxmlformats.org/markup-compatibility/2006">
+              <mc:Choice xmlns:v="urn:schemas-microsoft-com:vml" Requires="v">
+                <p:oleObj spid="_x0000_s4099" name="Equation" r:id="rId3" imgW="863280" imgH="545760" progId="Equation.DSMT4">
+                  <p:embed/>
+                </p:oleObj>
+              </mc:Choice>
+              <mc:Fallback>
+                <p:oleObj name="Equation" r:id="rId3" imgW="863280" imgH="545760" progId="Equation.DSMT4">
+                  <p:embed/>
+                  <p:pic>
+                    <p:nvPicPr>
+                      <p:cNvPr id="0" name=""/>
+                      <p:cNvPicPr/>
+                      <p:nvPr/>
+                    </p:nvPicPr>
+                    <p:blipFill>
+                      <a:blip r:embed="rId4"/>
+                      <a:stretch>
+                        <a:fillRect/>
+                      </a:stretch>
+                    </p:blipFill>
+                    <p:spPr>
+                      <a:xfrm>
+                        <a:off x="1066800" y="1524000"/>
+                        <a:ext cx="863600" cy="546100"/>
+                      </a:xfrm>
+                      <a:prstGeom prst="rect">
+                        <a:avLst/>
+                      </a:prstGeom>
+                    </p:spPr>
+                  </p:pic>
+                </p:oleObj>
+              </mc:Fallback>
+            </mc:AlternateContent>
+          </a:graphicData>
+        </a:graphic>
+      </p:graphicFrame>
+    </p:spTree>
+    <p:extLst>
+      <p:ext uri="{BB962C8B-B14F-4D97-AF65-F5344CB8AC3E}">
+        <p14:creationId xmlns:p14="http://schemas.microsoft.com/office/powerpoint/2010/main" val="1118249007"/>
+      </p:ext>
+    </p:extLst>
+  </p:cSld>
+  <p:clrMapOvr>
+    <a:masterClrMapping/>
+  </p:clrMapOvr>
+</p:sld>
+</file>
+
+<file path=ppt/slides/slide6.xml><?xml version="1.0" encoding="utf-8"?>
+<p:sld xmlns:a="http://schemas.openxmlformats.org/drawingml/2006/main" xmlns:r="http://schemas.openxmlformats.org/officeDocument/2006/relationships" xmlns:p="http://schemas.openxmlformats.org/presentationml/2006/main">
+  <p:cSld>
+    <p:spTree>
+      <p:nvGrpSpPr>
+        <p:cNvPr id="1" name=""/>
+        <p:cNvGrpSpPr/>
+        <p:nvPr/>
+      </p:nvGrpSpPr>
+      <p:grpSpPr>
+        <a:xfrm>
+          <a:off x="0" y="0"/>
+          <a:ext cx="0" cy="0"/>
+          <a:chOff x="0" y="0"/>
+          <a:chExt cx="0" cy="0"/>
+        </a:xfrm>
+      </p:grpSpPr>
       <p:pic>
         <p:nvPicPr>
           <p:cNvPr id="5" name="Picture 4">
@@ -12092,7 +12558,7 @@
 </p:sld>
 </file>
 
-<file path=ppt/slides/slide6.xml><?xml version="1.0" encoding="utf-8"?>
+<file path=ppt/slides/slide7.xml><?xml version="1.0" encoding="utf-8"?>
 <p:sld xmlns:a="http://schemas.openxmlformats.org/drawingml/2006/main" xmlns:r="http://schemas.openxmlformats.org/officeDocument/2006/relationships" xmlns:p="http://schemas.openxmlformats.org/presentationml/2006/main">
   <p:cSld>
     <p:spTree>
@@ -12354,7 +12820,7 @@
 </p:sld>
 </file>
 
-<file path=ppt/slides/slide7.xml><?xml version="1.0" encoding="utf-8"?>
+<file path=ppt/slides/slide8.xml><?xml version="1.0" encoding="utf-8"?>
 <p:sld xmlns:a="http://schemas.openxmlformats.org/drawingml/2006/main" xmlns:r="http://schemas.openxmlformats.org/officeDocument/2006/relationships" xmlns:p="http://schemas.openxmlformats.org/presentationml/2006/main">
   <p:cSld>
     <p:spTree>
@@ -13470,7 +13936,7 @@
 </p:sld>
 </file>
 
-<file path=ppt/slides/slide8.xml><?xml version="1.0" encoding="utf-8"?>
+<file path=ppt/slides/slide9.xml><?xml version="1.0" encoding="utf-8"?>
 <p:sld xmlns:a="http://schemas.openxmlformats.org/drawingml/2006/main" xmlns:r="http://schemas.openxmlformats.org/officeDocument/2006/relationships" xmlns:p="http://schemas.openxmlformats.org/presentationml/2006/main">
   <p:cSld>
     <p:spTree>
@@ -14574,378 +15040,6 @@
     <p:extLst>
       <p:ext uri="{BB962C8B-B14F-4D97-AF65-F5344CB8AC3E}">
         <p14:creationId xmlns:p14="http://schemas.microsoft.com/office/powerpoint/2010/main" val="1077949170"/>
-      </p:ext>
-    </p:extLst>
-  </p:cSld>
-  <p:clrMapOvr>
-    <a:masterClrMapping/>
-  </p:clrMapOvr>
-</p:sld>
-</file>
-
-<file path=ppt/slides/slide9.xml><?xml version="1.0" encoding="utf-8"?>
-<p:sld xmlns:a="http://schemas.openxmlformats.org/drawingml/2006/main" xmlns:r="http://schemas.openxmlformats.org/officeDocument/2006/relationships" xmlns:p="http://schemas.openxmlformats.org/presentationml/2006/main">
-  <p:cSld>
-    <p:spTree>
-      <p:nvGrpSpPr>
-        <p:cNvPr id="1" name=""/>
-        <p:cNvGrpSpPr/>
-        <p:nvPr/>
-      </p:nvGrpSpPr>
-      <p:grpSpPr>
-        <a:xfrm>
-          <a:off x="0" y="0"/>
-          <a:ext cx="0" cy="0"/>
-          <a:chOff x="0" y="0"/>
-          <a:chExt cx="0" cy="0"/>
-        </a:xfrm>
-      </p:grpSpPr>
-      <p:sp>
-        <p:nvSpPr>
-          <p:cNvPr id="9" name="Title 8"/>
-          <p:cNvSpPr>
-            <a:spLocks noGrp="1"/>
-          </p:cNvSpPr>
-          <p:nvPr>
-            <p:ph type="title"/>
-          </p:nvPr>
-        </p:nvSpPr>
-        <p:spPr/>
-        <p:txBody>
-          <a:bodyPr/>
-          <a:lstStyle/>
-          <a:p>
-            <a:endParaRPr lang="en-US"/>
-          </a:p>
-        </p:txBody>
-      </p:sp>
-      <mc:AlternateContent xmlns:mc="http://schemas.openxmlformats.org/markup-compatibility/2006" xmlns:a14="http://schemas.microsoft.com/office/drawing/2010/main">
-        <mc:Choice Requires="a14">
-          <p:sp>
-            <p:nvSpPr>
-              <p:cNvPr id="6" name="Content Placeholder 5"/>
-              <p:cNvSpPr>
-                <a:spLocks noGrp="1"/>
-              </p:cNvSpPr>
-              <p:nvPr>
-                <p:ph idx="1"/>
-              </p:nvPr>
-            </p:nvSpPr>
-            <p:spPr/>
-            <p:txBody>
-              <a:bodyPr/>
-              <a:lstStyle/>
-              <a:p>
-                <a14:m>
-                  <m:oMath xmlns:m="http://schemas.openxmlformats.org/officeDocument/2006/math">
-                    <m:r>
-                      <a:rPr lang="en-US" b="0" i="1" smtClean="0">
-                        <a:latin typeface="Cambria Math"/>
-                      </a:rPr>
-                      <m:t>𝐸𝑅𝑉</m:t>
-                    </m:r>
-                    <m:r>
-                      <a:rPr lang="en-US" b="0" i="1" smtClean="0">
-                        <a:latin typeface="Cambria Math"/>
-                      </a:rPr>
-                      <m:t>=</m:t>
-                    </m:r>
-                    <m:r>
-                      <a:rPr lang="en-US" b="0" i="1" smtClean="0">
-                        <a:latin typeface="Cambria Math"/>
-                      </a:rPr>
-                      <m:t>𝐹𝑅𝐶</m:t>
-                    </m:r>
-                    <m:r>
-                      <a:rPr lang="en-US" b="0" i="1" smtClean="0">
-                        <a:latin typeface="Cambria Math"/>
-                      </a:rPr>
-                      <m:t>−</m:t>
-                    </m:r>
-                    <m:r>
-                      <a:rPr lang="en-US" b="0" i="1" smtClean="0">
-                        <a:latin typeface="Cambria Math"/>
-                      </a:rPr>
-                      <m:t>𝑅𝑉</m:t>
-                    </m:r>
-                  </m:oMath>
-                </a14:m>
-                <a:endParaRPr lang="en-US" b="0" dirty="0"/>
-              </a:p>
-              <a:p>
-                <a14:m>
-                  <m:oMath xmlns:m="http://schemas.openxmlformats.org/officeDocument/2006/math">
-                    <m:sSub>
-                      <m:sSubPr>
-                        <m:ctrlPr>
-                          <a:rPr lang="en-US" i="1">
-                            <a:latin typeface="Cambria Math" panose="02040503050406030204" pitchFamily="18" charset="0"/>
-                          </a:rPr>
-                        </m:ctrlPr>
-                      </m:sSubPr>
-                      <m:e>
-                        <m:r>
-                          <a:rPr lang="en-US" i="1">
-                            <a:latin typeface="Cambria Math"/>
-                          </a:rPr>
-                          <m:t>𝑄</m:t>
-                        </m:r>
-                      </m:e>
-                      <m:sub>
-                        <m:r>
-                          <a:rPr lang="en-US" i="1">
-                            <a:latin typeface="Cambria Math"/>
-                          </a:rPr>
-                          <m:t>𝑡𝑟𝑎𝑐h𝑒𝑎</m:t>
-                        </m:r>
-                      </m:sub>
-                    </m:sSub>
-                    <m:r>
-                      <a:rPr lang="en-US" i="1">
-                        <a:latin typeface="Cambria Math"/>
-                      </a:rPr>
-                      <m:t>=</m:t>
-                    </m:r>
-                    <m:f>
-                      <m:fPr>
-                        <m:ctrlPr>
-                          <a:rPr lang="en-US" i="1">
-                            <a:latin typeface="Cambria Math" panose="02040503050406030204" pitchFamily="18" charset="0"/>
-                          </a:rPr>
-                        </m:ctrlPr>
-                      </m:fPr>
-                      <m:num>
-                        <m:sSub>
-                          <m:sSubPr>
-                            <m:ctrlPr>
-                              <a:rPr lang="en-US" i="1">
-                                <a:latin typeface="Cambria Math" panose="02040503050406030204" pitchFamily="18" charset="0"/>
-                              </a:rPr>
-                            </m:ctrlPr>
-                          </m:sSubPr>
-                          <m:e>
-                            <m:r>
-                              <a:rPr lang="en-US" i="1">
-                                <a:latin typeface="Cambria Math"/>
-                              </a:rPr>
-                              <m:t>𝑃</m:t>
-                            </m:r>
-                          </m:e>
-                          <m:sub>
-                            <m:r>
-                              <a:rPr lang="en-US" i="1">
-                                <a:latin typeface="Cambria Math"/>
-                              </a:rPr>
-                              <m:t>𝑎𝑖𝑟𝑤𝑎𝑦</m:t>
-                            </m:r>
-                          </m:sub>
-                        </m:sSub>
-                        <m:r>
-                          <a:rPr lang="en-US" i="1">
-                            <a:latin typeface="Cambria Math"/>
-                          </a:rPr>
-                          <m:t>−</m:t>
-                        </m:r>
-                        <m:sSub>
-                          <m:sSubPr>
-                            <m:ctrlPr>
-                              <a:rPr lang="en-US" i="1">
-                                <a:latin typeface="Cambria Math" panose="02040503050406030204" pitchFamily="18" charset="0"/>
-                              </a:rPr>
-                            </m:ctrlPr>
-                          </m:sSubPr>
-                          <m:e>
-                            <m:r>
-                              <a:rPr lang="en-US" i="1">
-                                <a:latin typeface="Cambria Math"/>
-                              </a:rPr>
-                              <m:t>𝑃</m:t>
-                            </m:r>
-                          </m:e>
-                          <m:sub>
-                            <m:r>
-                              <a:rPr lang="en-US" i="1">
-                                <a:latin typeface="Cambria Math"/>
-                              </a:rPr>
-                              <m:t>𝑐𝑎𝑟𝑖𝑛𝑎</m:t>
-                            </m:r>
-                          </m:sub>
-                        </m:sSub>
-                      </m:num>
-                      <m:den>
-                        <m:sSub>
-                          <m:sSubPr>
-                            <m:ctrlPr>
-                              <a:rPr lang="en-US" i="1">
-                                <a:latin typeface="Cambria Math" panose="02040503050406030204" pitchFamily="18" charset="0"/>
-                              </a:rPr>
-                            </m:ctrlPr>
-                          </m:sSubPr>
-                          <m:e>
-                            <m:r>
-                              <a:rPr lang="en-US" i="1">
-                                <a:latin typeface="Cambria Math"/>
-                              </a:rPr>
-                              <m:t>𝑅</m:t>
-                            </m:r>
-                          </m:e>
-                          <m:sub>
-                            <m:r>
-                              <a:rPr lang="en-US" i="1">
-                                <a:latin typeface="Cambria Math"/>
-                              </a:rPr>
-                              <m:t>𝑡𝑟𝑎𝑐h𝑒𝑎</m:t>
-                            </m:r>
-                          </m:sub>
-                        </m:sSub>
-                      </m:den>
-                    </m:f>
-                  </m:oMath>
-                </a14:m>
-                <a:endParaRPr lang="en-US" b="0" dirty="0"/>
-              </a:p>
-              <a:p>
-                <a14:m>
-                  <m:oMath xmlns:m="http://schemas.openxmlformats.org/officeDocument/2006/math">
-                    <m:sSub>
-                      <m:sSubPr>
-                        <m:ctrlPr>
-                          <a:rPr lang="en-US" i="1">
-                            <a:latin typeface="Cambria Math" panose="02040503050406030204" pitchFamily="18" charset="0"/>
-                          </a:rPr>
-                        </m:ctrlPr>
-                      </m:sSubPr>
-                      <m:e>
-                        <m:r>
-                          <a:rPr lang="en-US" i="1">
-                            <a:latin typeface="Cambria Math"/>
-                          </a:rPr>
-                          <m:t>𝑃</m:t>
-                        </m:r>
-                      </m:e>
-                      <m:sub>
-                        <m:r>
-                          <a:rPr lang="en-US" i="1">
-                            <a:latin typeface="Cambria Math"/>
-                          </a:rPr>
-                          <m:t>𝑔𝑎𝑠</m:t>
-                        </m:r>
-                      </m:sub>
-                    </m:sSub>
-                    <m:r>
-                      <a:rPr lang="en-US" i="1">
-                        <a:latin typeface="Cambria Math"/>
-                      </a:rPr>
-                      <m:t>=</m:t>
-                    </m:r>
-                    <m:sSub>
-                      <m:sSubPr>
-                        <m:ctrlPr>
-                          <a:rPr lang="en-US" i="1">
-                            <a:latin typeface="Cambria Math" panose="02040503050406030204" pitchFamily="18" charset="0"/>
-                          </a:rPr>
-                        </m:ctrlPr>
-                      </m:sSubPr>
-                      <m:e>
-                        <m:r>
-                          <a:rPr lang="en-US" i="1">
-                            <a:latin typeface="Cambria Math"/>
-                          </a:rPr>
-                          <m:t>𝐹</m:t>
-                        </m:r>
-                      </m:e>
-                      <m:sub>
-                        <m:r>
-                          <a:rPr lang="en-US" i="1">
-                            <a:latin typeface="Cambria Math"/>
-                          </a:rPr>
-                          <m:t>𝑔𝑎𝑠</m:t>
-                        </m:r>
-                      </m:sub>
-                    </m:sSub>
-                    <m:r>
-                      <a:rPr lang="en-US" i="1">
-                        <a:latin typeface="Cambria Math"/>
-                        <a:ea typeface="Cambria Math"/>
-                      </a:rPr>
-                      <m:t>×</m:t>
-                    </m:r>
-                    <m:sSub>
-                      <m:sSubPr>
-                        <m:ctrlPr>
-                          <a:rPr lang="en-US" i="1">
-                            <a:latin typeface="Cambria Math" panose="02040503050406030204" pitchFamily="18" charset="0"/>
-                            <a:ea typeface="Cambria Math"/>
-                          </a:rPr>
-                        </m:ctrlPr>
-                      </m:sSubPr>
-                      <m:e>
-                        <m:r>
-                          <a:rPr lang="en-US" i="1">
-                            <a:latin typeface="Cambria Math"/>
-                            <a:ea typeface="Cambria Math"/>
-                          </a:rPr>
-                          <m:t>𝑃</m:t>
-                        </m:r>
-                      </m:e>
-                      <m:sub>
-                        <m:r>
-                          <a:rPr lang="en-US" i="1">
-                            <a:latin typeface="Cambria Math"/>
-                            <a:ea typeface="Cambria Math"/>
-                          </a:rPr>
-                          <m:t>𝑡𝑜𝑡𝑎𝑙</m:t>
-                        </m:r>
-                      </m:sub>
-                    </m:sSub>
-                  </m:oMath>
-                </a14:m>
-                <a:endParaRPr lang="en-US" b="0" dirty="0"/>
-              </a:p>
-              <a:p>
-                <a:endParaRPr lang="en-US" dirty="0"/>
-              </a:p>
-            </p:txBody>
-          </p:sp>
-        </mc:Choice>
-        <mc:Fallback xmlns="">
-          <p:sp>
-            <p:nvSpPr>
-              <p:cNvPr id="6" name="Content Placeholder 5"/>
-              <p:cNvSpPr>
-                <a:spLocks noGrp="1" noRot="1" noChangeAspect="1" noMove="1" noResize="1" noEditPoints="1" noAdjustHandles="1" noChangeArrowheads="1" noChangeShapeType="1" noTextEdit="1"/>
-              </p:cNvSpPr>
-              <p:nvPr>
-                <p:ph idx="1"/>
-              </p:nvPr>
-            </p:nvSpPr>
-            <p:spPr>
-              <a:blipFill rotWithShape="1">
-                <a:blip r:embed="rId2"/>
-                <a:stretch>
-                  <a:fillRect/>
-                </a:stretch>
-              </a:blipFill>
-            </p:spPr>
-            <p:txBody>
-              <a:bodyPr/>
-              <a:lstStyle/>
-              <a:p>
-                <a:r>
-                  <a:rPr lang="en-US">
-                    <a:noFill/>
-                  </a:rPr>
-                  <a:t> </a:t>
-                </a:r>
-              </a:p>
-            </p:txBody>
-          </p:sp>
-        </mc:Fallback>
-      </mc:AlternateContent>
-    </p:spTree>
-    <p:extLst>
-      <p:ext uri="{BB962C8B-B14F-4D97-AF65-F5344CB8AC3E}">
-        <p14:creationId xmlns:p14="http://schemas.microsoft.com/office/powerpoint/2010/main" val="3172890189"/>
       </p:ext>
     </p:extLst>
   </p:cSld>

</xml_diff>

<commit_message>
Changed respiratory driver waveform similar to the equation previously used for smoother transitions. Updated documentation.
</commit_message>
<xml_diff>
--- a/docs/Figures/RespiratoryWorking.pptx
+++ b/docs/Figures/RespiratoryWorking.pptx
@@ -225,7 +225,7 @@
           <a:p>
             <a:fld id="{7B126BB8-5932-4ACC-8CD5-328D9DA138C9}" type="datetimeFigureOut">
               <a:rPr lang="en-US" smtClean="0"/>
-              <a:t>2/12/2020</a:t>
+              <a:t>3/12/2020</a:t>
             </a:fld>
             <a:endParaRPr lang="en-US"/>
           </a:p>
@@ -671,7 +671,7 @@
           <a:p>
             <a:fld id="{9E9AFD63-10BD-4598-9E1E-9FFECB76D2D7}" type="datetimeFigureOut">
               <a:rPr lang="en-US" smtClean="0"/>
-              <a:t>2/12/2020</a:t>
+              <a:t>3/12/2020</a:t>
             </a:fld>
             <a:endParaRPr lang="en-US"/>
           </a:p>
@@ -839,7 +839,7 @@
           <a:p>
             <a:fld id="{9E9AFD63-10BD-4598-9E1E-9FFECB76D2D7}" type="datetimeFigureOut">
               <a:rPr lang="en-US" smtClean="0"/>
-              <a:t>2/12/2020</a:t>
+              <a:t>3/12/2020</a:t>
             </a:fld>
             <a:endParaRPr lang="en-US"/>
           </a:p>
@@ -1017,7 +1017,7 @@
           <a:p>
             <a:fld id="{9E9AFD63-10BD-4598-9E1E-9FFECB76D2D7}" type="datetimeFigureOut">
               <a:rPr lang="en-US" smtClean="0"/>
-              <a:t>2/12/2020</a:t>
+              <a:t>3/12/2020</a:t>
             </a:fld>
             <a:endParaRPr lang="en-US"/>
           </a:p>
@@ -2772,7 +2772,7 @@
           <a:p>
             <a:fld id="{9E9AFD63-10BD-4598-9E1E-9FFECB76D2D7}" type="datetimeFigureOut">
               <a:rPr lang="en-US" smtClean="0"/>
-              <a:t>2/12/2020</a:t>
+              <a:t>3/12/2020</a:t>
             </a:fld>
             <a:endParaRPr lang="en-US"/>
           </a:p>
@@ -3216,7 +3216,7 @@
           <a:p>
             <a:fld id="{9E9AFD63-10BD-4598-9E1E-9FFECB76D2D7}" type="datetimeFigureOut">
               <a:rPr lang="en-US" smtClean="0"/>
-              <a:t>2/12/2020</a:t>
+              <a:t>3/12/2020</a:t>
             </a:fld>
             <a:endParaRPr lang="en-US"/>
           </a:p>
@@ -3501,7 +3501,7 @@
           <a:p>
             <a:fld id="{9E9AFD63-10BD-4598-9E1E-9FFECB76D2D7}" type="datetimeFigureOut">
               <a:rPr lang="en-US" smtClean="0"/>
-              <a:t>2/12/2020</a:t>
+              <a:t>3/12/2020</a:t>
             </a:fld>
             <a:endParaRPr lang="en-US"/>
           </a:p>
@@ -3920,7 +3920,7 @@
           <a:p>
             <a:fld id="{9E9AFD63-10BD-4598-9E1E-9FFECB76D2D7}" type="datetimeFigureOut">
               <a:rPr lang="en-US" smtClean="0"/>
-              <a:t>2/12/2020</a:t>
+              <a:t>3/12/2020</a:t>
             </a:fld>
             <a:endParaRPr lang="en-US"/>
           </a:p>
@@ -4037,7 +4037,7 @@
           <a:p>
             <a:fld id="{9E9AFD63-10BD-4598-9E1E-9FFECB76D2D7}" type="datetimeFigureOut">
               <a:rPr lang="en-US" smtClean="0"/>
-              <a:t>2/12/2020</a:t>
+              <a:t>3/12/2020</a:t>
             </a:fld>
             <a:endParaRPr lang="en-US"/>
           </a:p>
@@ -4132,7 +4132,7 @@
           <a:p>
             <a:fld id="{9E9AFD63-10BD-4598-9E1E-9FFECB76D2D7}" type="datetimeFigureOut">
               <a:rPr lang="en-US" smtClean="0"/>
-              <a:t>2/12/2020</a:t>
+              <a:t>3/12/2020</a:t>
             </a:fld>
             <a:endParaRPr lang="en-US"/>
           </a:p>
@@ -4407,7 +4407,7 @@
           <a:p>
             <a:fld id="{9E9AFD63-10BD-4598-9E1E-9FFECB76D2D7}" type="datetimeFigureOut">
               <a:rPr lang="en-US" smtClean="0"/>
-              <a:t>2/12/2020</a:t>
+              <a:t>3/12/2020</a:t>
             </a:fld>
             <a:endParaRPr lang="en-US"/>
           </a:p>
@@ -4659,7 +4659,7 @@
           <a:p>
             <a:fld id="{9E9AFD63-10BD-4598-9E1E-9FFECB76D2D7}" type="datetimeFigureOut">
               <a:rPr lang="en-US" smtClean="0"/>
-              <a:t>2/12/2020</a:t>
+              <a:t>3/12/2020</a:t>
             </a:fld>
             <a:endParaRPr lang="en-US"/>
           </a:p>
@@ -4870,7 +4870,7 @@
           <a:p>
             <a:fld id="{9E9AFD63-10BD-4598-9E1E-9FFECB76D2D7}" type="datetimeFigureOut">
               <a:rPr lang="en-US" smtClean="0"/>
-              <a:t>2/12/2020</a:t>
+              <a:t>3/12/2020</a:t>
             </a:fld>
             <a:endParaRPr lang="en-US"/>
           </a:p>
@@ -10175,7 +10175,7 @@
           <a:graphicData uri="http://schemas.openxmlformats.org/presentationml/2006/ole">
             <mc:AlternateContent xmlns:mc="http://schemas.openxmlformats.org/markup-compatibility/2006">
               <mc:Choice xmlns:v="urn:schemas-microsoft-com:vml" Requires="v">
-                <p:oleObj spid="_x0000_s2158" name="Equation" r:id="rId4" imgW="914400" imgH="198720" progId="Equation.DSMT4">
+                <p:oleObj spid="_x0000_s2162" name="Equation" r:id="rId4" imgW="914400" imgH="198720" progId="Equation.DSMT4">
                   <p:embed/>
                 </p:oleObj>
               </mc:Choice>
@@ -10238,7 +10238,7 @@
           <a:graphicData uri="http://schemas.openxmlformats.org/presentationml/2006/ole">
             <mc:AlternateContent xmlns:mc="http://schemas.openxmlformats.org/markup-compatibility/2006">
               <mc:Choice xmlns:v="urn:schemas-microsoft-com:vml" Requires="v">
-                <p:oleObj spid="_x0000_s2159" name="Equation" r:id="rId6" imgW="114120" imgH="177480" progId="Equation.DSMT4">
+                <p:oleObj spid="_x0000_s2163" name="Equation" r:id="rId6" imgW="114120" imgH="177480" progId="Equation.DSMT4">
                   <p:embed/>
                 </p:oleObj>
               </mc:Choice>
@@ -11513,25 +11513,25 @@
           <p:nvPr>
             <p:extLst>
               <p:ext uri="{D42A27DB-BD31-4B8C-83A1-F6EECF244321}">
-                <p14:modId xmlns:p14="http://schemas.microsoft.com/office/powerpoint/2010/main" val="1531156437"/>
+                <p14:modId xmlns:p14="http://schemas.microsoft.com/office/powerpoint/2010/main" val="541268050"/>
               </p:ext>
             </p:extLst>
           </p:nvPr>
         </p:nvGraphicFramePr>
         <p:xfrm>
-          <a:off x="1295400" y="711200"/>
-          <a:ext cx="2413000" cy="3035300"/>
+          <a:off x="533400" y="533400"/>
+          <a:ext cx="2413000" cy="5334000"/>
         </p:xfrm>
         <a:graphic>
           <a:graphicData uri="http://schemas.openxmlformats.org/presentationml/2006/ole">
             <mc:AlternateContent xmlns:mc="http://schemas.openxmlformats.org/markup-compatibility/2006">
               <mc:Choice xmlns:v="urn:schemas-microsoft-com:vml" Requires="v">
-                <p:oleObj spid="_x0000_s1123" name="Equation" r:id="rId3" imgW="2412720" imgH="3035160" progId="Equation.DSMT4">
+                <p:oleObj spid="_x0000_s1133" name="Equation" r:id="rId3" imgW="2412720" imgH="5333760" progId="Equation.DSMT4">
                   <p:embed/>
                 </p:oleObj>
               </mc:Choice>
               <mc:Fallback>
-                <p:oleObj name="Equation" r:id="rId3" imgW="2412720" imgH="3035160" progId="Equation.DSMT4">
+                <p:oleObj name="Equation" r:id="rId3" imgW="2412720" imgH="5333760" progId="Equation.DSMT4">
                   <p:embed/>
                   <p:pic>
                     <p:nvPicPr>
@@ -11547,8 +11547,8 @@
                     </p:blipFill>
                     <p:spPr>
                       <a:xfrm>
-                        <a:off x="1295400" y="711200"/>
-                        <a:ext cx="2413000" cy="3035300"/>
+                        <a:off x="533400" y="533400"/>
+                        <a:ext cx="2413000" cy="5334000"/>
                       </a:xfrm>
                       <a:prstGeom prst="rect">
                         <a:avLst/>
@@ -11589,7 +11589,7 @@
           <a:graphicData uri="http://schemas.openxmlformats.org/presentationml/2006/ole">
             <mc:AlternateContent xmlns:mc="http://schemas.openxmlformats.org/markup-compatibility/2006">
               <mc:Choice xmlns:v="urn:schemas-microsoft-com:vml" Requires="v">
-                <p:oleObj spid="_x0000_s1124" name="Equation" r:id="rId5" imgW="2095200" imgH="1066680" progId="Equation.DSMT4">
+                <p:oleObj spid="_x0000_s1134" name="Equation" r:id="rId5" imgW="2095200" imgH="1066680" progId="Equation.DSMT4">
                   <p:embed/>
                 </p:oleObj>
               </mc:Choice>
@@ -12357,7 +12357,7 @@
           <a:graphicData uri="http://schemas.openxmlformats.org/presentationml/2006/ole">
             <mc:AlternateContent xmlns:mc="http://schemas.openxmlformats.org/markup-compatibility/2006">
               <mc:Choice xmlns:v="urn:schemas-microsoft-com:vml" Requires="v">
-                <p:oleObj spid="_x0000_s3107" name="Equation" r:id="rId3" imgW="1765080" imgH="4978080" progId="Equation.DSMT4">
+                <p:oleObj spid="_x0000_s3109" name="Equation" r:id="rId3" imgW="1765080" imgH="4978080" progId="Equation.DSMT4">
                   <p:embed/>
                 </p:oleObj>
               </mc:Choice>
@@ -12450,7 +12450,7 @@
           <a:graphicData uri="http://schemas.openxmlformats.org/presentationml/2006/ole">
             <mc:AlternateContent xmlns:mc="http://schemas.openxmlformats.org/markup-compatibility/2006">
               <mc:Choice xmlns:v="urn:schemas-microsoft-com:vml" Requires="v">
-                <p:oleObj spid="_x0000_s4099" name="Equation" r:id="rId3" imgW="863280" imgH="545760" progId="Equation.DSMT4">
+                <p:oleObj spid="_x0000_s4101" name="Equation" r:id="rId3" imgW="863280" imgH="545760" progId="Equation.DSMT4">
                   <p:embed/>
                 </p:oleObj>
               </mc:Choice>

</xml_diff>

<commit_message>
Updated documentation to reflect respiratory changes and new mechanical ventilator validation.
</commit_message>
<xml_diff>
--- a/docs/Figures/RespiratoryWorking.pptx
+++ b/docs/Figures/RespiratoryWorking.pptx
@@ -9,8 +9,8 @@
     <p:notesMasterId r:id="rId20"/>
   </p:notesMasterIdLst>
   <p:sldIdLst>
-    <p:sldId id="283" r:id="rId3"/>
-    <p:sldId id="290" r:id="rId4"/>
+    <p:sldId id="290" r:id="rId3"/>
+    <p:sldId id="296" r:id="rId4"/>
     <p:sldId id="291" r:id="rId5"/>
     <p:sldId id="292" r:id="rId6"/>
     <p:sldId id="295" r:id="rId7"/>
@@ -225,7 +225,7 @@
           <a:p>
             <a:fld id="{7B126BB8-5932-4ACC-8CD5-328D9DA138C9}" type="datetimeFigureOut">
               <a:rPr lang="en-US" smtClean="0"/>
-              <a:t>6/11/2020</a:t>
+              <a:t>1/25/2021</a:t>
             </a:fld>
             <a:endParaRPr lang="en-US"/>
           </a:p>
@@ -755,7 +755,7 @@
           <a:p>
             <a:fld id="{9E9AFD63-10BD-4598-9E1E-9FFECB76D2D7}" type="datetimeFigureOut">
               <a:rPr lang="en-US" smtClean="0"/>
-              <a:t>6/11/2020</a:t>
+              <a:t>1/25/2021</a:t>
             </a:fld>
             <a:endParaRPr lang="en-US"/>
           </a:p>
@@ -923,7 +923,7 @@
           <a:p>
             <a:fld id="{9E9AFD63-10BD-4598-9E1E-9FFECB76D2D7}" type="datetimeFigureOut">
               <a:rPr lang="en-US" smtClean="0"/>
-              <a:t>6/11/2020</a:t>
+              <a:t>1/25/2021</a:t>
             </a:fld>
             <a:endParaRPr lang="en-US"/>
           </a:p>
@@ -1101,7 +1101,7 @@
           <a:p>
             <a:fld id="{9E9AFD63-10BD-4598-9E1E-9FFECB76D2D7}" type="datetimeFigureOut">
               <a:rPr lang="en-US" smtClean="0"/>
-              <a:t>6/11/2020</a:t>
+              <a:t>1/25/2021</a:t>
             </a:fld>
             <a:endParaRPr lang="en-US"/>
           </a:p>
@@ -2856,7 +2856,7 @@
           <a:p>
             <a:fld id="{9E9AFD63-10BD-4598-9E1E-9FFECB76D2D7}" type="datetimeFigureOut">
               <a:rPr lang="en-US" smtClean="0"/>
-              <a:t>6/11/2020</a:t>
+              <a:t>1/25/2021</a:t>
             </a:fld>
             <a:endParaRPr lang="en-US"/>
           </a:p>
@@ -3300,7 +3300,7 @@
           <a:p>
             <a:fld id="{9E9AFD63-10BD-4598-9E1E-9FFECB76D2D7}" type="datetimeFigureOut">
               <a:rPr lang="en-US" smtClean="0"/>
-              <a:t>6/11/2020</a:t>
+              <a:t>1/25/2021</a:t>
             </a:fld>
             <a:endParaRPr lang="en-US"/>
           </a:p>
@@ -3585,7 +3585,7 @@
           <a:p>
             <a:fld id="{9E9AFD63-10BD-4598-9E1E-9FFECB76D2D7}" type="datetimeFigureOut">
               <a:rPr lang="en-US" smtClean="0"/>
-              <a:t>6/11/2020</a:t>
+              <a:t>1/25/2021</a:t>
             </a:fld>
             <a:endParaRPr lang="en-US"/>
           </a:p>
@@ -4004,7 +4004,7 @@
           <a:p>
             <a:fld id="{9E9AFD63-10BD-4598-9E1E-9FFECB76D2D7}" type="datetimeFigureOut">
               <a:rPr lang="en-US" smtClean="0"/>
-              <a:t>6/11/2020</a:t>
+              <a:t>1/25/2021</a:t>
             </a:fld>
             <a:endParaRPr lang="en-US"/>
           </a:p>
@@ -4121,7 +4121,7 @@
           <a:p>
             <a:fld id="{9E9AFD63-10BD-4598-9E1E-9FFECB76D2D7}" type="datetimeFigureOut">
               <a:rPr lang="en-US" smtClean="0"/>
-              <a:t>6/11/2020</a:t>
+              <a:t>1/25/2021</a:t>
             </a:fld>
             <a:endParaRPr lang="en-US"/>
           </a:p>
@@ -4216,7 +4216,7 @@
           <a:p>
             <a:fld id="{9E9AFD63-10BD-4598-9E1E-9FFECB76D2D7}" type="datetimeFigureOut">
               <a:rPr lang="en-US" smtClean="0"/>
-              <a:t>6/11/2020</a:t>
+              <a:t>1/25/2021</a:t>
             </a:fld>
             <a:endParaRPr lang="en-US"/>
           </a:p>
@@ -4491,7 +4491,7 @@
           <a:p>
             <a:fld id="{9E9AFD63-10BD-4598-9E1E-9FFECB76D2D7}" type="datetimeFigureOut">
               <a:rPr lang="en-US" smtClean="0"/>
-              <a:t>6/11/2020</a:t>
+              <a:t>1/25/2021</a:t>
             </a:fld>
             <a:endParaRPr lang="en-US"/>
           </a:p>
@@ -4743,7 +4743,7 @@
           <a:p>
             <a:fld id="{9E9AFD63-10BD-4598-9E1E-9FFECB76D2D7}" type="datetimeFigureOut">
               <a:rPr lang="en-US" smtClean="0"/>
-              <a:t>6/11/2020</a:t>
+              <a:t>1/25/2021</a:t>
             </a:fld>
             <a:endParaRPr lang="en-US"/>
           </a:p>
@@ -4954,7 +4954,7 @@
           <a:p>
             <a:fld id="{9E9AFD63-10BD-4598-9E1E-9FFECB76D2D7}" type="datetimeFigureOut">
               <a:rPr lang="en-US" smtClean="0"/>
-              <a:t>6/11/2020</a:t>
+              <a:t>1/25/2021</a:t>
             </a:fld>
             <a:endParaRPr lang="en-US"/>
           </a:p>
@@ -6112,1170 +6112,136 @@
           <a:chExt cx="0" cy="0"/>
         </a:xfrm>
       </p:grpSpPr>
-      <p:pic>
-        <p:nvPicPr>
-          <p:cNvPr id="2" name="Picture 1">
+      <p:graphicFrame>
+        <p:nvGraphicFramePr>
+          <p:cNvPr id="2" name="Object 1">
             <a:extLst>
               <a:ext uri="{FF2B5EF4-FFF2-40B4-BE49-F238E27FC236}">
-                <a16:creationId xmlns:a16="http://schemas.microsoft.com/office/drawing/2014/main" id="{9DC41067-4243-4BFF-9B59-5B297055060F}"/>
+                <a16:creationId xmlns:a16="http://schemas.microsoft.com/office/drawing/2014/main" id="{92521731-B8E9-467F-A4A9-71E892442E42}"/>
               </a:ext>
             </a:extLst>
           </p:cNvPr>
-          <p:cNvPicPr>
-            <a:picLocks noChangeAspect="1"/>
-          </p:cNvPicPr>
-          <p:nvPr/>
-        </p:nvPicPr>
-        <p:blipFill rotWithShape="1">
-          <a:blip r:embed="rId2"/>
-          <a:srcRect l="698" t="2935" r="2074" b="3690"/>
-          <a:stretch/>
-        </p:blipFill>
-        <p:spPr>
-          <a:xfrm>
-            <a:off x="990599" y="2209800"/>
-            <a:ext cx="6934201" cy="3238782"/>
-          </a:xfrm>
-          <a:prstGeom prst="rect">
-            <a:avLst/>
-          </a:prstGeom>
-        </p:spPr>
-      </p:pic>
-      <p:cxnSp>
-        <p:nvCxnSpPr>
-          <p:cNvPr id="14" name="Straight Connector 13">
+          <p:cNvGraphicFramePr>
+            <a:graphicFrameLocks noChangeAspect="1"/>
+          </p:cNvGraphicFramePr>
+          <p:nvPr>
+            <p:extLst>
+              <p:ext uri="{D42A27DB-BD31-4B8C-83A1-F6EECF244321}">
+                <p14:modId xmlns:p14="http://schemas.microsoft.com/office/powerpoint/2010/main" val="2355538284"/>
+              </p:ext>
+            </p:extLst>
+          </p:nvPr>
+        </p:nvGraphicFramePr>
+        <p:xfrm>
+          <a:off x="673100" y="2743200"/>
+          <a:ext cx="2133600" cy="914400"/>
+        </p:xfrm>
+        <a:graphic>
+          <a:graphicData uri="http://schemas.openxmlformats.org/presentationml/2006/ole">
+            <mc:AlternateContent xmlns:mc="http://schemas.openxmlformats.org/markup-compatibility/2006">
+              <mc:Choice xmlns:v="urn:schemas-microsoft-com:vml" Requires="v">
+                <p:oleObj name="Equation" r:id="rId2" imgW="2133360" imgH="914400" progId="Equation.DSMT4">
+                  <p:embed/>
+                </p:oleObj>
+              </mc:Choice>
+              <mc:Fallback>
+                <p:oleObj name="Equation" r:id="rId2" imgW="2133360" imgH="914400" progId="Equation.DSMT4">
+                  <p:embed/>
+                  <p:pic>
+                    <p:nvPicPr>
+                      <p:cNvPr id="0" name=""/>
+                      <p:cNvPicPr/>
+                      <p:nvPr/>
+                    </p:nvPicPr>
+                    <p:blipFill>
+                      <a:blip r:embed="rId3"/>
+                      <a:stretch>
+                        <a:fillRect/>
+                      </a:stretch>
+                    </p:blipFill>
+                    <p:spPr>
+                      <a:xfrm>
+                        <a:off x="673100" y="2743200"/>
+                        <a:ext cx="2133600" cy="914400"/>
+                      </a:xfrm>
+                      <a:prstGeom prst="rect">
+                        <a:avLst/>
+                      </a:prstGeom>
+                    </p:spPr>
+                  </p:pic>
+                </p:oleObj>
+              </mc:Fallback>
+            </mc:AlternateContent>
+          </a:graphicData>
+        </a:graphic>
+      </p:graphicFrame>
+      <p:graphicFrame>
+        <p:nvGraphicFramePr>
+          <p:cNvPr id="3" name="Object 2">
             <a:extLst>
               <a:ext uri="{FF2B5EF4-FFF2-40B4-BE49-F238E27FC236}">
-                <a16:creationId xmlns:a16="http://schemas.microsoft.com/office/drawing/2014/main" id="{C884A82B-61CB-4388-8FD3-87AA5CEE50F4}"/>
+                <a16:creationId xmlns:a16="http://schemas.microsoft.com/office/drawing/2014/main" id="{ED4622BF-0D97-44B3-8AAD-D9747F3BD857}"/>
               </a:ext>
             </a:extLst>
           </p:cNvPr>
-          <p:cNvCxnSpPr>
-            <a:cxnSpLocks/>
-          </p:cNvCxnSpPr>
-          <p:nvPr/>
-        </p:nvCxnSpPr>
-        <p:spPr>
-          <a:xfrm>
-            <a:off x="1447800" y="3889663"/>
-            <a:ext cx="6350000" cy="0"/>
-          </a:xfrm>
-          <a:prstGeom prst="line">
-            <a:avLst/>
-          </a:prstGeom>
-          <a:ln w="12700">
-            <a:solidFill>
-              <a:schemeClr val="tx1"/>
-            </a:solidFill>
-            <a:tailEnd type="triangle"/>
-          </a:ln>
-        </p:spPr>
-        <p:style>
-          <a:lnRef idx="1">
-            <a:schemeClr val="accent1"/>
-          </a:lnRef>
-          <a:fillRef idx="0">
-            <a:schemeClr val="accent1"/>
-          </a:fillRef>
-          <a:effectRef idx="0">
-            <a:schemeClr val="accent1"/>
-          </a:effectRef>
-          <a:fontRef idx="minor">
-            <a:schemeClr val="tx1"/>
-          </a:fontRef>
-        </p:style>
-      </p:cxnSp>
-      <p:cxnSp>
-        <p:nvCxnSpPr>
-          <p:cNvPr id="16" name="Straight Connector 15">
-            <a:extLst>
-              <a:ext uri="{FF2B5EF4-FFF2-40B4-BE49-F238E27FC236}">
-                <a16:creationId xmlns:a16="http://schemas.microsoft.com/office/drawing/2014/main" id="{1A89BEE5-3308-46C6-9954-F142F3B0E5DD}"/>
-              </a:ext>
-            </a:extLst>
-          </p:cNvPr>
-          <p:cNvCxnSpPr>
-            <a:cxnSpLocks/>
-          </p:cNvCxnSpPr>
-          <p:nvPr/>
-        </p:nvCxnSpPr>
-        <p:spPr>
-          <a:xfrm flipV="1">
-            <a:off x="1447800" y="2514600"/>
-            <a:ext cx="0" cy="2844800"/>
-          </a:xfrm>
-          <a:prstGeom prst="line">
-            <a:avLst/>
-          </a:prstGeom>
-          <a:ln w="12700">
-            <a:solidFill>
-              <a:schemeClr val="tx1"/>
-            </a:solidFill>
-            <a:headEnd type="none"/>
-            <a:tailEnd type="triangle"/>
-          </a:ln>
-        </p:spPr>
-        <p:style>
-          <a:lnRef idx="1">
-            <a:schemeClr val="accent1"/>
-          </a:lnRef>
-          <a:fillRef idx="0">
-            <a:schemeClr val="accent1"/>
-          </a:fillRef>
-          <a:effectRef idx="0">
-            <a:schemeClr val="accent1"/>
-          </a:effectRef>
-          <a:fontRef idx="minor">
-            <a:schemeClr val="tx1"/>
-          </a:fontRef>
-        </p:style>
-      </p:cxnSp>
-      <p:sp>
-        <p:nvSpPr>
-          <p:cNvPr id="18" name="TextBox 17">
-            <a:extLst>
-              <a:ext uri="{FF2B5EF4-FFF2-40B4-BE49-F238E27FC236}">
-                <a16:creationId xmlns:a16="http://schemas.microsoft.com/office/drawing/2014/main" id="{85432E1A-DD03-44B5-84B2-EA4A1772BA68}"/>
-              </a:ext>
-            </a:extLst>
-          </p:cNvPr>
-          <p:cNvSpPr txBox="1"/>
-          <p:nvPr/>
-        </p:nvSpPr>
-        <p:spPr>
-          <a:xfrm>
-            <a:off x="7763629" y="3758858"/>
-            <a:ext cx="513282" cy="261610"/>
-          </a:xfrm>
-          <a:prstGeom prst="rect">
-            <a:avLst/>
-          </a:prstGeom>
-          <a:noFill/>
-        </p:spPr>
-        <p:txBody>
-          <a:bodyPr wrap="none" rtlCol="0">
-            <a:spAutoFit/>
-          </a:bodyPr>
-          <a:lstStyle/>
-          <a:p>
-            <a:pPr algn="ctr"/>
-            <a:r>
-              <a:rPr lang="en-US" sz="1100" b="1" dirty="0">
-                <a:latin typeface="Arial" panose="020B0604020202020204" pitchFamily="34" charset="0"/>
-                <a:cs typeface="Arial" panose="020B0604020202020204" pitchFamily="34" charset="0"/>
-              </a:rPr>
-              <a:t>Time</a:t>
-            </a:r>
-          </a:p>
-        </p:txBody>
-      </p:sp>
-      <p:sp>
-        <p:nvSpPr>
-          <p:cNvPr id="20" name="TextBox 19">
-            <a:extLst>
-              <a:ext uri="{FF2B5EF4-FFF2-40B4-BE49-F238E27FC236}">
-                <a16:creationId xmlns:a16="http://schemas.microsoft.com/office/drawing/2014/main" id="{786FC15C-C675-4DA2-921B-1081C8E1F247}"/>
-              </a:ext>
-            </a:extLst>
-          </p:cNvPr>
-          <p:cNvSpPr txBox="1"/>
-          <p:nvPr/>
-        </p:nvSpPr>
-        <p:spPr>
-          <a:xfrm>
-            <a:off x="1083414" y="2285782"/>
-            <a:ext cx="788999" cy="261610"/>
-          </a:xfrm>
-          <a:prstGeom prst="rect">
-            <a:avLst/>
-          </a:prstGeom>
-          <a:noFill/>
-        </p:spPr>
-        <p:txBody>
-          <a:bodyPr wrap="none" rtlCol="0">
-            <a:spAutoFit/>
-          </a:bodyPr>
-          <a:lstStyle/>
-          <a:p>
-            <a:pPr algn="ctr"/>
-            <a:r>
-              <a:rPr lang="en-US" sz="1100" b="1" dirty="0">
-                <a:latin typeface="Arial" panose="020B0604020202020204" pitchFamily="34" charset="0"/>
-                <a:cs typeface="Arial" panose="020B0604020202020204" pitchFamily="34" charset="0"/>
-              </a:rPr>
-              <a:t>Pressure</a:t>
-            </a:r>
-          </a:p>
-        </p:txBody>
-      </p:sp>
-      <p:cxnSp>
-        <p:nvCxnSpPr>
-          <p:cNvPr id="21" name="Straight Connector 20">
-            <a:extLst>
-              <a:ext uri="{FF2B5EF4-FFF2-40B4-BE49-F238E27FC236}">
-                <a16:creationId xmlns:a16="http://schemas.microsoft.com/office/drawing/2014/main" id="{C26D9FD2-329C-4107-BC51-6DBE38097D68}"/>
-              </a:ext>
-            </a:extLst>
-          </p:cNvPr>
-          <p:cNvCxnSpPr>
-            <a:cxnSpLocks/>
-          </p:cNvCxnSpPr>
-          <p:nvPr/>
-        </p:nvCxnSpPr>
-        <p:spPr>
-          <a:xfrm flipV="1">
-            <a:off x="3014135" y="2513169"/>
-            <a:ext cx="0" cy="2846231"/>
-          </a:xfrm>
-          <a:prstGeom prst="line">
-            <a:avLst/>
-          </a:prstGeom>
-          <a:ln w="19050">
-            <a:solidFill>
-              <a:schemeClr val="tx1"/>
-            </a:solidFill>
-            <a:prstDash val="dash"/>
-          </a:ln>
-        </p:spPr>
-        <p:style>
-          <a:lnRef idx="1">
-            <a:schemeClr val="accent1"/>
-          </a:lnRef>
-          <a:fillRef idx="0">
-            <a:schemeClr val="accent1"/>
-          </a:fillRef>
-          <a:effectRef idx="0">
-            <a:schemeClr val="accent1"/>
-          </a:effectRef>
-          <a:fontRef idx="minor">
-            <a:schemeClr val="tx1"/>
-          </a:fontRef>
-        </p:style>
-      </p:cxnSp>
-      <p:cxnSp>
-        <p:nvCxnSpPr>
-          <p:cNvPr id="22" name="Straight Connector 21">
-            <a:extLst>
-              <a:ext uri="{FF2B5EF4-FFF2-40B4-BE49-F238E27FC236}">
-                <a16:creationId xmlns:a16="http://schemas.microsoft.com/office/drawing/2014/main" id="{E2038584-32CC-4E30-A654-5C4DE8698E39}"/>
-              </a:ext>
-            </a:extLst>
-          </p:cNvPr>
-          <p:cNvCxnSpPr>
-            <a:cxnSpLocks/>
-          </p:cNvCxnSpPr>
-          <p:nvPr/>
-        </p:nvCxnSpPr>
-        <p:spPr>
-          <a:xfrm flipV="1">
-            <a:off x="2224524" y="2513169"/>
-            <a:ext cx="0" cy="2846231"/>
-          </a:xfrm>
-          <a:prstGeom prst="line">
-            <a:avLst/>
-          </a:prstGeom>
-          <a:ln w="19050">
-            <a:solidFill>
-              <a:schemeClr val="tx1"/>
-            </a:solidFill>
-            <a:prstDash val="dash"/>
-          </a:ln>
-        </p:spPr>
-        <p:style>
-          <a:lnRef idx="1">
-            <a:schemeClr val="accent1"/>
-          </a:lnRef>
-          <a:fillRef idx="0">
-            <a:schemeClr val="accent1"/>
-          </a:fillRef>
-          <a:effectRef idx="0">
-            <a:schemeClr val="accent1"/>
-          </a:effectRef>
-          <a:fontRef idx="minor">
-            <a:schemeClr val="tx1"/>
-          </a:fontRef>
-        </p:style>
-      </p:cxnSp>
-      <p:cxnSp>
-        <p:nvCxnSpPr>
-          <p:cNvPr id="23" name="Straight Connector 22">
-            <a:extLst>
-              <a:ext uri="{FF2B5EF4-FFF2-40B4-BE49-F238E27FC236}">
-                <a16:creationId xmlns:a16="http://schemas.microsoft.com/office/drawing/2014/main" id="{0AA3DEDC-CAA2-417B-B3E3-EBF61D45BA25}"/>
-              </a:ext>
-            </a:extLst>
-          </p:cNvPr>
-          <p:cNvCxnSpPr>
-            <a:cxnSpLocks/>
-          </p:cNvCxnSpPr>
-          <p:nvPr/>
-        </p:nvCxnSpPr>
-        <p:spPr>
-          <a:xfrm flipV="1">
-            <a:off x="4591284" y="2516714"/>
-            <a:ext cx="0" cy="2842686"/>
-          </a:xfrm>
-          <a:prstGeom prst="line">
-            <a:avLst/>
-          </a:prstGeom>
-          <a:ln w="19050">
-            <a:solidFill>
-              <a:schemeClr val="tx1"/>
-            </a:solidFill>
-            <a:prstDash val="dash"/>
-          </a:ln>
-        </p:spPr>
-        <p:style>
-          <a:lnRef idx="1">
-            <a:schemeClr val="accent1"/>
-          </a:lnRef>
-          <a:fillRef idx="0">
-            <a:schemeClr val="accent1"/>
-          </a:fillRef>
-          <a:effectRef idx="0">
-            <a:schemeClr val="accent1"/>
-          </a:effectRef>
-          <a:fontRef idx="minor">
-            <a:schemeClr val="tx1"/>
-          </a:fontRef>
-        </p:style>
-      </p:cxnSp>
-      <p:cxnSp>
-        <p:nvCxnSpPr>
-          <p:cNvPr id="24" name="Straight Connector 23">
-            <a:extLst>
-              <a:ext uri="{FF2B5EF4-FFF2-40B4-BE49-F238E27FC236}">
-                <a16:creationId xmlns:a16="http://schemas.microsoft.com/office/drawing/2014/main" id="{356AA939-8DF1-442E-BD47-4F85C8F920AD}"/>
-              </a:ext>
-            </a:extLst>
-          </p:cNvPr>
-          <p:cNvCxnSpPr>
-            <a:cxnSpLocks/>
-          </p:cNvCxnSpPr>
-          <p:nvPr/>
-        </p:nvCxnSpPr>
-        <p:spPr>
-          <a:xfrm flipV="1">
-            <a:off x="3789613" y="2513169"/>
-            <a:ext cx="0" cy="2846231"/>
-          </a:xfrm>
-          <a:prstGeom prst="line">
-            <a:avLst/>
-          </a:prstGeom>
-          <a:ln w="19050">
-            <a:solidFill>
-              <a:schemeClr val="tx1"/>
-            </a:solidFill>
-            <a:prstDash val="dash"/>
-          </a:ln>
-        </p:spPr>
-        <p:style>
-          <a:lnRef idx="1">
-            <a:schemeClr val="accent1"/>
-          </a:lnRef>
-          <a:fillRef idx="0">
-            <a:schemeClr val="accent1"/>
-          </a:fillRef>
-          <a:effectRef idx="0">
-            <a:schemeClr val="accent1"/>
-          </a:effectRef>
-          <a:fontRef idx="minor">
-            <a:schemeClr val="tx1"/>
-          </a:fontRef>
-        </p:style>
-      </p:cxnSp>
-      <p:cxnSp>
-        <p:nvCxnSpPr>
-          <p:cNvPr id="25" name="Straight Connector 24">
-            <a:extLst>
-              <a:ext uri="{FF2B5EF4-FFF2-40B4-BE49-F238E27FC236}">
-                <a16:creationId xmlns:a16="http://schemas.microsoft.com/office/drawing/2014/main" id="{7966EADD-7F1C-491B-B360-699F7D7576AE}"/>
-              </a:ext>
-            </a:extLst>
-          </p:cNvPr>
-          <p:cNvCxnSpPr>
-            <a:cxnSpLocks/>
-          </p:cNvCxnSpPr>
-          <p:nvPr/>
-        </p:nvCxnSpPr>
-        <p:spPr>
-          <a:xfrm flipV="1">
-            <a:off x="6156033" y="2513169"/>
-            <a:ext cx="0" cy="2846231"/>
-          </a:xfrm>
-          <a:prstGeom prst="line">
-            <a:avLst/>
-          </a:prstGeom>
-          <a:ln w="19050">
-            <a:solidFill>
-              <a:schemeClr val="tx1"/>
-            </a:solidFill>
-            <a:prstDash val="dash"/>
-          </a:ln>
-        </p:spPr>
-        <p:style>
-          <a:lnRef idx="1">
-            <a:schemeClr val="accent1"/>
-          </a:lnRef>
-          <a:fillRef idx="0">
-            <a:schemeClr val="accent1"/>
-          </a:fillRef>
-          <a:effectRef idx="0">
-            <a:schemeClr val="accent1"/>
-          </a:effectRef>
-          <a:fontRef idx="minor">
-            <a:schemeClr val="tx1"/>
-          </a:fontRef>
-        </p:style>
-      </p:cxnSp>
-      <p:cxnSp>
-        <p:nvCxnSpPr>
-          <p:cNvPr id="26" name="Straight Connector 25">
-            <a:extLst>
-              <a:ext uri="{FF2B5EF4-FFF2-40B4-BE49-F238E27FC236}">
-                <a16:creationId xmlns:a16="http://schemas.microsoft.com/office/drawing/2014/main" id="{4746F405-D569-4860-B1F2-80F450ADF40C}"/>
-              </a:ext>
-            </a:extLst>
-          </p:cNvPr>
-          <p:cNvCxnSpPr>
-            <a:cxnSpLocks/>
-          </p:cNvCxnSpPr>
-          <p:nvPr/>
-        </p:nvCxnSpPr>
-        <p:spPr>
-          <a:xfrm flipV="1">
-            <a:off x="5381053" y="2513169"/>
-            <a:ext cx="0" cy="2846231"/>
-          </a:xfrm>
-          <a:prstGeom prst="line">
-            <a:avLst/>
-          </a:prstGeom>
-          <a:ln w="19050">
-            <a:solidFill>
-              <a:schemeClr val="tx1"/>
-            </a:solidFill>
-            <a:prstDash val="dash"/>
-          </a:ln>
-        </p:spPr>
-        <p:style>
-          <a:lnRef idx="1">
-            <a:schemeClr val="accent1"/>
-          </a:lnRef>
-          <a:fillRef idx="0">
-            <a:schemeClr val="accent1"/>
-          </a:fillRef>
-          <a:effectRef idx="0">
-            <a:schemeClr val="accent1"/>
-          </a:effectRef>
-          <a:fontRef idx="minor">
-            <a:schemeClr val="tx1"/>
-          </a:fontRef>
-        </p:style>
-      </p:cxnSp>
-      <p:cxnSp>
-        <p:nvCxnSpPr>
-          <p:cNvPr id="27" name="Straight Connector 26">
-            <a:extLst>
-              <a:ext uri="{FF2B5EF4-FFF2-40B4-BE49-F238E27FC236}">
-                <a16:creationId xmlns:a16="http://schemas.microsoft.com/office/drawing/2014/main" id="{D6D69D3E-FBAF-4DB6-9842-B6765AB53DB9}"/>
-              </a:ext>
-            </a:extLst>
-          </p:cNvPr>
-          <p:cNvCxnSpPr>
-            <a:cxnSpLocks/>
-          </p:cNvCxnSpPr>
-          <p:nvPr/>
-        </p:nvCxnSpPr>
-        <p:spPr>
-          <a:xfrm flipV="1">
-            <a:off x="7696200" y="2513170"/>
-            <a:ext cx="0" cy="2846230"/>
-          </a:xfrm>
-          <a:prstGeom prst="line">
-            <a:avLst/>
-          </a:prstGeom>
-          <a:ln w="19050">
-            <a:solidFill>
-              <a:schemeClr val="tx1"/>
-            </a:solidFill>
-            <a:prstDash val="dash"/>
-          </a:ln>
-        </p:spPr>
-        <p:style>
-          <a:lnRef idx="1">
-            <a:schemeClr val="accent1"/>
-          </a:lnRef>
-          <a:fillRef idx="0">
-            <a:schemeClr val="accent1"/>
-          </a:fillRef>
-          <a:effectRef idx="0">
-            <a:schemeClr val="accent1"/>
-          </a:effectRef>
-          <a:fontRef idx="minor">
-            <a:schemeClr val="tx1"/>
-          </a:fontRef>
-        </p:style>
-      </p:cxnSp>
-      <p:cxnSp>
-        <p:nvCxnSpPr>
-          <p:cNvPr id="28" name="Straight Connector 27">
-            <a:extLst>
-              <a:ext uri="{FF2B5EF4-FFF2-40B4-BE49-F238E27FC236}">
-                <a16:creationId xmlns:a16="http://schemas.microsoft.com/office/drawing/2014/main" id="{4C72B189-FBC4-4E2B-83CB-2E6D0BAE51F3}"/>
-              </a:ext>
-            </a:extLst>
-          </p:cNvPr>
-          <p:cNvCxnSpPr>
-            <a:cxnSpLocks/>
-          </p:cNvCxnSpPr>
-          <p:nvPr/>
-        </p:nvCxnSpPr>
-        <p:spPr>
-          <a:xfrm flipV="1">
-            <a:off x="6924486" y="2513169"/>
-            <a:ext cx="0" cy="2846231"/>
-          </a:xfrm>
-          <a:prstGeom prst="line">
-            <a:avLst/>
-          </a:prstGeom>
-          <a:ln w="19050">
-            <a:solidFill>
-              <a:schemeClr val="tx1"/>
-            </a:solidFill>
-            <a:prstDash val="dash"/>
-          </a:ln>
-        </p:spPr>
-        <p:style>
-          <a:lnRef idx="1">
-            <a:schemeClr val="accent1"/>
-          </a:lnRef>
-          <a:fillRef idx="0">
-            <a:schemeClr val="accent1"/>
-          </a:fillRef>
-          <a:effectRef idx="0">
-            <a:schemeClr val="accent1"/>
-          </a:effectRef>
-          <a:fontRef idx="minor">
-            <a:schemeClr val="tx1"/>
-          </a:fontRef>
-        </p:style>
-      </p:cxnSp>
-      <p:sp>
-        <p:nvSpPr>
-          <p:cNvPr id="19" name="TextBox 18">
-            <a:extLst>
-              <a:ext uri="{FF2B5EF4-FFF2-40B4-BE49-F238E27FC236}">
-                <a16:creationId xmlns:a16="http://schemas.microsoft.com/office/drawing/2014/main" id="{9CF30802-5AE9-4D95-9849-DFF8564B79BD}"/>
-              </a:ext>
-            </a:extLst>
-          </p:cNvPr>
-          <p:cNvSpPr txBox="1"/>
-          <p:nvPr/>
-        </p:nvSpPr>
-        <p:spPr>
-          <a:xfrm>
-            <a:off x="1706874" y="5079250"/>
-            <a:ext cx="312907" cy="369332"/>
-          </a:xfrm>
-          <a:prstGeom prst="rect">
-            <a:avLst/>
-          </a:prstGeom>
-          <a:noFill/>
-        </p:spPr>
-        <p:txBody>
-          <a:bodyPr wrap="none" rtlCol="0">
-            <a:spAutoFit/>
-          </a:bodyPr>
-          <a:lstStyle/>
-          <a:p>
-            <a:pPr algn="ctr"/>
-            <a:r>
-              <a:rPr lang="en-US" dirty="0">
-                <a:latin typeface="Arial" panose="020B0604020202020204" pitchFamily="34" charset="0"/>
-                <a:cs typeface="Arial" panose="020B0604020202020204" pitchFamily="34" charset="0"/>
-              </a:rPr>
-              <a:t>1</a:t>
-            </a:r>
-          </a:p>
-        </p:txBody>
-      </p:sp>
-      <p:sp>
-        <p:nvSpPr>
-          <p:cNvPr id="30" name="TextBox 29">
-            <a:extLst>
-              <a:ext uri="{FF2B5EF4-FFF2-40B4-BE49-F238E27FC236}">
-                <a16:creationId xmlns:a16="http://schemas.microsoft.com/office/drawing/2014/main" id="{FA9BCD10-F0E5-488A-A5B6-B01B36C3CF80}"/>
-              </a:ext>
-            </a:extLst>
-          </p:cNvPr>
-          <p:cNvSpPr txBox="1"/>
-          <p:nvPr/>
-        </p:nvSpPr>
-        <p:spPr>
-          <a:xfrm>
-            <a:off x="2508433" y="5079250"/>
-            <a:ext cx="312907" cy="369332"/>
-          </a:xfrm>
-          <a:prstGeom prst="rect">
-            <a:avLst/>
-          </a:prstGeom>
-          <a:noFill/>
-        </p:spPr>
-        <p:txBody>
-          <a:bodyPr wrap="none" rtlCol="0">
-            <a:spAutoFit/>
-          </a:bodyPr>
-          <a:lstStyle/>
-          <a:p>
-            <a:pPr algn="ctr"/>
-            <a:r>
-              <a:rPr lang="en-US" dirty="0">
-                <a:latin typeface="Arial" panose="020B0604020202020204" pitchFamily="34" charset="0"/>
-                <a:cs typeface="Arial" panose="020B0604020202020204" pitchFamily="34" charset="0"/>
-              </a:rPr>
-              <a:t>2</a:t>
-            </a:r>
-          </a:p>
-        </p:txBody>
-      </p:sp>
-      <p:sp>
-        <p:nvSpPr>
-          <p:cNvPr id="31" name="TextBox 30">
-            <a:extLst>
-              <a:ext uri="{FF2B5EF4-FFF2-40B4-BE49-F238E27FC236}">
-                <a16:creationId xmlns:a16="http://schemas.microsoft.com/office/drawing/2014/main" id="{F9205FA8-AB5A-4243-8568-8E14FFC15FD6}"/>
-              </a:ext>
-            </a:extLst>
-          </p:cNvPr>
-          <p:cNvSpPr txBox="1"/>
-          <p:nvPr/>
-        </p:nvSpPr>
-        <p:spPr>
-          <a:xfrm>
-            <a:off x="3299162" y="5079250"/>
-            <a:ext cx="312907" cy="369332"/>
-          </a:xfrm>
-          <a:prstGeom prst="rect">
-            <a:avLst/>
-          </a:prstGeom>
-          <a:noFill/>
-        </p:spPr>
-        <p:txBody>
-          <a:bodyPr wrap="none" rtlCol="0">
-            <a:spAutoFit/>
-          </a:bodyPr>
-          <a:lstStyle/>
-          <a:p>
-            <a:pPr algn="ctr"/>
-            <a:r>
-              <a:rPr lang="en-US" dirty="0">
-                <a:latin typeface="Arial" panose="020B0604020202020204" pitchFamily="34" charset="0"/>
-                <a:cs typeface="Arial" panose="020B0604020202020204" pitchFamily="34" charset="0"/>
-              </a:rPr>
-              <a:t>3</a:t>
-            </a:r>
-          </a:p>
-        </p:txBody>
-      </p:sp>
-      <p:sp>
-        <p:nvSpPr>
-          <p:cNvPr id="32" name="TextBox 31">
-            <a:extLst>
-              <a:ext uri="{FF2B5EF4-FFF2-40B4-BE49-F238E27FC236}">
-                <a16:creationId xmlns:a16="http://schemas.microsoft.com/office/drawing/2014/main" id="{72D3E0FE-16B5-4668-9CDE-195FEBA6546E}"/>
-              </a:ext>
-            </a:extLst>
-          </p:cNvPr>
-          <p:cNvSpPr txBox="1"/>
-          <p:nvPr/>
-        </p:nvSpPr>
-        <p:spPr>
-          <a:xfrm>
-            <a:off x="4060347" y="5079250"/>
-            <a:ext cx="312907" cy="369332"/>
-          </a:xfrm>
-          <a:prstGeom prst="rect">
-            <a:avLst/>
-          </a:prstGeom>
-          <a:noFill/>
-        </p:spPr>
-        <p:txBody>
-          <a:bodyPr wrap="none" rtlCol="0">
-            <a:spAutoFit/>
-          </a:bodyPr>
-          <a:lstStyle/>
-          <a:p>
-            <a:pPr algn="ctr"/>
-            <a:r>
-              <a:rPr lang="en-US" dirty="0">
-                <a:latin typeface="Arial" panose="020B0604020202020204" pitchFamily="34" charset="0"/>
-                <a:cs typeface="Arial" panose="020B0604020202020204" pitchFamily="34" charset="0"/>
-              </a:rPr>
-              <a:t>4</a:t>
-            </a:r>
-          </a:p>
-        </p:txBody>
-      </p:sp>
-      <p:sp>
-        <p:nvSpPr>
-          <p:cNvPr id="33" name="TextBox 32">
-            <a:extLst>
-              <a:ext uri="{FF2B5EF4-FFF2-40B4-BE49-F238E27FC236}">
-                <a16:creationId xmlns:a16="http://schemas.microsoft.com/office/drawing/2014/main" id="{EDAC55B9-96A5-4ED5-961C-8DD0228EFD3E}"/>
-              </a:ext>
-            </a:extLst>
-          </p:cNvPr>
-          <p:cNvSpPr txBox="1"/>
-          <p:nvPr/>
-        </p:nvSpPr>
-        <p:spPr>
-          <a:xfrm>
-            <a:off x="4856034" y="5079250"/>
-            <a:ext cx="312907" cy="369332"/>
-          </a:xfrm>
-          <a:prstGeom prst="rect">
-            <a:avLst/>
-          </a:prstGeom>
-          <a:noFill/>
-        </p:spPr>
-        <p:txBody>
-          <a:bodyPr wrap="none" rtlCol="0">
-            <a:spAutoFit/>
-          </a:bodyPr>
-          <a:lstStyle/>
-          <a:p>
-            <a:pPr algn="ctr"/>
-            <a:r>
-              <a:rPr lang="en-US" dirty="0">
-                <a:latin typeface="Arial" panose="020B0604020202020204" pitchFamily="34" charset="0"/>
-                <a:cs typeface="Arial" panose="020B0604020202020204" pitchFamily="34" charset="0"/>
-              </a:rPr>
-              <a:t>5</a:t>
-            </a:r>
-          </a:p>
-        </p:txBody>
-      </p:sp>
-      <p:sp>
-        <p:nvSpPr>
-          <p:cNvPr id="34" name="TextBox 33">
-            <a:extLst>
-              <a:ext uri="{FF2B5EF4-FFF2-40B4-BE49-F238E27FC236}">
-                <a16:creationId xmlns:a16="http://schemas.microsoft.com/office/drawing/2014/main" id="{DE90D1E4-97F1-443E-AB70-841F85440375}"/>
-              </a:ext>
-            </a:extLst>
-          </p:cNvPr>
-          <p:cNvSpPr txBox="1"/>
-          <p:nvPr/>
-        </p:nvSpPr>
-        <p:spPr>
-          <a:xfrm>
-            <a:off x="5597926" y="5079250"/>
-            <a:ext cx="312907" cy="369332"/>
-          </a:xfrm>
-          <a:prstGeom prst="rect">
-            <a:avLst/>
-          </a:prstGeom>
-          <a:noFill/>
-        </p:spPr>
-        <p:txBody>
-          <a:bodyPr wrap="none" rtlCol="0">
-            <a:spAutoFit/>
-          </a:bodyPr>
-          <a:lstStyle/>
-          <a:p>
-            <a:pPr algn="ctr"/>
-            <a:r>
-              <a:rPr lang="en-US" dirty="0">
-                <a:latin typeface="Arial" panose="020B0604020202020204" pitchFamily="34" charset="0"/>
-                <a:cs typeface="Arial" panose="020B0604020202020204" pitchFamily="34" charset="0"/>
-              </a:rPr>
-              <a:t>6</a:t>
-            </a:r>
-          </a:p>
-        </p:txBody>
-      </p:sp>
-      <p:sp>
-        <p:nvSpPr>
-          <p:cNvPr id="35" name="TextBox 34">
-            <a:extLst>
-              <a:ext uri="{FF2B5EF4-FFF2-40B4-BE49-F238E27FC236}">
-                <a16:creationId xmlns:a16="http://schemas.microsoft.com/office/drawing/2014/main" id="{FB7CC5BF-1537-4291-8B60-8679D9E7C46A}"/>
-              </a:ext>
-            </a:extLst>
-          </p:cNvPr>
-          <p:cNvSpPr txBox="1"/>
-          <p:nvPr/>
-        </p:nvSpPr>
-        <p:spPr>
-          <a:xfrm>
-            <a:off x="6403903" y="5079250"/>
-            <a:ext cx="312907" cy="369332"/>
-          </a:xfrm>
-          <a:prstGeom prst="rect">
-            <a:avLst/>
-          </a:prstGeom>
-          <a:noFill/>
-        </p:spPr>
-        <p:txBody>
-          <a:bodyPr wrap="none" rtlCol="0">
-            <a:spAutoFit/>
-          </a:bodyPr>
-          <a:lstStyle/>
-          <a:p>
-            <a:pPr algn="ctr"/>
-            <a:r>
-              <a:rPr lang="en-US" dirty="0">
-                <a:latin typeface="Arial" panose="020B0604020202020204" pitchFamily="34" charset="0"/>
-                <a:cs typeface="Arial" panose="020B0604020202020204" pitchFamily="34" charset="0"/>
-              </a:rPr>
-              <a:t>7</a:t>
-            </a:r>
-          </a:p>
-        </p:txBody>
-      </p:sp>
-      <p:sp>
-        <p:nvSpPr>
-          <p:cNvPr id="36" name="TextBox 35">
-            <a:extLst>
-              <a:ext uri="{FF2B5EF4-FFF2-40B4-BE49-F238E27FC236}">
-                <a16:creationId xmlns:a16="http://schemas.microsoft.com/office/drawing/2014/main" id="{BA77651C-A050-46FB-A334-79ADFDDBB05B}"/>
-              </a:ext>
-            </a:extLst>
-          </p:cNvPr>
-          <p:cNvSpPr txBox="1"/>
-          <p:nvPr/>
-        </p:nvSpPr>
-        <p:spPr>
-          <a:xfrm>
-            <a:off x="7169795" y="5079250"/>
-            <a:ext cx="312907" cy="369332"/>
-          </a:xfrm>
-          <a:prstGeom prst="rect">
-            <a:avLst/>
-          </a:prstGeom>
-          <a:noFill/>
-        </p:spPr>
-        <p:txBody>
-          <a:bodyPr wrap="none" rtlCol="0">
-            <a:spAutoFit/>
-          </a:bodyPr>
-          <a:lstStyle/>
-          <a:p>
-            <a:pPr algn="ctr"/>
-            <a:r>
-              <a:rPr lang="en-US" dirty="0">
-                <a:latin typeface="Arial" panose="020B0604020202020204" pitchFamily="34" charset="0"/>
-                <a:cs typeface="Arial" panose="020B0604020202020204" pitchFamily="34" charset="0"/>
-              </a:rPr>
-              <a:t>8</a:t>
-            </a:r>
-          </a:p>
-        </p:txBody>
-      </p:sp>
-      <p:sp>
-        <p:nvSpPr>
-          <p:cNvPr id="41" name="TextBox 40">
-            <a:extLst>
-              <a:ext uri="{FF2B5EF4-FFF2-40B4-BE49-F238E27FC236}">
-                <a16:creationId xmlns:a16="http://schemas.microsoft.com/office/drawing/2014/main" id="{C9B96B79-9221-47E9-A244-92045C578732}"/>
-              </a:ext>
-            </a:extLst>
-          </p:cNvPr>
-          <p:cNvSpPr txBox="1"/>
-          <p:nvPr/>
-        </p:nvSpPr>
-        <p:spPr>
-          <a:xfrm>
-            <a:off x="1162944" y="3714233"/>
-            <a:ext cx="263214" cy="261610"/>
-          </a:xfrm>
-          <a:prstGeom prst="rect">
-            <a:avLst/>
-          </a:prstGeom>
-          <a:noFill/>
-        </p:spPr>
-        <p:txBody>
-          <a:bodyPr wrap="none" rtlCol="0">
-            <a:spAutoFit/>
-          </a:bodyPr>
-          <a:lstStyle/>
-          <a:p>
-            <a:r>
-              <a:rPr lang="en-US" sz="1100" dirty="0">
-                <a:latin typeface="Arial" panose="020B0604020202020204" pitchFamily="34" charset="0"/>
-                <a:cs typeface="Arial" panose="020B0604020202020204" pitchFamily="34" charset="0"/>
-              </a:rPr>
-              <a:t>0</a:t>
-            </a:r>
-          </a:p>
-        </p:txBody>
-      </p:sp>
-      <p:cxnSp>
-        <p:nvCxnSpPr>
-          <p:cNvPr id="44" name="Straight Connector 43">
-            <a:extLst>
-              <a:ext uri="{FF2B5EF4-FFF2-40B4-BE49-F238E27FC236}">
-                <a16:creationId xmlns:a16="http://schemas.microsoft.com/office/drawing/2014/main" id="{35057ED2-89F2-40FE-9C1B-87C9151B2601}"/>
-              </a:ext>
-            </a:extLst>
-          </p:cNvPr>
-          <p:cNvCxnSpPr>
-            <a:cxnSpLocks/>
-          </p:cNvCxnSpPr>
-          <p:nvPr/>
-        </p:nvCxnSpPr>
-        <p:spPr>
-          <a:xfrm flipH="1">
-            <a:off x="1381786" y="2750288"/>
-            <a:ext cx="6380427" cy="0"/>
-          </a:xfrm>
-          <a:prstGeom prst="line">
-            <a:avLst/>
-          </a:prstGeom>
-          <a:ln w="19050">
-            <a:solidFill>
-              <a:schemeClr val="tx1"/>
-            </a:solidFill>
-            <a:prstDash val="dash"/>
-          </a:ln>
-        </p:spPr>
-        <p:style>
-          <a:lnRef idx="1">
-            <a:schemeClr val="accent1"/>
-          </a:lnRef>
-          <a:fillRef idx="0">
-            <a:schemeClr val="accent1"/>
-          </a:fillRef>
-          <a:effectRef idx="0">
-            <a:schemeClr val="accent1"/>
-          </a:effectRef>
-          <a:fontRef idx="minor">
-            <a:schemeClr val="tx1"/>
-          </a:fontRef>
-        </p:style>
-      </p:cxnSp>
-      <p:sp>
-        <p:nvSpPr>
-          <p:cNvPr id="49" name="TextBox 48">
-            <a:extLst>
-              <a:ext uri="{FF2B5EF4-FFF2-40B4-BE49-F238E27FC236}">
-                <a16:creationId xmlns:a16="http://schemas.microsoft.com/office/drawing/2014/main" id="{D047278E-9C5C-4601-B8AB-59CDB29A4826}"/>
-              </a:ext>
-            </a:extLst>
-          </p:cNvPr>
-          <p:cNvSpPr txBox="1"/>
-          <p:nvPr/>
-        </p:nvSpPr>
-        <p:spPr>
-          <a:xfrm>
-            <a:off x="950729" y="2601888"/>
-            <a:ext cx="457176" cy="261610"/>
-          </a:xfrm>
-          <a:prstGeom prst="rect">
-            <a:avLst/>
-          </a:prstGeom>
-          <a:noFill/>
-        </p:spPr>
-        <p:txBody>
-          <a:bodyPr wrap="none" rtlCol="0">
-            <a:spAutoFit/>
-          </a:bodyPr>
-          <a:lstStyle/>
-          <a:p>
-            <a:r>
-              <a:rPr lang="en-US" sz="1100" dirty="0" err="1">
-                <a:latin typeface="Arial" panose="020B0604020202020204" pitchFamily="34" charset="0"/>
-                <a:cs typeface="Arial" panose="020B0604020202020204" pitchFamily="34" charset="0"/>
-              </a:rPr>
-              <a:t>P</a:t>
-            </a:r>
-            <a:r>
-              <a:rPr lang="en-US" sz="1100" baseline="-25000" dirty="0" err="1">
-                <a:latin typeface="Arial" panose="020B0604020202020204" pitchFamily="34" charset="0"/>
-                <a:cs typeface="Arial" panose="020B0604020202020204" pitchFamily="34" charset="0"/>
-              </a:rPr>
-              <a:t>max</a:t>
-            </a:r>
-            <a:endParaRPr lang="en-US" sz="1100" dirty="0">
-              <a:latin typeface="Arial" panose="020B0604020202020204" pitchFamily="34" charset="0"/>
-              <a:cs typeface="Arial" panose="020B0604020202020204" pitchFamily="34" charset="0"/>
-            </a:endParaRPr>
-          </a:p>
-        </p:txBody>
-      </p:sp>
-      <p:sp>
-        <p:nvSpPr>
-          <p:cNvPr id="50" name="TextBox 49">
-            <a:extLst>
-              <a:ext uri="{FF2B5EF4-FFF2-40B4-BE49-F238E27FC236}">
-                <a16:creationId xmlns:a16="http://schemas.microsoft.com/office/drawing/2014/main" id="{8273EDCA-BC83-4A77-B518-7DA1C00B3021}"/>
-              </a:ext>
-            </a:extLst>
-          </p:cNvPr>
-          <p:cNvSpPr txBox="1"/>
-          <p:nvPr/>
-        </p:nvSpPr>
-        <p:spPr>
-          <a:xfrm>
-            <a:off x="950729" y="4826578"/>
-            <a:ext cx="431528" cy="261610"/>
-          </a:xfrm>
-          <a:prstGeom prst="rect">
-            <a:avLst/>
-          </a:prstGeom>
-          <a:noFill/>
-        </p:spPr>
-        <p:txBody>
-          <a:bodyPr wrap="none" rtlCol="0">
-            <a:spAutoFit/>
-          </a:bodyPr>
-          <a:lstStyle/>
-          <a:p>
-            <a:r>
-              <a:rPr lang="en-US" sz="1100" dirty="0" err="1">
-                <a:latin typeface="Arial" panose="020B0604020202020204" pitchFamily="34" charset="0"/>
-                <a:cs typeface="Arial" panose="020B0604020202020204" pitchFamily="34" charset="0"/>
-              </a:rPr>
-              <a:t>P</a:t>
-            </a:r>
-            <a:r>
-              <a:rPr lang="en-US" sz="1100" baseline="-25000" dirty="0" err="1">
-                <a:latin typeface="Arial" panose="020B0604020202020204" pitchFamily="34" charset="0"/>
-                <a:cs typeface="Arial" panose="020B0604020202020204" pitchFamily="34" charset="0"/>
-              </a:rPr>
-              <a:t>min</a:t>
-            </a:r>
-            <a:endParaRPr lang="en-US" sz="1100" dirty="0">
-              <a:latin typeface="Arial" panose="020B0604020202020204" pitchFamily="34" charset="0"/>
-              <a:cs typeface="Arial" panose="020B0604020202020204" pitchFamily="34" charset="0"/>
-            </a:endParaRPr>
-          </a:p>
-        </p:txBody>
-      </p:sp>
-      <p:cxnSp>
-        <p:nvCxnSpPr>
-          <p:cNvPr id="45" name="Straight Connector 44">
-            <a:extLst>
-              <a:ext uri="{FF2B5EF4-FFF2-40B4-BE49-F238E27FC236}">
-                <a16:creationId xmlns:a16="http://schemas.microsoft.com/office/drawing/2014/main" id="{54D11641-8D51-45E7-A040-DE1831443A91}"/>
-              </a:ext>
-            </a:extLst>
-          </p:cNvPr>
-          <p:cNvCxnSpPr>
-            <a:cxnSpLocks/>
-          </p:cNvCxnSpPr>
-          <p:nvPr/>
-        </p:nvCxnSpPr>
-        <p:spPr>
-          <a:xfrm flipH="1">
-            <a:off x="1381786" y="5021150"/>
-            <a:ext cx="6380427" cy="0"/>
-          </a:xfrm>
-          <a:prstGeom prst="line">
-            <a:avLst/>
-          </a:prstGeom>
-          <a:ln w="19050">
-            <a:solidFill>
-              <a:schemeClr val="tx1"/>
-            </a:solidFill>
-            <a:prstDash val="dash"/>
-          </a:ln>
-        </p:spPr>
-        <p:style>
-          <a:lnRef idx="1">
-            <a:schemeClr val="accent1"/>
-          </a:lnRef>
-          <a:fillRef idx="0">
-            <a:schemeClr val="accent1"/>
-          </a:fillRef>
-          <a:effectRef idx="0">
-            <a:schemeClr val="accent1"/>
-          </a:effectRef>
-          <a:fontRef idx="minor">
-            <a:schemeClr val="tx1"/>
-          </a:fontRef>
-        </p:style>
-      </p:cxnSp>
-      <p:sp>
-        <p:nvSpPr>
-          <p:cNvPr id="29" name="TextBox 28">
-            <a:extLst>
-              <a:ext uri="{FF2B5EF4-FFF2-40B4-BE49-F238E27FC236}">
-                <a16:creationId xmlns:a16="http://schemas.microsoft.com/office/drawing/2014/main" id="{A35C5879-4824-4CED-BF7C-1C8C97E61F9B}"/>
-              </a:ext>
-            </a:extLst>
-          </p:cNvPr>
-          <p:cNvSpPr txBox="1"/>
-          <p:nvPr/>
-        </p:nvSpPr>
-        <p:spPr>
-          <a:xfrm>
-            <a:off x="1660539" y="4183026"/>
-            <a:ext cx="569387" cy="261610"/>
-          </a:xfrm>
-          <a:prstGeom prst="rect">
-            <a:avLst/>
-          </a:prstGeom>
-          <a:noFill/>
-        </p:spPr>
-        <p:txBody>
-          <a:bodyPr wrap="none" rtlCol="0">
-            <a:spAutoFit/>
-          </a:bodyPr>
-          <a:lstStyle/>
-          <a:p>
-            <a:r>
-              <a:rPr lang="en-US" sz="1100" dirty="0">
-                <a:latin typeface="Arial" panose="020B0604020202020204" pitchFamily="34" charset="0"/>
-                <a:cs typeface="Arial" panose="020B0604020202020204" pitchFamily="34" charset="0"/>
-              </a:rPr>
-              <a:t>Inhale</a:t>
-            </a:r>
-          </a:p>
-        </p:txBody>
-      </p:sp>
-      <p:sp>
-        <p:nvSpPr>
-          <p:cNvPr id="37" name="TextBox 36">
-            <a:extLst>
-              <a:ext uri="{FF2B5EF4-FFF2-40B4-BE49-F238E27FC236}">
-                <a16:creationId xmlns:a16="http://schemas.microsoft.com/office/drawing/2014/main" id="{7EEB6740-1CB1-44E4-B835-5D4DCC34F3EF}"/>
-              </a:ext>
-            </a:extLst>
-          </p:cNvPr>
-          <p:cNvSpPr txBox="1"/>
-          <p:nvPr/>
-        </p:nvSpPr>
-        <p:spPr>
-          <a:xfrm>
-            <a:off x="4788613" y="3076964"/>
-            <a:ext cx="617477" cy="261610"/>
-          </a:xfrm>
-          <a:prstGeom prst="rect">
-            <a:avLst/>
-          </a:prstGeom>
-          <a:noFill/>
-        </p:spPr>
-        <p:txBody>
-          <a:bodyPr wrap="none" rtlCol="0">
-            <a:spAutoFit/>
-          </a:bodyPr>
-          <a:lstStyle/>
-          <a:p>
-            <a:r>
-              <a:rPr lang="en-US" sz="1100" dirty="0">
-                <a:latin typeface="Arial" panose="020B0604020202020204" pitchFamily="34" charset="0"/>
-                <a:cs typeface="Arial" panose="020B0604020202020204" pitchFamily="34" charset="0"/>
-              </a:rPr>
-              <a:t>Exhale</a:t>
-            </a:r>
-          </a:p>
-        </p:txBody>
-      </p:sp>
+          <p:cNvGraphicFramePr>
+            <a:graphicFrameLocks noChangeAspect="1"/>
+          </p:cNvGraphicFramePr>
+          <p:nvPr>
+            <p:extLst>
+              <p:ext uri="{D42A27DB-BD31-4B8C-83A1-F6EECF244321}">
+                <p14:modId xmlns:p14="http://schemas.microsoft.com/office/powerpoint/2010/main" val="1055431674"/>
+              </p:ext>
+            </p:extLst>
+          </p:nvPr>
+        </p:nvGraphicFramePr>
+        <p:xfrm>
+          <a:off x="4718050" y="2868613"/>
+          <a:ext cx="2095500" cy="1066800"/>
+        </p:xfrm>
+        <a:graphic>
+          <a:graphicData uri="http://schemas.openxmlformats.org/presentationml/2006/ole">
+            <mc:AlternateContent xmlns:mc="http://schemas.openxmlformats.org/markup-compatibility/2006">
+              <mc:Choice xmlns:v="urn:schemas-microsoft-com:vml" Requires="v">
+                <p:oleObj name="Equation" r:id="rId4" imgW="2095200" imgH="1066680" progId="Equation.DSMT4">
+                  <p:embed/>
+                </p:oleObj>
+              </mc:Choice>
+              <mc:Fallback>
+                <p:oleObj name="Equation" r:id="rId4" imgW="2095200" imgH="1066680" progId="Equation.DSMT4">
+                  <p:embed/>
+                  <p:pic>
+                    <p:nvPicPr>
+                      <p:cNvPr id="0" name=""/>
+                      <p:cNvPicPr/>
+                      <p:nvPr/>
+                    </p:nvPicPr>
+                    <p:blipFill>
+                      <a:blip r:embed="rId5"/>
+                      <a:stretch>
+                        <a:fillRect/>
+                      </a:stretch>
+                    </p:blipFill>
+                    <p:spPr>
+                      <a:xfrm>
+                        <a:off x="4718050" y="2868613"/>
+                        <a:ext cx="2095500" cy="1066800"/>
+                      </a:xfrm>
+                      <a:prstGeom prst="rect">
+                        <a:avLst/>
+                      </a:prstGeom>
+                    </p:spPr>
+                  </p:pic>
+                </p:oleObj>
+              </mc:Fallback>
+            </mc:AlternateContent>
+          </a:graphicData>
+        </a:graphic>
+      </p:graphicFrame>
     </p:spTree>
     <p:extLst>
       <p:ext uri="{BB962C8B-B14F-4D97-AF65-F5344CB8AC3E}">
-        <p14:creationId xmlns:p14="http://schemas.microsoft.com/office/powerpoint/2010/main" val="4211701667"/>
+        <p14:creationId xmlns:p14="http://schemas.microsoft.com/office/powerpoint/2010/main" val="1027379977"/>
       </p:ext>
     </p:extLst>
   </p:cSld>
@@ -10259,7 +9225,7 @@
           <a:graphicData uri="http://schemas.openxmlformats.org/presentationml/2006/ole">
             <mc:AlternateContent xmlns:mc="http://schemas.openxmlformats.org/markup-compatibility/2006">
               <mc:Choice xmlns:v="urn:schemas-microsoft-com:vml" Requires="v">
-                <p:oleObj spid="_x0000_s2166" name="Equation" r:id="rId4" imgW="914400" imgH="198720" progId="Equation.DSMT4">
+                <p:oleObj name="Equation" r:id="rId4" imgW="914400" imgH="198720" progId="Equation.DSMT4">
                   <p:embed/>
                 </p:oleObj>
               </mc:Choice>
@@ -10322,7 +9288,7 @@
           <a:graphicData uri="http://schemas.openxmlformats.org/presentationml/2006/ole">
             <mc:AlternateContent xmlns:mc="http://schemas.openxmlformats.org/markup-compatibility/2006">
               <mc:Choice xmlns:v="urn:schemas-microsoft-com:vml" Requires="v">
-                <p:oleObj spid="_x0000_s2167" name="Equation" r:id="rId6" imgW="114120" imgH="177480" progId="Equation.DSMT4">
+                <p:oleObj name="Equation" r:id="rId6" imgW="114120" imgH="177480" progId="Equation.DSMT4">
                   <p:embed/>
                 </p:oleObj>
               </mc:Choice>
@@ -11590,7 +10556,7 @@
           <p:cNvPr id="2" name="Object 1">
             <a:extLst>
               <a:ext uri="{FF2B5EF4-FFF2-40B4-BE49-F238E27FC236}">
-                <a16:creationId xmlns:a16="http://schemas.microsoft.com/office/drawing/2014/main" id="{92521731-B8E9-467F-A4A9-71E892442E42}"/>
+                <a16:creationId xmlns:a16="http://schemas.microsoft.com/office/drawing/2014/main" id="{04DE5B25-8A94-4C77-9F2C-DB69DA06679B}"/>
               </a:ext>
             </a:extLst>
           </p:cNvPr>
@@ -11600,105 +10566,48 @@
           <p:nvPr>
             <p:extLst>
               <p:ext uri="{D42A27DB-BD31-4B8C-83A1-F6EECF244321}">
-                <p14:modId xmlns:p14="http://schemas.microsoft.com/office/powerpoint/2010/main" val="541268050"/>
+                <p14:modId xmlns:p14="http://schemas.microsoft.com/office/powerpoint/2010/main" val="1673333346"/>
               </p:ext>
             </p:extLst>
           </p:nvPr>
         </p:nvGraphicFramePr>
         <p:xfrm>
-          <a:off x="533400" y="533400"/>
-          <a:ext cx="2413000" cy="5334000"/>
+          <a:off x="317500" y="1689100"/>
+          <a:ext cx="2844800" cy="3022600"/>
         </p:xfrm>
         <a:graphic>
           <a:graphicData uri="http://schemas.openxmlformats.org/presentationml/2006/ole">
             <mc:AlternateContent xmlns:mc="http://schemas.openxmlformats.org/markup-compatibility/2006">
               <mc:Choice xmlns:v="urn:schemas-microsoft-com:vml" Requires="v">
-                <p:oleObj spid="_x0000_s1137" name="Equation" r:id="rId3" imgW="2412720" imgH="5333760" progId="Equation.DSMT4">
+                <p:oleObj name="Equation" r:id="rId2" imgW="2844720" imgH="3022560" progId="Equation.DSMT4">
                   <p:embed/>
                 </p:oleObj>
               </mc:Choice>
               <mc:Fallback>
-                <p:oleObj name="Equation" r:id="rId3" imgW="2412720" imgH="5333760" progId="Equation.DSMT4">
+                <p:oleObj name="Equation" r:id="rId2" imgW="2844720" imgH="3022560" progId="Equation.DSMT4">
                   <p:embed/>
                   <p:pic>
                     <p:nvPicPr>
-                      <p:cNvPr id="0" name=""/>
+                      <p:cNvPr id="2" name="Object 1">
+                        <a:extLst>
+                          <a:ext uri="{FF2B5EF4-FFF2-40B4-BE49-F238E27FC236}">
+                            <a16:creationId xmlns:a16="http://schemas.microsoft.com/office/drawing/2014/main" id="{92521731-B8E9-467F-A4A9-71E892442E42}"/>
+                          </a:ext>
+                        </a:extLst>
+                      </p:cNvPr>
                       <p:cNvPicPr/>
                       <p:nvPr/>
                     </p:nvPicPr>
                     <p:blipFill>
-                      <a:blip r:embed="rId4"/>
+                      <a:blip r:embed="rId3"/>
                       <a:stretch>
                         <a:fillRect/>
                       </a:stretch>
                     </p:blipFill>
                     <p:spPr>
                       <a:xfrm>
-                        <a:off x="533400" y="533400"/>
-                        <a:ext cx="2413000" cy="5334000"/>
-                      </a:xfrm>
-                      <a:prstGeom prst="rect">
-                        <a:avLst/>
-                      </a:prstGeom>
-                    </p:spPr>
-                  </p:pic>
-                </p:oleObj>
-              </mc:Fallback>
-            </mc:AlternateContent>
-          </a:graphicData>
-        </a:graphic>
-      </p:graphicFrame>
-      <p:graphicFrame>
-        <p:nvGraphicFramePr>
-          <p:cNvPr id="3" name="Object 2">
-            <a:extLst>
-              <a:ext uri="{FF2B5EF4-FFF2-40B4-BE49-F238E27FC236}">
-                <a16:creationId xmlns:a16="http://schemas.microsoft.com/office/drawing/2014/main" id="{ED4622BF-0D97-44B3-8AAD-D9747F3BD857}"/>
-              </a:ext>
-            </a:extLst>
-          </p:cNvPr>
-          <p:cNvGraphicFramePr>
-            <a:graphicFrameLocks noChangeAspect="1"/>
-          </p:cNvGraphicFramePr>
-          <p:nvPr>
-            <p:extLst>
-              <p:ext uri="{D42A27DB-BD31-4B8C-83A1-F6EECF244321}">
-                <p14:modId xmlns:p14="http://schemas.microsoft.com/office/powerpoint/2010/main" val="1055431674"/>
-              </p:ext>
-            </p:extLst>
-          </p:nvPr>
-        </p:nvGraphicFramePr>
-        <p:xfrm>
-          <a:off x="4718050" y="2868613"/>
-          <a:ext cx="2095500" cy="1066800"/>
-        </p:xfrm>
-        <a:graphic>
-          <a:graphicData uri="http://schemas.openxmlformats.org/presentationml/2006/ole">
-            <mc:AlternateContent xmlns:mc="http://schemas.openxmlformats.org/markup-compatibility/2006">
-              <mc:Choice xmlns:v="urn:schemas-microsoft-com:vml" Requires="v">
-                <p:oleObj spid="_x0000_s1138" name="Equation" r:id="rId5" imgW="2095200" imgH="1066680" progId="Equation.DSMT4">
-                  <p:embed/>
-                </p:oleObj>
-              </mc:Choice>
-              <mc:Fallback>
-                <p:oleObj name="Equation" r:id="rId5" imgW="2095200" imgH="1066680" progId="Equation.DSMT4">
-                  <p:embed/>
-                  <p:pic>
-                    <p:nvPicPr>
-                      <p:cNvPr id="0" name=""/>
-                      <p:cNvPicPr/>
-                      <p:nvPr/>
-                    </p:nvPicPr>
-                    <p:blipFill>
-                      <a:blip r:embed="rId6"/>
-                      <a:stretch>
-                        <a:fillRect/>
-                      </a:stretch>
-                    </p:blipFill>
-                    <p:spPr>
-                      <a:xfrm>
-                        <a:off x="4718050" y="2868613"/>
-                        <a:ext cx="2095500" cy="1066800"/>
+                        <a:off x="317500" y="1689100"/>
+                        <a:ext cx="2844800" cy="3022600"/>
                       </a:xfrm>
                       <a:prstGeom prst="rect">
                         <a:avLst/>
@@ -11714,7 +10623,7 @@
     </p:spTree>
     <p:extLst>
       <p:ext uri="{BB962C8B-B14F-4D97-AF65-F5344CB8AC3E}">
-        <p14:creationId xmlns:p14="http://schemas.microsoft.com/office/powerpoint/2010/main" val="1027379977"/>
+        <p14:creationId xmlns:p14="http://schemas.microsoft.com/office/powerpoint/2010/main" val="3380626594"/>
       </p:ext>
     </p:extLst>
   </p:cSld>
@@ -12444,12 +11353,12 @@
           <a:graphicData uri="http://schemas.openxmlformats.org/presentationml/2006/ole">
             <mc:AlternateContent xmlns:mc="http://schemas.openxmlformats.org/markup-compatibility/2006">
               <mc:Choice xmlns:v="urn:schemas-microsoft-com:vml" Requires="v">
-                <p:oleObj spid="_x0000_s3111" name="Equation" r:id="rId3" imgW="1765080" imgH="4978080" progId="Equation.DSMT4">
+                <p:oleObj name="Equation" r:id="rId2" imgW="1765080" imgH="4978080" progId="Equation.DSMT4">
                   <p:embed/>
                 </p:oleObj>
               </mc:Choice>
               <mc:Fallback>
-                <p:oleObj name="Equation" r:id="rId3" imgW="1765080" imgH="4978080" progId="Equation.DSMT4">
+                <p:oleObj name="Equation" r:id="rId2" imgW="1765080" imgH="4978080" progId="Equation.DSMT4">
                   <p:embed/>
                   <p:pic>
                     <p:nvPicPr>
@@ -12458,7 +11367,7 @@
                       <p:nvPr/>
                     </p:nvPicPr>
                     <p:blipFill>
-                      <a:blip r:embed="rId4"/>
+                      <a:blip r:embed="rId3"/>
                       <a:stretch>
                         <a:fillRect/>
                       </a:stretch>
@@ -12524,25 +11433,25 @@
           <p:nvPr>
             <p:extLst>
               <p:ext uri="{D42A27DB-BD31-4B8C-83A1-F6EECF244321}">
-                <p14:modId xmlns:p14="http://schemas.microsoft.com/office/powerpoint/2010/main" val="2503694216"/>
+                <p14:modId xmlns:p14="http://schemas.microsoft.com/office/powerpoint/2010/main" val="1694473456"/>
               </p:ext>
             </p:extLst>
           </p:nvPr>
         </p:nvGraphicFramePr>
         <p:xfrm>
-          <a:off x="1066800" y="1524000"/>
-          <a:ext cx="863600" cy="546100"/>
+          <a:off x="1028700" y="1524000"/>
+          <a:ext cx="939800" cy="546100"/>
         </p:xfrm>
         <a:graphic>
           <a:graphicData uri="http://schemas.openxmlformats.org/presentationml/2006/ole">
             <mc:AlternateContent xmlns:mc="http://schemas.openxmlformats.org/markup-compatibility/2006">
               <mc:Choice xmlns:v="urn:schemas-microsoft-com:vml" Requires="v">
-                <p:oleObj spid="_x0000_s4103" name="Equation" r:id="rId3" imgW="863280" imgH="545760" progId="Equation.DSMT4">
+                <p:oleObj name="Equation" r:id="rId2" imgW="939600" imgH="545760" progId="Equation.DSMT4">
                   <p:embed/>
                 </p:oleObj>
               </mc:Choice>
               <mc:Fallback>
-                <p:oleObj name="Equation" r:id="rId3" imgW="863280" imgH="545760" progId="Equation.DSMT4">
+                <p:oleObj name="Equation" r:id="rId2" imgW="939600" imgH="545760" progId="Equation.DSMT4">
                   <p:embed/>
                   <p:pic>
                     <p:nvPicPr>
@@ -12551,15 +11460,15 @@
                       <p:nvPr/>
                     </p:nvPicPr>
                     <p:blipFill>
-                      <a:blip r:embed="rId4"/>
+                      <a:blip r:embed="rId3"/>
                       <a:stretch>
                         <a:fillRect/>
                       </a:stretch>
                     </p:blipFill>
                     <p:spPr>
                       <a:xfrm>
-                        <a:off x="1066800" y="1524000"/>
-                        <a:ext cx="863600" cy="546100"/>
+                        <a:off x="1028700" y="1524000"/>
+                        <a:ext cx="939800" cy="546100"/>
                       </a:xfrm>
                       <a:prstGeom prst="rect">
                         <a:avLst/>
@@ -12604,10 +11513,10 @@
       </p:grpSpPr>
       <p:pic>
         <p:nvPicPr>
-          <p:cNvPr id="5" name="Picture 4">
+          <p:cNvPr id="3" name="Picture 2">
             <a:extLst>
               <a:ext uri="{FF2B5EF4-FFF2-40B4-BE49-F238E27FC236}">
-                <a16:creationId xmlns:a16="http://schemas.microsoft.com/office/drawing/2014/main" id="{C43501FC-A041-4EBE-8A51-C989A8725516}"/>
+                <a16:creationId xmlns:a16="http://schemas.microsoft.com/office/drawing/2014/main" id="{A9325BDB-CEF1-4E78-A32C-C010E6B7BDB5}"/>
               </a:ext>
             </a:extLst>
           </p:cNvPr>
@@ -12664,10 +11573,10 @@
       </p:grpSpPr>
       <p:pic>
         <p:nvPicPr>
-          <p:cNvPr id="18" name="Picture 17">
+          <p:cNvPr id="2" name="Picture 1">
             <a:extLst>
               <a:ext uri="{FF2B5EF4-FFF2-40B4-BE49-F238E27FC236}">
-                <a16:creationId xmlns:a16="http://schemas.microsoft.com/office/drawing/2014/main" id="{97DAB992-8A8E-4DF0-BEDD-D8829119E372}"/>
+                <a16:creationId xmlns:a16="http://schemas.microsoft.com/office/drawing/2014/main" id="{1D4ADD18-94F0-4F2B-9407-73169C85E605}"/>
               </a:ext>
             </a:extLst>
           </p:cNvPr>

</xml_diff>